<commit_message>
included GMM clustering over features made from buketizing the data
</commit_message>
<xml_diff>
--- a/docs/Project_help_n_ideas.pptx
+++ b/docs/Project_help_n_ideas.pptx
@@ -112,7 +112,7 @@
         <p:txBody>
           <a:bodyPr/>
           <a:p>
-            <a:fld id="{354785BA-8376-4F99-A20B-B0C4029F4235}" type="slidenum">
+            <a:fld id="{A7963331-4D96-4062-800E-692377038F8E}" type="slidenum">
               <a:t>&lt;#&gt;</a:t>
             </a:fld>
           </a:p>
@@ -300,7 +300,7 @@
         <p:txBody>
           <a:bodyPr/>
           <a:p>
-            <a:fld id="{53C0F66E-F937-49F8-997A-7F877970F505}" type="slidenum">
+            <a:fld id="{BFE49F09-1442-4996-B044-9CEECDF51268}" type="slidenum">
               <a:t>&lt;#&gt;</a:t>
             </a:fld>
           </a:p>
@@ -556,7 +556,7 @@
         <p:txBody>
           <a:bodyPr/>
           <a:p>
-            <a:fld id="{FB504D9F-6FA5-4AED-8D98-83CAA72D6B09}" type="slidenum">
+            <a:fld id="{C66109EA-931A-4CD6-AF04-BCFF4D80CE4B}" type="slidenum">
               <a:t>&lt;#&gt;</a:t>
             </a:fld>
           </a:p>
@@ -880,7 +880,7 @@
         <p:txBody>
           <a:bodyPr/>
           <a:p>
-            <a:fld id="{CFA0FBCF-A6E7-479F-B471-7B3B7206EA33}" type="slidenum">
+            <a:fld id="{B8F1315A-57E3-4F5D-B69D-84497328BC43}" type="slidenum">
               <a:t>&lt;#&gt;</a:t>
             </a:fld>
           </a:p>
@@ -963,7 +963,7 @@
         <p:txBody>
           <a:bodyPr/>
           <a:p>
-            <a:fld id="{4E1E531A-50AE-4EEA-87B9-C9DA391B87D9}" type="slidenum">
+            <a:fld id="{6D652D88-1307-4CEE-95EA-860348734FF7}" type="slidenum">
               <a:t>&lt;#&gt;</a:t>
             </a:fld>
           </a:p>
@@ -1120,7 +1120,7 @@
         <p:txBody>
           <a:bodyPr/>
           <a:p>
-            <a:fld id="{9952A4BB-BEC0-4C0A-9FA3-D702AE60575B}" type="slidenum">
+            <a:fld id="{A83F9D71-1706-48E0-AE94-529FE555EDDB}" type="slidenum">
               <a:t>&lt;#&gt;</a:t>
             </a:fld>
           </a:p>
@@ -1274,7 +1274,7 @@
         <p:txBody>
           <a:bodyPr/>
           <a:p>
-            <a:fld id="{94117363-509D-4096-A11F-5D1A60BDBBD2}" type="slidenum">
+            <a:fld id="{A2F46537-18FC-4C9F-A82D-1C3CEC80D9B7}" type="slidenum">
               <a:t>&lt;#&gt;</a:t>
             </a:fld>
           </a:p>
@@ -1462,7 +1462,7 @@
         <p:txBody>
           <a:bodyPr/>
           <a:p>
-            <a:fld id="{E5ACF7C4-7F05-4917-8390-0AE78E5486D2}" type="slidenum">
+            <a:fld id="{86B2FADC-2EB8-4AF8-8E1B-52D702A2F28F}" type="slidenum">
               <a:t>&lt;#&gt;</a:t>
             </a:fld>
           </a:p>
@@ -1582,7 +1582,7 @@
         <p:txBody>
           <a:bodyPr/>
           <a:p>
-            <a:fld id="{4430C413-967F-456E-AEC0-3B2408A45D0C}" type="slidenum">
+            <a:fld id="{A839C96F-E734-495C-B711-C6AE01B44CB2}" type="slidenum">
               <a:t>&lt;#&gt;</a:t>
             </a:fld>
           </a:p>
@@ -1702,7 +1702,7 @@
         <p:txBody>
           <a:bodyPr/>
           <a:p>
-            <a:fld id="{A22E5545-49DE-4608-B799-5FEC82040ACC}" type="slidenum">
+            <a:fld id="{291DBB36-67D0-4288-A8FF-B60740773AB2}" type="slidenum">
               <a:t>&lt;#&gt;</a:t>
             </a:fld>
           </a:p>
@@ -1924,7 +1924,7 @@
         <p:txBody>
           <a:bodyPr/>
           <a:p>
-            <a:fld id="{2C3E92BC-F702-43EC-9467-F07B6C018512}" type="slidenum">
+            <a:fld id="{AA443C2E-7C7E-4AB6-89E8-29D51952A129}" type="slidenum">
               <a:t>&lt;#&gt;</a:t>
             </a:fld>
           </a:p>
@@ -2081,7 +2081,7 @@
         <p:txBody>
           <a:bodyPr/>
           <a:p>
-            <a:fld id="{8CF5AB30-6486-4E6A-BE8C-581E9C65F3A7}" type="slidenum">
+            <a:fld id="{184AB0DD-5A5D-46D1-850C-410B9E44B63C}" type="slidenum">
               <a:t>&lt;#&gt;</a:t>
             </a:fld>
           </a:p>
@@ -2303,7 +2303,7 @@
         <p:txBody>
           <a:bodyPr/>
           <a:p>
-            <a:fld id="{A93CA993-9F28-4C0E-B40C-E82CEFF03E27}" type="slidenum">
+            <a:fld id="{41B6FBA6-A005-4222-AA91-BF17C96B6541}" type="slidenum">
               <a:t>&lt;#&gt;</a:t>
             </a:fld>
           </a:p>
@@ -2525,7 +2525,7 @@
         <p:txBody>
           <a:bodyPr/>
           <a:p>
-            <a:fld id="{76BEAE1D-8561-4CE9-8103-3EF728EE79AA}" type="slidenum">
+            <a:fld id="{6EAE39CD-6AAE-4916-B9C1-018F3141D50C}" type="slidenum">
               <a:t>&lt;#&gt;</a:t>
             </a:fld>
           </a:p>
@@ -2713,7 +2713,7 @@
         <p:txBody>
           <a:bodyPr/>
           <a:p>
-            <a:fld id="{F97EAB89-BAEB-426A-BACE-D8E53591164E}" type="slidenum">
+            <a:fld id="{980F32C9-0840-49AA-AFA2-025D91EEF0A0}" type="slidenum">
               <a:t>&lt;#&gt;</a:t>
             </a:fld>
           </a:p>
@@ -2969,7 +2969,7 @@
         <p:txBody>
           <a:bodyPr/>
           <a:p>
-            <a:fld id="{06063E5F-96F5-4C11-8D17-87ACB192C01B}" type="slidenum">
+            <a:fld id="{C4F0D739-83A3-42BD-BDAE-290F21DE0293}" type="slidenum">
               <a:t>&lt;#&gt;</a:t>
             </a:fld>
           </a:p>
@@ -3293,7 +3293,7 @@
         <p:txBody>
           <a:bodyPr/>
           <a:p>
-            <a:fld id="{CE7CC937-10B4-4F97-96DA-255555ED4042}" type="slidenum">
+            <a:fld id="{07AC932E-C8BC-4548-BD8B-44022EE9508F}" type="slidenum">
               <a:t>&lt;#&gt;</a:t>
             </a:fld>
           </a:p>
@@ -3447,7 +3447,7 @@
         <p:txBody>
           <a:bodyPr/>
           <a:p>
-            <a:fld id="{5B1CE7DD-6B6D-46C0-A5AB-C388228BBCA6}" type="slidenum">
+            <a:fld id="{23800623-7033-4709-8508-16F920787761}" type="slidenum">
               <a:t>&lt;#&gt;</a:t>
             </a:fld>
           </a:p>
@@ -3635,7 +3635,7 @@
         <p:txBody>
           <a:bodyPr/>
           <a:p>
-            <a:fld id="{2BEF66B2-F37C-4813-A9AC-353E9F6C7333}" type="slidenum">
+            <a:fld id="{7E3CDF32-78EE-477D-AC39-30DF50B87929}" type="slidenum">
               <a:t>&lt;#&gt;</a:t>
             </a:fld>
           </a:p>
@@ -3755,7 +3755,7 @@
         <p:txBody>
           <a:bodyPr/>
           <a:p>
-            <a:fld id="{82AC79FD-D44A-4FA3-B8D8-4144EB601F3A}" type="slidenum">
+            <a:fld id="{013C6800-66FE-4802-9CEA-E50250C0ED44}" type="slidenum">
               <a:t>&lt;#&gt;</a:t>
             </a:fld>
           </a:p>
@@ -3875,7 +3875,7 @@
         <p:txBody>
           <a:bodyPr/>
           <a:p>
-            <a:fld id="{7CFB99CE-541B-49ED-86BE-C2083A0F788D}" type="slidenum">
+            <a:fld id="{6AFC7E5D-C6F0-41D2-8B9A-AB439C6818D8}" type="slidenum">
               <a:t>&lt;#&gt;</a:t>
             </a:fld>
           </a:p>
@@ -4097,7 +4097,7 @@
         <p:txBody>
           <a:bodyPr/>
           <a:p>
-            <a:fld id="{CE6F9F2B-2175-410C-82A9-C0E30C87ECFA}" type="slidenum">
+            <a:fld id="{86FC7D9F-7F94-455C-88F0-54F49D36F661}" type="slidenum">
               <a:t>&lt;#&gt;</a:t>
             </a:fld>
           </a:p>
@@ -4319,7 +4319,7 @@
         <p:txBody>
           <a:bodyPr/>
           <a:p>
-            <a:fld id="{4D8F4158-97BE-43F2-9FB8-66326B09FADD}" type="slidenum">
+            <a:fld id="{6705B21F-B248-4F29-9F7E-2530FB16074B}" type="slidenum">
               <a:t>&lt;#&gt;</a:t>
             </a:fld>
           </a:p>
@@ -4541,7 +4541,7 @@
         <p:txBody>
           <a:bodyPr/>
           <a:p>
-            <a:fld id="{602B4E16-A960-43C2-B075-DDF73AED9557}" type="slidenum">
+            <a:fld id="{32D9DB48-9739-43F6-AADE-A0941A662EA6}" type="slidenum">
               <a:t>&lt;#&gt;</a:t>
             </a:fld>
           </a:p>
@@ -4610,7 +4610,7 @@
         <p:spPr>
           <a:xfrm>
             <a:off x="4038480" y="6356520"/>
-            <a:ext cx="4112280" cy="362520"/>
+            <a:ext cx="4111920" cy="362160"/>
           </a:xfrm>
           <a:prstGeom prst="rect">
             <a:avLst/>
@@ -4646,7 +4646,7 @@
               <a:rPr b="0" lang="en-US" sz="1400" spc="-1" strike="noStrike">
                 <a:latin typeface="Times New Roman"/>
               </a:rPr>
-              <a:t>&lt;footer&gt;</a:t>
+              <a:t> </a:t>
             </a:r>
             <a:endParaRPr b="0" lang="en-US" sz="1400" spc="-1" strike="noStrike">
               <a:latin typeface="Times New Roman"/>
@@ -4667,7 +4667,7 @@
         <p:spPr>
           <a:xfrm>
             <a:off x="8610480" y="6356520"/>
-            <a:ext cx="2740680" cy="362520"/>
+            <a:ext cx="2740320" cy="362160"/>
           </a:xfrm>
           <a:prstGeom prst="rect">
             <a:avLst/>
@@ -4702,14 +4702,14 @@
               </a:lnSpc>
               <a:buNone/>
             </a:pPr>
-            <a:fld id="{36525B0D-6A5F-41AA-BE58-6C6DD16A65EA}" type="slidenum">
+            <a:fld id="{1C02D604-4C08-487E-AD3B-6F66C734B2D9}" type="slidenum">
               <a:rPr b="0" lang="en-SG" sz="1200" spc="-1" strike="noStrike">
                 <a:solidFill>
                   <a:srgbClr val="8b8b8b"/>
                 </a:solidFill>
                 <a:latin typeface="Calibri"/>
               </a:rPr>
-              <a:t>&lt;number&gt;</a:t>
+              <a:t>25</a:t>
             </a:fld>
             <a:endParaRPr b="0" lang="en-US" sz="1200" spc="-1" strike="noStrike">
               <a:latin typeface="Times New Roman"/>
@@ -4730,7 +4730,7 @@
         <p:spPr>
           <a:xfrm>
             <a:off x="838080" y="6356520"/>
-            <a:ext cx="2740680" cy="362520"/>
+            <a:ext cx="2740320" cy="362160"/>
           </a:xfrm>
           <a:prstGeom prst="rect">
             <a:avLst/>
@@ -4756,7 +4756,7 @@
               <a:rPr b="0" lang="en-US" sz="1400" spc="-1" strike="noStrike">
                 <a:latin typeface="Times New Roman"/>
               </a:rPr>
-              <a:t>&lt;date/time&gt;</a:t>
+              <a:t> </a:t>
             </a:r>
             <a:endParaRPr b="0" lang="en-US" sz="1400" spc="-1" strike="noStrike">
               <a:latin typeface="Times New Roman"/>
@@ -5047,7 +5047,7 @@
         <p:spPr>
           <a:xfrm>
             <a:off x="4038480" y="6356520"/>
-            <a:ext cx="4112280" cy="362520"/>
+            <a:ext cx="4111920" cy="362160"/>
           </a:xfrm>
           <a:prstGeom prst="rect">
             <a:avLst/>
@@ -5104,7 +5104,7 @@
         <p:spPr>
           <a:xfrm>
             <a:off x="8610480" y="6356520"/>
-            <a:ext cx="2740680" cy="362520"/>
+            <a:ext cx="2740320" cy="362160"/>
           </a:xfrm>
           <a:prstGeom prst="rect">
             <a:avLst/>
@@ -5139,7 +5139,7 @@
               </a:lnSpc>
               <a:buNone/>
             </a:pPr>
-            <a:fld id="{6912639D-8B19-4DD4-9FB8-770EB39E7103}" type="slidenum">
+            <a:fld id="{6ED35691-0E51-4EE7-8B9D-F5B61B2AA602}" type="slidenum">
               <a:rPr b="0" lang="en-SG" sz="1200" spc="-1" strike="noStrike">
                 <a:solidFill>
                   <a:srgbClr val="8b8b8b"/>
@@ -5167,7 +5167,7 @@
         <p:spPr>
           <a:xfrm>
             <a:off x="838080" y="6356520"/>
-            <a:ext cx="2740680" cy="362520"/>
+            <a:ext cx="2740320" cy="362160"/>
           </a:xfrm>
           <a:prstGeom prst="rect">
             <a:avLst/>
@@ -5477,7 +5477,7 @@
         <p:spPr>
           <a:xfrm>
             <a:off x="1523880" y="1122480"/>
-            <a:ext cx="9141480" cy="2385000"/>
+            <a:ext cx="9141120" cy="2384640"/>
           </a:xfrm>
           <a:prstGeom prst="rect">
             <a:avLst/>
@@ -5526,7 +5526,7 @@
         <p:spPr>
           <a:xfrm>
             <a:off x="1523880" y="3602160"/>
-            <a:ext cx="9141480" cy="1653120"/>
+            <a:ext cx="9141120" cy="1652760"/>
           </a:xfrm>
           <a:prstGeom prst="rect">
             <a:avLst/>
@@ -5611,7 +5611,7 @@
         <p:spPr>
           <a:xfrm>
             <a:off x="838080" y="365040"/>
-            <a:ext cx="10513080" cy="1323000"/>
+            <a:ext cx="10512720" cy="1322640"/>
           </a:xfrm>
           <a:prstGeom prst="rect">
             <a:avLst/>
@@ -5660,7 +5660,7 @@
         <p:spPr>
           <a:xfrm>
             <a:off x="838080" y="1825560"/>
-            <a:ext cx="10513080" cy="4348800"/>
+            <a:ext cx="10512720" cy="4348440"/>
           </a:xfrm>
           <a:prstGeom prst="rect">
             <a:avLst/>
@@ -5818,7 +5818,7 @@
         <p:spPr>
           <a:xfrm>
             <a:off x="838080" y="365040"/>
-            <a:ext cx="10513080" cy="1323000"/>
+            <a:ext cx="10512720" cy="1322640"/>
           </a:xfrm>
           <a:prstGeom prst="rect">
             <a:avLst/>
@@ -5867,7 +5867,7 @@
         <p:spPr>
           <a:xfrm>
             <a:off x="838080" y="1825560"/>
-            <a:ext cx="10513080" cy="4348800"/>
+            <a:ext cx="10512720" cy="4348440"/>
           </a:xfrm>
           <a:prstGeom prst="rect">
             <a:avLst/>
@@ -6008,7 +6008,7 @@
         <p:spPr>
           <a:xfrm>
             <a:off x="202680" y="147240"/>
-            <a:ext cx="989640" cy="638280"/>
+            <a:ext cx="989280" cy="638280"/>
           </a:xfrm>
           <a:prstGeom prst="rect">
             <a:avLst/>
@@ -6063,7 +6063,7 @@
         <p:spPr>
           <a:xfrm>
             <a:off x="1283040" y="1018080"/>
-            <a:ext cx="911880" cy="911880"/>
+            <a:ext cx="911520" cy="911520"/>
           </a:xfrm>
           <a:prstGeom prst="roundRect">
             <a:avLst>
@@ -6132,7 +6132,7 @@
         <p:spPr>
           <a:xfrm>
             <a:off x="243720" y="5844240"/>
-            <a:ext cx="911880" cy="911880"/>
+            <a:ext cx="911520" cy="911520"/>
           </a:xfrm>
           <a:prstGeom prst="roundRect">
             <a:avLst>
@@ -6200,8 +6200,8 @@
         </p:nvSpPr>
         <p:spPr>
           <a:xfrm flipH="1" rot="16200000">
-            <a:off x="650520" y="842400"/>
-            <a:ext cx="678960" cy="581760"/>
+            <a:off x="650160" y="842400"/>
+            <a:ext cx="678600" cy="581400"/>
           </a:xfrm>
           <a:prstGeom prst="bentConnector2">
             <a:avLst/>
@@ -6236,7 +6236,7 @@
         <p:spPr>
           <a:xfrm flipH="1" rot="16200000">
             <a:off x="-1824480" y="3317400"/>
-            <a:ext cx="5047920" cy="360"/>
+            <a:ext cx="5047560" cy="360"/>
           </a:xfrm>
           <a:prstGeom prst="bentConnector3">
             <a:avLst>
@@ -6273,7 +6273,7 @@
         <p:spPr>
           <a:xfrm>
             <a:off x="2794680" y="612720"/>
-            <a:ext cx="4779360" cy="2703600"/>
+            <a:ext cx="4779000" cy="2703240"/>
           </a:xfrm>
           <a:prstGeom prst="roundRect">
             <a:avLst>
@@ -6408,7 +6408,7 @@
         <p:spPr>
           <a:xfrm>
             <a:off x="838080" y="365040"/>
-            <a:ext cx="10513080" cy="1323000"/>
+            <a:ext cx="10512720" cy="1322640"/>
           </a:xfrm>
           <a:prstGeom prst="rect">
             <a:avLst/>
@@ -6457,7 +6457,7 @@
         <p:spPr>
           <a:xfrm>
             <a:off x="838080" y="1825560"/>
-            <a:ext cx="10513080" cy="4348800"/>
+            <a:ext cx="10512720" cy="4348440"/>
           </a:xfrm>
           <a:prstGeom prst="rect">
             <a:avLst/>
@@ -6633,7 +6633,7 @@
         <p:spPr>
           <a:xfrm>
             <a:off x="838080" y="365040"/>
-            <a:ext cx="10513080" cy="1323000"/>
+            <a:ext cx="10512720" cy="1322640"/>
           </a:xfrm>
           <a:prstGeom prst="rect">
             <a:avLst/>
@@ -6694,7 +6694,7 @@
         <p:spPr>
           <a:xfrm>
             <a:off x="838080" y="1825560"/>
-            <a:ext cx="10513080" cy="4745160"/>
+            <a:ext cx="10512720" cy="4744800"/>
           </a:xfrm>
           <a:prstGeom prst="rect">
             <a:avLst/>
@@ -9020,7 +9020,7 @@
         <p:spPr>
           <a:xfrm>
             <a:off x="838080" y="365040"/>
-            <a:ext cx="10513080" cy="1323000"/>
+            <a:ext cx="10512720" cy="1322640"/>
           </a:xfrm>
           <a:prstGeom prst="rect">
             <a:avLst/>
@@ -9081,7 +9081,7 @@
         <p:spPr>
           <a:xfrm>
             <a:off x="838080" y="1825560"/>
-            <a:ext cx="10513080" cy="4785120"/>
+            <a:ext cx="10512720" cy="4784760"/>
           </a:xfrm>
           <a:prstGeom prst="rect">
             <a:avLst/>
@@ -9206,7 +9206,25 @@
                 </a:solidFill>
                 <a:latin typeface="Consolas"/>
               </a:rPr>
-              <a:t>This function computes the optimal wap price using a different formula. If wap computed using our formula is different from the optimal wap price then there it might indicate high or low volatility?? what is difference between wap formula and jager’s bisection algorithm finding it?</a:t>
+              <a:t>This function computes the optimal wap price using a different formula. If wap computed using our formula is different from the optimal </a:t>
+            </a:r>
+            <a:r>
+              <a:rPr b="0" lang="en-SG" sz="1000" spc="-1" strike="noStrike">
+                <a:solidFill>
+                  <a:srgbClr val="cccccc"/>
+                </a:solidFill>
+                <a:latin typeface="Consolas"/>
+              </a:rPr>
+              <a:t>wap price then there it might indicate high or low volatility?? what is difference between wap formula and jager’s bisection algorithm </a:t>
+            </a:r>
+            <a:r>
+              <a:rPr b="0" lang="en-SG" sz="1000" spc="-1" strike="noStrike">
+                <a:solidFill>
+                  <a:srgbClr val="cccccc"/>
+                </a:solidFill>
+                <a:latin typeface="Consolas"/>
+              </a:rPr>
+              <a:t>finding it?</a:t>
             </a:r>
             <a:endParaRPr b="0" lang="en-US" sz="1000" spc="-1" strike="noStrike">
               <a:latin typeface="Arial"/>
@@ -9233,7 +9251,16 @@
                 </a:solidFill>
                 <a:latin typeface="Consolas"/>
               </a:rPr>
-              <a:t>the `full_book_wap_bisect` function uses a bisection search algorithm to iteratively narrow down the range of prices and find the weighted average price of a full book based on logarithmic ask and bid prices and their corresponding sizes.</a:t>
+              <a:t>the `full_book_wap_bisect` function uses a bisection search algorithm to iteratively narrow down the range of prices and find the </a:t>
+            </a:r>
+            <a:r>
+              <a:rPr b="0" lang="en-US" sz="1000" spc="-1" strike="noStrike">
+                <a:solidFill>
+                  <a:srgbClr val="cccccc"/>
+                </a:solidFill>
+                <a:latin typeface="Consolas"/>
+              </a:rPr>
+              <a:t>weighted average price of a full book based on logarithmic ask and bid prices and their corresponding sizes.</a:t>
             </a:r>
             <a:r>
               <a:rPr b="0" lang="en-SG" sz="1000" spc="-1" strike="noStrike">
@@ -9265,7 +9292,43 @@
                 </a:solidFill>
                 <a:latin typeface="Consolas"/>
               </a:rPr>
-              <a:t>In the code the wap (equilibrium price) is computed using the function full_book_wap_bisect( df_book, lvl=0) using a bisection algorithm iteratively and the wap moves towards the price (either bid or ask price) which has bigger bid or ask size and smaller . increasing lvl increases importance/weight of distance compared to size in f calculation. Higher lvl. Additionally, odd values of lvl make s negative and if bid size/price &gt; ask size/price then p moves towards ask price. Similarly, opposite is true. For even values, always pushed towards ask price??</a:t>
+              <a:t>In the code the wap (equilibrium price) is computed using the function full_book_wap_bisect( df_book, lvl=0) using a bisection algorithm </a:t>
+            </a:r>
+            <a:r>
+              <a:rPr b="0" lang="en-SG" sz="1000" spc="-1" strike="noStrike">
+                <a:solidFill>
+                  <a:srgbClr val="cccccc"/>
+                </a:solidFill>
+                <a:latin typeface="Consolas"/>
+              </a:rPr>
+              <a:t>iteratively and the wap moves towards the price (either bid or ask price) which has bigger bid or ask size and smaller . increasing lvl </a:t>
+            </a:r>
+            <a:r>
+              <a:rPr b="0" lang="en-SG" sz="1000" spc="-1" strike="noStrike">
+                <a:solidFill>
+                  <a:srgbClr val="cccccc"/>
+                </a:solidFill>
+                <a:latin typeface="Consolas"/>
+              </a:rPr>
+              <a:t>increases importance/weight of distance compared to size in f calculation. Higher lvl. Additionally, odd values of lvl make s negative and </a:t>
+            </a:r>
+            <a:r>
+              <a:rPr b="0" lang="en-SG" sz="1000" spc="-1" strike="noStrike">
+                <a:solidFill>
+                  <a:srgbClr val="cccccc"/>
+                </a:solidFill>
+                <a:latin typeface="Consolas"/>
+              </a:rPr>
+              <a:t>if bid size/price &gt; ask size/price then p moves towards ask price. Similarly, opposite is true. For even values, always pushed towards ask </a:t>
+            </a:r>
+            <a:r>
+              <a:rPr b="0" lang="en-SG" sz="1000" spc="-1" strike="noStrike">
+                <a:solidFill>
+                  <a:srgbClr val="cccccc"/>
+                </a:solidFill>
+                <a:latin typeface="Consolas"/>
+              </a:rPr>
+              <a:t>price??</a:t>
             </a:r>
             <a:endParaRPr b="0" lang="en-US" sz="1000" spc="-1" strike="noStrike">
               <a:latin typeface="Arial"/>
@@ -10611,7 +10674,16 @@
                 </a:solidFill>
                 <a:latin typeface="Consolas"/>
               </a:rPr>
-              <a:t>This calculation appears to be a measure of liquidity, which in finance is a measure of the ability to buy or sell assets without causing a significant change in their price. If log_ask/bid price is far away from wap that means that the asset is not liquid.</a:t>
+              <a:t>This calculation appears to be a measure of liquidity, which in finance is a measure of the ability to buy or sell assets without </a:t>
+            </a:r>
+            <a:r>
+              <a:rPr b="0" lang="en-US" sz="1000" spc="-1" strike="noStrike">
+                <a:solidFill>
+                  <a:srgbClr val="cccccc"/>
+                </a:solidFill>
+                <a:latin typeface="Consolas"/>
+              </a:rPr>
+              <a:t>causing a significant change in their price. If log_ask/bid price is far away from wap that means that the asset is not liquid.</a:t>
             </a:r>
             <a:endParaRPr b="0" lang="en-US" sz="1000" spc="-1" strike="noStrike">
               <a:latin typeface="Arial"/>
@@ -11535,7 +11607,17 @@
                 <a:latin typeface="Consolas"/>
                 <a:ea typeface="Noto Sans CJK SC"/>
               </a:rPr>
-              <a:t>Why is it bid minus ask in the above where liquidity is odd? And bid plus ask when liquidity is even. This is because wapq1 &lt; log_ask1 so wapq1 &lt; log_ask1 is negative and we need to have negative sign to make it positive. </a:t>
+              <a:t>Why is it bid minus ask in the above where liquidity is odd? And bid plus ask when liquidity is even. This is because wapq1 &lt; log_ask1 so </a:t>
+            </a:r>
+            <a:r>
+              <a:rPr b="0" lang="en-SG" sz="1000" spc="-1" strike="noStrike">
+                <a:solidFill>
+                  <a:srgbClr val="cccccc"/>
+                </a:solidFill>
+                <a:latin typeface="Consolas"/>
+                <a:ea typeface="Noto Sans CJK SC"/>
+              </a:rPr>
+              <a:t>wapq1 &lt; log_ask1 is negative and we need to have negative sign to make it positive. </a:t>
             </a:r>
             <a:br>
               <a:rPr sz="1000"/>
@@ -11606,7 +11688,7 @@
         <p:spPr>
           <a:xfrm>
             <a:off x="838080" y="365040"/>
-            <a:ext cx="10513080" cy="1323000"/>
+            <a:ext cx="10512720" cy="1322640"/>
           </a:xfrm>
           <a:prstGeom prst="rect">
             <a:avLst/>
@@ -11667,7 +11749,7 @@
         <p:spPr>
           <a:xfrm>
             <a:off x="838080" y="1825560"/>
-            <a:ext cx="10760040" cy="4745160"/>
+            <a:ext cx="10759680" cy="4744800"/>
           </a:xfrm>
           <a:prstGeom prst="rect">
             <a:avLst/>
@@ -15432,7 +15514,7 @@
         <p:spPr>
           <a:xfrm>
             <a:off x="838080" y="365040"/>
-            <a:ext cx="10513080" cy="1323000"/>
+            <a:ext cx="10512720" cy="1322640"/>
           </a:xfrm>
           <a:prstGeom prst="rect">
             <a:avLst/>
@@ -15493,7 +15575,7 @@
         <p:spPr>
           <a:xfrm>
             <a:off x="838080" y="1825560"/>
-            <a:ext cx="10760040" cy="4745160"/>
+            <a:ext cx="10759680" cy="4744800"/>
           </a:xfrm>
           <a:prstGeom prst="rect">
             <a:avLst/>
@@ -17490,7 +17572,7 @@
         <p:spPr>
           <a:xfrm>
             <a:off x="838080" y="365040"/>
-            <a:ext cx="10513080" cy="1323000"/>
+            <a:ext cx="10512720" cy="1322640"/>
           </a:xfrm>
           <a:prstGeom prst="rect">
             <a:avLst/>
@@ -17551,7 +17633,7 @@
         <p:spPr>
           <a:xfrm>
             <a:off x="838080" y="1825560"/>
-            <a:ext cx="10760040" cy="4745160"/>
+            <a:ext cx="10759680" cy="4744800"/>
           </a:xfrm>
           <a:prstGeom prst="rect">
             <a:avLst/>
@@ -19336,7 +19418,7 @@
         <p:spPr>
           <a:xfrm>
             <a:off x="838080" y="365040"/>
-            <a:ext cx="10513080" cy="1323000"/>
+            <a:ext cx="10512720" cy="1322640"/>
           </a:xfrm>
           <a:prstGeom prst="rect">
             <a:avLst/>
@@ -19397,7 +19479,7 @@
         <p:spPr>
           <a:xfrm>
             <a:off x="838080" y="1825560"/>
-            <a:ext cx="10760040" cy="4745160"/>
+            <a:ext cx="10759680" cy="4744800"/>
           </a:xfrm>
           <a:prstGeom prst="rect">
             <a:avLst/>
@@ -20187,7 +20269,7 @@
         <p:spPr>
           <a:xfrm>
             <a:off x="1776960" y="126000"/>
-            <a:ext cx="8635680" cy="6603120"/>
+            <a:ext cx="8635320" cy="6602760"/>
           </a:xfrm>
           <a:prstGeom prst="rect">
             <a:avLst/>
@@ -20247,7 +20329,7 @@
         <p:spPr>
           <a:xfrm>
             <a:off x="838080" y="365040"/>
-            <a:ext cx="10513080" cy="1323000"/>
+            <a:ext cx="10512720" cy="1322640"/>
           </a:xfrm>
           <a:prstGeom prst="rect">
             <a:avLst/>
@@ -20323,7 +20405,7 @@
         <p:spPr>
           <a:xfrm>
             <a:off x="838080" y="1825560"/>
-            <a:ext cx="10760040" cy="4745160"/>
+            <a:ext cx="10759680" cy="4744800"/>
           </a:xfrm>
           <a:prstGeom prst="rect">
             <a:avLst/>
@@ -22748,7 +22830,7 @@
         <p:spPr>
           <a:xfrm>
             <a:off x="838080" y="365040"/>
-            <a:ext cx="10513080" cy="1323000"/>
+            <a:ext cx="10512720" cy="1322640"/>
           </a:xfrm>
           <a:prstGeom prst="rect">
             <a:avLst/>
@@ -22814,7 +22896,7 @@
         <p:spPr>
           <a:xfrm>
             <a:off x="838080" y="1825560"/>
-            <a:ext cx="10760040" cy="4745160"/>
+            <a:ext cx="10759680" cy="4744800"/>
           </a:xfrm>
           <a:prstGeom prst="rect">
             <a:avLst/>
@@ -25298,7 +25380,7 @@
         <p:spPr>
           <a:xfrm>
             <a:off x="838080" y="365040"/>
-            <a:ext cx="10513080" cy="1323000"/>
+            <a:ext cx="10512720" cy="1322640"/>
           </a:xfrm>
           <a:prstGeom prst="rect">
             <a:avLst/>
@@ -25364,7 +25446,7 @@
         <p:spPr>
           <a:xfrm>
             <a:off x="838080" y="1825560"/>
-            <a:ext cx="10760040" cy="4745160"/>
+            <a:ext cx="10759680" cy="4744800"/>
           </a:xfrm>
           <a:prstGeom prst="rect">
             <a:avLst/>
@@ -26571,37 +26653,7 @@
                 <a:latin typeface="Droid Sans Mono;monospace"/>
                 <a:ea typeface="Noto Sans CJK SC"/>
               </a:rPr>
-              <a:t>The above code is taking mean over all the bins for the feature. Taking mean of volatilities vol1 is to first square them and then root them. Average Voltility or </a:t>
-            </a:r>
-            <a:r>
-              <a:rPr b="0" lang="en-SG" sz="1050" spc="-1" strike="noStrike">
-                <a:solidFill>
-                  <a:srgbClr val="cccccc"/>
-                </a:solidFill>
-                <a:latin typeface="Droid Sans Mono;monospace"/>
-                <a:ea typeface="Noto Sans CJK SC"/>
-              </a:rPr>
-              <a:t>standard deviation is calculated by taking the square root of average of invidual variances rather than average of individual standard deviation because the </a:t>
-            </a:r>
-            <a:r>
-              <a:rPr b="0" lang="en-SG" sz="1050" spc="-1" strike="noStrike">
-                <a:solidFill>
-                  <a:srgbClr val="cccccc"/>
-                </a:solidFill>
-                <a:latin typeface="Droid Sans Mono;monospace"/>
-                <a:ea typeface="Noto Sans CJK SC"/>
-              </a:rPr>
-              <a:t>latter underestimates the calculated average standard deviation. Generally, taking log helps to normalize the skewed distributions so he has taken log every </a:t>
-            </a:r>
-            <a:r>
-              <a:rPr b="0" lang="en-SG" sz="1050" spc="-1" strike="noStrike">
-                <a:solidFill>
-                  <a:srgbClr val="cccccc"/>
-                </a:solidFill>
-                <a:latin typeface="Droid Sans Mono;monospace"/>
-                <a:ea typeface="Noto Sans CJK SC"/>
-              </a:rPr>
-              <a:t>where. This is necessary in order to use models like Gaussian Mixuter Modles.</a:t>
+              <a:t>The above code is taking mean over all the bins for the feature. Taking mean of volatilities vol1 is to first square them and then root them. Average Voltility or standard deviation is calculated by taking the square root of average of invidual variances rather than average of individual standard deviation because the latter underestimates the calculated average standard deviation. Generally, taking log helps to normalize the skewed distributions so he has taken log every where. This is necessary in order to use models like Gaussian Mixuter Modles.</a:t>
             </a:r>
             <a:endParaRPr b="0" lang="en-US" sz="1050" spc="-1" strike="noStrike">
               <a:latin typeface="Arial"/>
@@ -27748,7 +27800,7 @@
         <p:spPr>
           <a:xfrm>
             <a:off x="838080" y="365040"/>
-            <a:ext cx="10513080" cy="1323000"/>
+            <a:ext cx="10512720" cy="1322640"/>
           </a:xfrm>
           <a:prstGeom prst="rect">
             <a:avLst/>
@@ -27814,7 +27866,7 @@
         <p:spPr>
           <a:xfrm>
             <a:off x="838080" y="1825560"/>
-            <a:ext cx="10760040" cy="4745160"/>
+            <a:ext cx="10759680" cy="4744800"/>
           </a:xfrm>
           <a:prstGeom prst="rect">
             <a:avLst/>
@@ -27826,7 +27878,7 @@
         </p:spPr>
         <p:txBody>
           <a:bodyPr lIns="90000" rIns="90000" tIns="45000" bIns="45000" anchor="t">
-            <a:normAutofit/>
+            <a:normAutofit fontScale="95000"/>
           </a:bodyPr>
           <a:p>
             <a:pPr>
@@ -28987,82 +29039,22 @@
             <a:r>
               <a:rPr b="0" lang="en-SG" sz="1050" spc="-1" strike="noStrike">
                 <a:solidFill>
-                  <a:srgbClr val="9cdcfe"/>
-                </a:solidFill>
-                <a:latin typeface="Droid Sans Mono;monospace"/>
-                <a:ea typeface="Noto Sans CJK SC"/>
-              </a:rPr>
-              <a:t>c</a:t>
-            </a:r>
-            <a:r>
-              <a:rPr b="0" lang="en-SG" sz="1050" spc="-1" strike="noStrike">
-                <a:solidFill>
-                  <a:srgbClr val="cccccc"/>
-                </a:solidFill>
-                <a:latin typeface="Droid Sans Mono;monospace"/>
-                <a:ea typeface="Noto Sans CJK SC"/>
-              </a:rPr>
-              <a:t> </a:t>
-            </a:r>
-            <a:r>
-              <a:rPr b="0" lang="en-SG" sz="1050" spc="-1" strike="noStrike">
-                <a:solidFill>
-                  <a:srgbClr val="d4d4d4"/>
-                </a:solidFill>
-                <a:latin typeface="Droid Sans Mono;monospace"/>
-                <a:ea typeface="Noto Sans CJK SC"/>
-              </a:rPr>
-              <a:t>=</a:t>
-            </a:r>
-            <a:r>
-              <a:rPr b="0" lang="en-SG" sz="1050" spc="-1" strike="noStrike">
-                <a:solidFill>
-                  <a:srgbClr val="cccccc"/>
-                </a:solidFill>
-                <a:latin typeface="Droid Sans Mono;monospace"/>
-                <a:ea typeface="Noto Sans CJK SC"/>
-              </a:rPr>
-              <a:t> </a:t>
-            </a:r>
-            <a:r>
-              <a:rPr b="0" lang="en-SG" sz="1050" spc="-1" strike="noStrike">
-                <a:solidFill>
-                  <a:srgbClr val="9cdcfe"/>
-                </a:solidFill>
-                <a:latin typeface="Droid Sans Mono;monospace"/>
-                <a:ea typeface="Noto Sans CJK SC"/>
-              </a:rPr>
-              <a:t>c</a:t>
-            </a:r>
-            <a:r>
-              <a:rPr b="0" lang="en-SG" sz="1050" spc="-1" strike="noStrike">
-                <a:solidFill>
-                  <a:srgbClr val="cccccc"/>
-                </a:solidFill>
-                <a:latin typeface="Droid Sans Mono;monospace"/>
-                <a:ea typeface="Noto Sans CJK SC"/>
-              </a:rPr>
-              <a:t>.</a:t>
-            </a:r>
-            <a:r>
-              <a:rPr b="0" lang="en-SG" sz="1050" spc="-1" strike="noStrike">
-                <a:solidFill>
-                  <a:srgbClr val="9cdcfe"/>
-                </a:solidFill>
-                <a:latin typeface="Droid Sans Mono;monospace"/>
-                <a:ea typeface="Noto Sans CJK SC"/>
-              </a:rPr>
-              <a:t>T </a:t>
-            </a:r>
-            <a:r>
-              <a:rPr b="0" lang="en-SG" sz="1050" spc="-1" strike="noStrike">
-                <a:solidFill>
-                  <a:srgbClr val="00a933"/>
-                </a:solidFill>
-                <a:latin typeface="Droid Sans Mono;monospace"/>
-                <a:ea typeface="Noto Sans CJK SC"/>
-              </a:rPr>
-              <a:t># features (stock ids) x components</a:t>
+                  <a:srgbClr val="b5cea8"/>
+                </a:solidFill>
+                <a:latin typeface="Droid Sans Mono;monospace"/>
+                <a:ea typeface="Noto Sans CJK SC"/>
+              </a:rPr>
+              <a:t>    </a:t>
+            </a:r>
+            <a:r>
+              <a:rPr b="0" lang="en-SG" sz="1050" spc="-1" strike="noStrike">
+                <a:solidFill>
+                  <a:srgbClr val="b5cea8"/>
+                </a:solidFill>
+                <a:latin typeface="Droid Sans Mono;monospace"/>
+                <a:ea typeface="Noto Sans CJK SC"/>
+              </a:rPr>
+              <a:t># singular values represent the variance contribution of each component or the true rank of the matrix</a:t>
             </a:r>
             <a:endParaRPr b="0" lang="en-US" sz="1050" spc="-1" strike="noStrike">
               <a:latin typeface="Arial"/>
@@ -29081,82 +29073,12 @@
             <a:r>
               <a:rPr b="0" lang="en-SG" sz="1050" spc="-1" strike="noStrike">
                 <a:solidFill>
-                  <a:srgbClr val="9cdcfe"/>
-                </a:solidFill>
-                <a:latin typeface="Droid Sans Mono;monospace"/>
-                <a:ea typeface="Noto Sans CJK SC"/>
-              </a:rPr>
-              <a:t>c</a:t>
-            </a:r>
-            <a:r>
-              <a:rPr b="0" lang="en-SG" sz="1050" spc="-1" strike="noStrike">
-                <a:solidFill>
-                  <a:srgbClr val="cccccc"/>
-                </a:solidFill>
-                <a:latin typeface="Droid Sans Mono;monospace"/>
-                <a:ea typeface="Noto Sans CJK SC"/>
-              </a:rPr>
-              <a:t>[:,</a:t>
-            </a:r>
-            <a:r>
-              <a:rPr b="0" lang="en-SG" sz="1050" spc="-1" strike="noStrike">
-                <a:solidFill>
                   <a:srgbClr val="b5cea8"/>
                 </a:solidFill>
                 <a:latin typeface="Droid Sans Mono;monospace"/>
                 <a:ea typeface="Noto Sans CJK SC"/>
               </a:rPr>
-              <a:t>0</a:t>
-            </a:r>
-            <a:r>
-              <a:rPr b="0" lang="en-SG" sz="1050" spc="-1" strike="noStrike">
-                <a:solidFill>
-                  <a:srgbClr val="cccccc"/>
-                </a:solidFill>
-                <a:latin typeface="Droid Sans Mono;monospace"/>
-                <a:ea typeface="Noto Sans CJK SC"/>
-              </a:rPr>
-              <a:t>] </a:t>
-            </a:r>
-            <a:r>
-              <a:rPr b="0" lang="en-SG" sz="1050" spc="-1" strike="noStrike">
-                <a:solidFill>
-                  <a:srgbClr val="d4d4d4"/>
-                </a:solidFill>
-                <a:latin typeface="Droid Sans Mono;monospace"/>
-                <a:ea typeface="Noto Sans CJK SC"/>
-              </a:rPr>
-              <a:t>=</a:t>
-            </a:r>
-            <a:r>
-              <a:rPr b="0" lang="en-SG" sz="1050" spc="-1" strike="noStrike">
-                <a:solidFill>
-                  <a:srgbClr val="cccccc"/>
-                </a:solidFill>
-                <a:latin typeface="Droid Sans Mono;monospace"/>
-                <a:ea typeface="Noto Sans CJK SC"/>
-              </a:rPr>
-              <a:t> </a:t>
-            </a:r>
-            <a:r>
-              <a:rPr b="0" lang="en-SG" sz="1050" spc="-1" strike="noStrike">
-                <a:solidFill>
-                  <a:srgbClr val="9cdcfe"/>
-                </a:solidFill>
-                <a:latin typeface="Droid Sans Mono;monospace"/>
-                <a:ea typeface="Noto Sans CJK SC"/>
-              </a:rPr>
-              <a:t>c</a:t>
-            </a:r>
-            <a:r>
-              <a:rPr b="0" lang="en-SG" sz="1050" spc="-1" strike="noStrike">
-                <a:solidFill>
-                  <a:srgbClr val="cccccc"/>
-                </a:solidFill>
-                <a:latin typeface="Droid Sans Mono;monospace"/>
-                <a:ea typeface="Noto Sans CJK SC"/>
-              </a:rPr>
-              <a:t>[:,</a:t>
+              <a:t>    </a:t>
             </a:r>
             <a:r>
               <a:rPr b="0" lang="en-SG" sz="1050" spc="-1" strike="noStrike">
@@ -29166,17 +29088,7 @@
                 <a:latin typeface="Droid Sans Mono;monospace"/>
                 <a:ea typeface="Noto Sans CJK SC"/>
               </a:rPr>
-              <a:t>0</a:t>
-            </a:r>
-            <a:r>
-              <a:rPr b="0" lang="en-SG" sz="1050" spc="-1" strike="noStrike">
-                <a:solidFill>
-                  <a:srgbClr val="cccccc"/>
-                </a:solidFill>
-                <a:latin typeface="Droid Sans Mono;monospace"/>
-                <a:ea typeface="Noto Sans CJK SC"/>
-              </a:rPr>
-              <a:t>] </a:t>
+              <a:t># when singular values are close to zero, the corresponding components can be ignored so we multiply the components with singular values</a:t>
             </a:r>
             <a:endParaRPr b="0" lang="en-US" sz="1050" spc="-1" strike="noStrike">
               <a:latin typeface="Arial"/>
@@ -29200,6 +29112,214 @@
                 <a:latin typeface="Droid Sans Mono;monospace"/>
                 <a:ea typeface="Noto Sans CJK SC"/>
               </a:rPr>
+              <a:t>c</a:t>
+            </a:r>
+            <a:r>
+              <a:rPr b="0" lang="en-SG" sz="1050" spc="-1" strike="noStrike">
+                <a:solidFill>
+                  <a:srgbClr val="cccccc"/>
+                </a:solidFill>
+                <a:latin typeface="Droid Sans Mono;monospace"/>
+                <a:ea typeface="Noto Sans CJK SC"/>
+              </a:rPr>
+              <a:t> </a:t>
+            </a:r>
+            <a:r>
+              <a:rPr b="0" lang="en-SG" sz="1050" spc="-1" strike="noStrike">
+                <a:solidFill>
+                  <a:srgbClr val="d4d4d4"/>
+                </a:solidFill>
+                <a:latin typeface="Droid Sans Mono;monospace"/>
+                <a:ea typeface="Noto Sans CJK SC"/>
+              </a:rPr>
+              <a:t>=</a:t>
+            </a:r>
+            <a:r>
+              <a:rPr b="0" lang="en-SG" sz="1050" spc="-1" strike="noStrike">
+                <a:solidFill>
+                  <a:srgbClr val="cccccc"/>
+                </a:solidFill>
+                <a:latin typeface="Droid Sans Mono;monospace"/>
+                <a:ea typeface="Noto Sans CJK SC"/>
+              </a:rPr>
+              <a:t> </a:t>
+            </a:r>
+            <a:r>
+              <a:rPr b="0" lang="en-SG" sz="1050" spc="-1" strike="noStrike">
+                <a:solidFill>
+                  <a:srgbClr val="9cdcfe"/>
+                </a:solidFill>
+                <a:latin typeface="Droid Sans Mono;monospace"/>
+                <a:ea typeface="Noto Sans CJK SC"/>
+              </a:rPr>
+              <a:t>c</a:t>
+            </a:r>
+            <a:r>
+              <a:rPr b="0" lang="en-SG" sz="1050" spc="-1" strike="noStrike">
+                <a:solidFill>
+                  <a:srgbClr val="cccccc"/>
+                </a:solidFill>
+                <a:latin typeface="Droid Sans Mono;monospace"/>
+                <a:ea typeface="Noto Sans CJK SC"/>
+              </a:rPr>
+              <a:t>.</a:t>
+            </a:r>
+            <a:r>
+              <a:rPr b="0" lang="en-SG" sz="1050" spc="-1" strike="noStrike">
+                <a:solidFill>
+                  <a:srgbClr val="9cdcfe"/>
+                </a:solidFill>
+                <a:latin typeface="Droid Sans Mono;monospace"/>
+                <a:ea typeface="Noto Sans CJK SC"/>
+              </a:rPr>
+              <a:t>T </a:t>
+            </a:r>
+            <a:r>
+              <a:rPr b="0" lang="en-SG" sz="1050" spc="-1" strike="noStrike">
+                <a:solidFill>
+                  <a:srgbClr val="00a933"/>
+                </a:solidFill>
+                <a:latin typeface="Droid Sans Mono;monospace"/>
+                <a:ea typeface="Noto Sans CJK SC"/>
+              </a:rPr>
+              <a:t># features (stock ids) x components</a:t>
+            </a:r>
+            <a:endParaRPr b="0" lang="en-US" sz="1050" spc="-1" strike="noStrike">
+              <a:latin typeface="Arial"/>
+            </a:endParaRPr>
+          </a:p>
+          <a:p>
+            <a:pPr>
+              <a:lnSpc>
+                <a:spcPts val="1426"/>
+              </a:lnSpc>
+              <a:spcBef>
+                <a:spcPts val="1417"/>
+              </a:spcBef>
+              <a:buNone/>
+            </a:pPr>
+            <a:r>
+              <a:rPr b="0" lang="en-SG" sz="1050" spc="-1" strike="noStrike">
+                <a:solidFill>
+                  <a:srgbClr val="9cdcfe"/>
+                </a:solidFill>
+                <a:latin typeface="Droid Sans Mono;monospace"/>
+                <a:ea typeface="Noto Sans CJK SC"/>
+              </a:rPr>
+              <a:t>c</a:t>
+            </a:r>
+            <a:r>
+              <a:rPr b="0" lang="en-SG" sz="1050" spc="-1" strike="noStrike">
+                <a:solidFill>
+                  <a:srgbClr val="cccccc"/>
+                </a:solidFill>
+                <a:latin typeface="Droid Sans Mono;monospace"/>
+                <a:ea typeface="Noto Sans CJK SC"/>
+              </a:rPr>
+              <a:t>[:,</a:t>
+            </a:r>
+            <a:r>
+              <a:rPr b="0" lang="en-SG" sz="1050" spc="-1" strike="noStrike">
+                <a:solidFill>
+                  <a:srgbClr val="b5cea8"/>
+                </a:solidFill>
+                <a:latin typeface="Droid Sans Mono;monospace"/>
+                <a:ea typeface="Noto Sans CJK SC"/>
+              </a:rPr>
+              <a:t>0</a:t>
+            </a:r>
+            <a:r>
+              <a:rPr b="0" lang="en-SG" sz="1050" spc="-1" strike="noStrike">
+                <a:solidFill>
+                  <a:srgbClr val="cccccc"/>
+                </a:solidFill>
+                <a:latin typeface="Droid Sans Mono;monospace"/>
+                <a:ea typeface="Noto Sans CJK SC"/>
+              </a:rPr>
+              <a:t>] </a:t>
+            </a:r>
+            <a:r>
+              <a:rPr b="0" lang="en-SG" sz="1050" spc="-1" strike="noStrike">
+                <a:solidFill>
+                  <a:srgbClr val="d4d4d4"/>
+                </a:solidFill>
+                <a:latin typeface="Droid Sans Mono;monospace"/>
+                <a:ea typeface="Noto Sans CJK SC"/>
+              </a:rPr>
+              <a:t>=</a:t>
+            </a:r>
+            <a:r>
+              <a:rPr b="0" lang="en-SG" sz="1050" spc="-1" strike="noStrike">
+                <a:solidFill>
+                  <a:srgbClr val="cccccc"/>
+                </a:solidFill>
+                <a:latin typeface="Droid Sans Mono;monospace"/>
+                <a:ea typeface="Noto Sans CJK SC"/>
+              </a:rPr>
+              <a:t> </a:t>
+            </a:r>
+            <a:r>
+              <a:rPr b="0" lang="en-SG" sz="1050" spc="-1" strike="noStrike">
+                <a:solidFill>
+                  <a:srgbClr val="9cdcfe"/>
+                </a:solidFill>
+                <a:latin typeface="Droid Sans Mono;monospace"/>
+                <a:ea typeface="Noto Sans CJK SC"/>
+              </a:rPr>
+              <a:t>c</a:t>
+            </a:r>
+            <a:r>
+              <a:rPr b="0" lang="en-SG" sz="1050" spc="-1" strike="noStrike">
+                <a:solidFill>
+                  <a:srgbClr val="cccccc"/>
+                </a:solidFill>
+                <a:latin typeface="Droid Sans Mono;monospace"/>
+                <a:ea typeface="Noto Sans CJK SC"/>
+              </a:rPr>
+              <a:t>[:,</a:t>
+            </a:r>
+            <a:r>
+              <a:rPr b="0" lang="en-SG" sz="1050" spc="-1" strike="noStrike">
+                <a:solidFill>
+                  <a:srgbClr val="b5cea8"/>
+                </a:solidFill>
+                <a:latin typeface="Droid Sans Mono;monospace"/>
+                <a:ea typeface="Noto Sans CJK SC"/>
+              </a:rPr>
+              <a:t>0</a:t>
+            </a:r>
+            <a:r>
+              <a:rPr b="0" lang="en-SG" sz="1050" spc="-1" strike="noStrike">
+                <a:solidFill>
+                  <a:srgbClr val="cccccc"/>
+                </a:solidFill>
+                <a:latin typeface="Droid Sans Mono;monospace"/>
+                <a:ea typeface="Noto Sans CJK SC"/>
+              </a:rPr>
+              <a:t>] </a:t>
+            </a:r>
+            <a:endParaRPr b="0" lang="en-US" sz="1050" spc="-1" strike="noStrike">
+              <a:latin typeface="Arial"/>
+            </a:endParaRPr>
+          </a:p>
+          <a:p>
+            <a:pPr>
+              <a:lnSpc>
+                <a:spcPts val="1426"/>
+              </a:lnSpc>
+              <a:spcBef>
+                <a:spcPts val="1417"/>
+              </a:spcBef>
+              <a:buNone/>
+            </a:pPr>
+            <a:r>
+              <a:rPr b="0" lang="en-SG" sz="1050" spc="-1" strike="noStrike">
+                <a:solidFill>
+                  <a:srgbClr val="9cdcfe"/>
+                </a:solidFill>
+                <a:latin typeface="Droid Sans Mono;monospace"/>
+                <a:ea typeface="Noto Sans CJK SC"/>
+              </a:rPr>
               <a:t>p</a:t>
             </a:r>
             <a:r>
@@ -29300,7 +29420,7 @@
                 <a:latin typeface="Droid Sans Mono;monospace"/>
                 <a:ea typeface="Noto Sans CJK SC"/>
               </a:rPr>
-              <a:t># shape = (112), cluster labels are in p after clustering on all the PCs of the features.</a:t>
+              <a:t># shape = (112), cluster labels are in p after clustering on all the PCs of the stock ids. Feature in PCA documentaiton is stock id.</a:t>
             </a:r>
             <a:endParaRPr b="0" lang="en-US" sz="1050" spc="-1" strike="noStrike">
               <a:latin typeface="Arial"/>
@@ -29372,7 +29492,7 @@
         <p:spPr>
           <a:xfrm>
             <a:off x="838080" y="365040"/>
-            <a:ext cx="10513080" cy="1323000"/>
+            <a:ext cx="10512720" cy="1322640"/>
           </a:xfrm>
           <a:prstGeom prst="rect">
             <a:avLst/>
@@ -29438,7 +29558,7 @@
         <p:spPr>
           <a:xfrm>
             <a:off x="838080" y="1825560"/>
-            <a:ext cx="10760040" cy="4745160"/>
+            <a:ext cx="10759680" cy="4744800"/>
           </a:xfrm>
           <a:prstGeom prst="rect">
             <a:avLst/>
@@ -29469,7 +29589,7 @@
                 </a:solidFill>
                 <a:latin typeface="Consolas"/>
               </a:rPr>
-              <a:t>1.The above code finds PCA wth 112 Pcs. PCA computes a matrix c by multiplying the principal components (pca.components_) by the square root of the singular values (pca.singular_values_). This is a common way to obtain the principal components scaled by the corresponding singular values.</a:t>
+              <a:t>1.The above code finds PCA wth 112 Pcs. PCA computes a matrix c by multiplying the principal components (pca.components_) by the square root of the singular values (pca.singular_values_). This is a common way to obtain the principal components scaled by the corresponding singular values importance (&gt;&gt; 0).</a:t>
             </a:r>
             <a:endParaRPr b="0" lang="en-US" sz="1000" spc="-1" strike="noStrike">
               <a:latin typeface="Arial"/>
@@ -29493,7 +29613,7 @@
                 <a:latin typeface="Consolas"/>
                 <a:ea typeface="Noto Sans CJK SC"/>
               </a:rPr>
-              <a:t>Basically, p is just returning cluster labels are in p after clustering on all the PCs of the features. Shape = (112). Note we are clustering over all the Pcs of a feature/stock_id.</a:t>
+              <a:t>Basically, p is just returning cluster labels are in p after clustering on all the PCs of the features. Shape = (112). Note we are clustering over all the Pcs of a stock_id.</a:t>
             </a:r>
             <a:endParaRPr b="0" lang="en-US" sz="1000" spc="-1" strike="noStrike">
               <a:latin typeface="Arial"/>
@@ -29674,7 +29794,7 @@
         <p:spPr>
           <a:xfrm>
             <a:off x="3778200" y="2779200"/>
-            <a:ext cx="2687760" cy="2057400"/>
+            <a:ext cx="2687400" cy="2057040"/>
           </a:xfrm>
           <a:prstGeom prst="rect">
             <a:avLst/>
@@ -29734,7 +29854,7 @@
         <p:spPr>
           <a:xfrm>
             <a:off x="838080" y="365040"/>
-            <a:ext cx="10513080" cy="1323000"/>
+            <a:ext cx="10512720" cy="1322640"/>
           </a:xfrm>
           <a:prstGeom prst="rect">
             <a:avLst/>
@@ -29800,7 +29920,7 @@
         <p:spPr>
           <a:xfrm>
             <a:off x="838080" y="1825560"/>
-            <a:ext cx="10760040" cy="4745160"/>
+            <a:ext cx="10759680" cy="4744800"/>
           </a:xfrm>
           <a:prstGeom prst="rect">
             <a:avLst/>
@@ -29889,7 +30009,7 @@
         <p:spPr>
           <a:xfrm>
             <a:off x="838080" y="365040"/>
-            <a:ext cx="10513080" cy="1323000"/>
+            <a:ext cx="10512720" cy="1322640"/>
           </a:xfrm>
           <a:prstGeom prst="rect">
             <a:avLst/>
@@ -29955,7 +30075,7 @@
         <p:spPr>
           <a:xfrm>
             <a:off x="838080" y="1825560"/>
-            <a:ext cx="10760040" cy="4745160"/>
+            <a:ext cx="10759680" cy="4744800"/>
           </a:xfrm>
           <a:prstGeom prst="rect">
             <a:avLst/>
@@ -30044,7 +30164,7 @@
         <p:spPr>
           <a:xfrm>
             <a:off x="838080" y="365040"/>
-            <a:ext cx="10513080" cy="1323000"/>
+            <a:ext cx="10512720" cy="1322640"/>
           </a:xfrm>
           <a:prstGeom prst="rect">
             <a:avLst/>
@@ -30110,7 +30230,7 @@
         <p:spPr>
           <a:xfrm>
             <a:off x="838080" y="1825560"/>
-            <a:ext cx="10760040" cy="4745160"/>
+            <a:ext cx="10759680" cy="4744800"/>
           </a:xfrm>
           <a:prstGeom prst="rect">
             <a:avLst/>
@@ -30402,7 +30522,7 @@
         <p:spPr>
           <a:xfrm>
             <a:off x="838080" y="365040"/>
-            <a:ext cx="10513080" cy="1323000"/>
+            <a:ext cx="10512720" cy="1322640"/>
           </a:xfrm>
           <a:prstGeom prst="rect">
             <a:avLst/>
@@ -30468,7 +30588,7 @@
         <p:spPr>
           <a:xfrm>
             <a:off x="838080" y="1825560"/>
-            <a:ext cx="10760040" cy="4745160"/>
+            <a:ext cx="10759680" cy="4744800"/>
           </a:xfrm>
           <a:prstGeom prst="rect">
             <a:avLst/>
@@ -31145,7 +31265,7 @@
         <p:spPr>
           <a:xfrm>
             <a:off x="838080" y="365040"/>
-            <a:ext cx="10513080" cy="1323000"/>
+            <a:ext cx="10512720" cy="1322640"/>
           </a:xfrm>
           <a:prstGeom prst="rect">
             <a:avLst/>
@@ -31211,7 +31331,7 @@
         <p:spPr>
           <a:xfrm>
             <a:off x="838080" y="1825560"/>
-            <a:ext cx="10760040" cy="4745160"/>
+            <a:ext cx="10759680" cy="4744800"/>
           </a:xfrm>
           <a:prstGeom prst="rect">
             <a:avLst/>
@@ -31289,7 +31409,7 @@
         <p:spPr>
           <a:xfrm>
             <a:off x="185760" y="2618280"/>
-            <a:ext cx="11818080" cy="8044920"/>
+            <a:ext cx="11817720" cy="8044920"/>
           </a:xfrm>
           <a:prstGeom prst="rect">
             <a:avLst/>
@@ -31673,7 +31793,7 @@
         <p:spPr>
           <a:xfrm>
             <a:off x="6289560" y="105840"/>
-            <a:ext cx="4817520" cy="594360"/>
+            <a:ext cx="4817160" cy="594000"/>
           </a:xfrm>
           <a:prstGeom prst="rect">
             <a:avLst/>
@@ -31696,7 +31816,7 @@
         <p:spPr>
           <a:xfrm>
             <a:off x="7717320" y="906480"/>
-            <a:ext cx="1502640" cy="588240"/>
+            <a:ext cx="1502280" cy="587880"/>
           </a:xfrm>
           <a:prstGeom prst="rect">
             <a:avLst/>
@@ -31719,7 +31839,7 @@
         <p:spPr>
           <a:xfrm>
             <a:off x="7755480" y="1700640"/>
-            <a:ext cx="1426320" cy="689760"/>
+            <a:ext cx="1425960" cy="689400"/>
           </a:xfrm>
           <a:prstGeom prst="rect">
             <a:avLst/>
@@ -31738,7 +31858,7 @@
         <p:spPr>
           <a:xfrm>
             <a:off x="9292320" y="832320"/>
-            <a:ext cx="2317320" cy="363960"/>
+            <a:ext cx="2316960" cy="363960"/>
           </a:xfrm>
           <a:prstGeom prst="rect">
             <a:avLst/>
@@ -31831,7 +31951,7 @@
         <p:spPr>
           <a:xfrm>
             <a:off x="838080" y="365040"/>
-            <a:ext cx="10513080" cy="1323000"/>
+            <a:ext cx="10512720" cy="1322640"/>
           </a:xfrm>
           <a:prstGeom prst="rect">
             <a:avLst/>
@@ -31897,7 +32017,7 @@
         <p:spPr>
           <a:xfrm>
             <a:off x="838080" y="1825560"/>
-            <a:ext cx="10760040" cy="4745160"/>
+            <a:ext cx="10759680" cy="4744800"/>
           </a:xfrm>
           <a:prstGeom prst="rect">
             <a:avLst/>
@@ -31986,7 +32106,7 @@
         <p:spPr>
           <a:xfrm>
             <a:off x="838080" y="365040"/>
-            <a:ext cx="10513080" cy="1323000"/>
+            <a:ext cx="10512720" cy="1322640"/>
           </a:xfrm>
           <a:prstGeom prst="rect">
             <a:avLst/>
@@ -32052,7 +32172,7 @@
         <p:spPr>
           <a:xfrm>
             <a:off x="838080" y="1825560"/>
-            <a:ext cx="10760040" cy="4745160"/>
+            <a:ext cx="10759680" cy="4744800"/>
           </a:xfrm>
           <a:prstGeom prst="rect">
             <a:avLst/>
@@ -32141,7 +32261,7 @@
         <p:spPr>
           <a:xfrm>
             <a:off x="838080" y="365040"/>
-            <a:ext cx="10513080" cy="1323000"/>
+            <a:ext cx="10512720" cy="1322640"/>
           </a:xfrm>
           <a:prstGeom prst="rect">
             <a:avLst/>
@@ -32207,7 +32327,7 @@
         <p:spPr>
           <a:xfrm>
             <a:off x="838080" y="1825560"/>
-            <a:ext cx="10760040" cy="4745160"/>
+            <a:ext cx="10759680" cy="4744800"/>
           </a:xfrm>
           <a:prstGeom prst="rect">
             <a:avLst/>
@@ -32296,7 +32416,7 @@
         <p:spPr>
           <a:xfrm>
             <a:off x="838080" y="365040"/>
-            <a:ext cx="10513080" cy="1323000"/>
+            <a:ext cx="10512720" cy="1322640"/>
           </a:xfrm>
           <a:prstGeom prst="rect">
             <a:avLst/>
@@ -32362,7 +32482,7 @@
         <p:spPr>
           <a:xfrm>
             <a:off x="838080" y="1825560"/>
-            <a:ext cx="10760040" cy="4745160"/>
+            <a:ext cx="10759680" cy="4744800"/>
           </a:xfrm>
           <a:prstGeom prst="rect">
             <a:avLst/>
@@ -32451,7 +32571,7 @@
         <p:spPr>
           <a:xfrm>
             <a:off x="838080" y="365040"/>
-            <a:ext cx="10513080" cy="1323000"/>
+            <a:ext cx="10512720" cy="1322640"/>
           </a:xfrm>
           <a:prstGeom prst="rect">
             <a:avLst/>
@@ -32517,7 +32637,7 @@
         <p:spPr>
           <a:xfrm>
             <a:off x="838080" y="1825560"/>
-            <a:ext cx="10760040" cy="4745160"/>
+            <a:ext cx="10759680" cy="4744800"/>
           </a:xfrm>
           <a:prstGeom prst="rect">
             <a:avLst/>
@@ -32606,7 +32726,7 @@
         <p:spPr>
           <a:xfrm>
             <a:off x="838080" y="365040"/>
-            <a:ext cx="10513080" cy="1323000"/>
+            <a:ext cx="10512720" cy="1322640"/>
           </a:xfrm>
           <a:prstGeom prst="rect">
             <a:avLst/>
@@ -32672,7 +32792,7 @@
         <p:spPr>
           <a:xfrm>
             <a:off x="838080" y="1825560"/>
-            <a:ext cx="10760040" cy="4745160"/>
+            <a:ext cx="10759680" cy="4744800"/>
           </a:xfrm>
           <a:prstGeom prst="rect">
             <a:avLst/>
@@ -32761,7 +32881,7 @@
         <p:spPr>
           <a:xfrm>
             <a:off x="838080" y="365040"/>
-            <a:ext cx="10513080" cy="1323000"/>
+            <a:ext cx="10512720" cy="1322640"/>
           </a:xfrm>
           <a:prstGeom prst="rect">
             <a:avLst/>
@@ -32827,7 +32947,7 @@
         <p:spPr>
           <a:xfrm>
             <a:off x="838080" y="1825560"/>
-            <a:ext cx="10760040" cy="4745160"/>
+            <a:ext cx="10759680" cy="4744800"/>
           </a:xfrm>
           <a:prstGeom prst="rect">
             <a:avLst/>
@@ -32916,7 +33036,7 @@
         <p:spPr>
           <a:xfrm>
             <a:off x="838080" y="365040"/>
-            <a:ext cx="10513080" cy="1323000"/>
+            <a:ext cx="10512720" cy="1322640"/>
           </a:xfrm>
           <a:prstGeom prst="rect">
             <a:avLst/>
@@ -32982,7 +33102,7 @@
         <p:spPr>
           <a:xfrm>
             <a:off x="838080" y="1825560"/>
-            <a:ext cx="10760040" cy="4745160"/>
+            <a:ext cx="10759680" cy="4744800"/>
           </a:xfrm>
           <a:prstGeom prst="rect">
             <a:avLst/>
@@ -33071,7 +33191,7 @@
         <p:spPr>
           <a:xfrm>
             <a:off x="838080" y="365040"/>
-            <a:ext cx="10513080" cy="1323000"/>
+            <a:ext cx="10512720" cy="1322640"/>
           </a:xfrm>
           <a:prstGeom prst="rect">
             <a:avLst/>
@@ -33137,7 +33257,7 @@
         <p:spPr>
           <a:xfrm>
             <a:off x="838080" y="1825560"/>
-            <a:ext cx="10760040" cy="4745160"/>
+            <a:ext cx="10759680" cy="4744800"/>
           </a:xfrm>
           <a:prstGeom prst="rect">
             <a:avLst/>
@@ -33226,7 +33346,7 @@
         <p:spPr>
           <a:xfrm>
             <a:off x="838080" y="365040"/>
-            <a:ext cx="10513080" cy="1323000"/>
+            <a:ext cx="10512720" cy="1322640"/>
           </a:xfrm>
           <a:prstGeom prst="rect">
             <a:avLst/>
@@ -33292,7 +33412,7 @@
         <p:spPr>
           <a:xfrm>
             <a:off x="838080" y="1825560"/>
-            <a:ext cx="10760040" cy="4745160"/>
+            <a:ext cx="10759680" cy="4744800"/>
           </a:xfrm>
           <a:prstGeom prst="rect">
             <a:avLst/>
@@ -33370,7 +33490,7 @@
         <p:spPr>
           <a:xfrm>
             <a:off x="190440" y="444600"/>
-            <a:ext cx="5369760" cy="1735560"/>
+            <a:ext cx="5369400" cy="1735560"/>
           </a:xfrm>
           <a:prstGeom prst="rect">
             <a:avLst/>
@@ -33467,7 +33587,7 @@
         <p:spPr>
           <a:xfrm>
             <a:off x="190440" y="2323080"/>
-            <a:ext cx="5369760" cy="912600"/>
+            <a:ext cx="5369400" cy="912600"/>
           </a:xfrm>
           <a:prstGeom prst="rect">
             <a:avLst/>
@@ -33535,7 +33655,7 @@
         <p:spPr>
           <a:xfrm>
             <a:off x="190440" y="3371040"/>
-            <a:ext cx="5369760" cy="2284200"/>
+            <a:ext cx="5369400" cy="2284200"/>
           </a:xfrm>
           <a:prstGeom prst="rect">
             <a:avLst/>
@@ -33590,7 +33710,7 @@
         <p:spPr>
           <a:xfrm>
             <a:off x="190440" y="5356080"/>
-            <a:ext cx="5369760" cy="1735560"/>
+            <a:ext cx="5369400" cy="1735560"/>
           </a:xfrm>
           <a:prstGeom prst="rect">
             <a:avLst/>
@@ -33645,7 +33765,7 @@
         <p:spPr>
           <a:xfrm>
             <a:off x="6337440" y="318600"/>
-            <a:ext cx="5369760" cy="2832840"/>
+            <a:ext cx="5369400" cy="2832840"/>
           </a:xfrm>
           <a:prstGeom prst="rect">
             <a:avLst/>
@@ -33805,7 +33925,7 @@
         <p:spPr>
           <a:xfrm>
             <a:off x="838080" y="365040"/>
-            <a:ext cx="10513080" cy="1323000"/>
+            <a:ext cx="10512720" cy="1322640"/>
           </a:xfrm>
           <a:prstGeom prst="rect">
             <a:avLst/>
@@ -33871,7 +33991,7 @@
         <p:spPr>
           <a:xfrm>
             <a:off x="838080" y="1825560"/>
-            <a:ext cx="10760040" cy="4745160"/>
+            <a:ext cx="10759680" cy="4744800"/>
           </a:xfrm>
           <a:prstGeom prst="rect">
             <a:avLst/>
@@ -33960,7 +34080,7 @@
         <p:spPr>
           <a:xfrm>
             <a:off x="838080" y="365040"/>
-            <a:ext cx="10513080" cy="1323000"/>
+            <a:ext cx="10512720" cy="1322640"/>
           </a:xfrm>
           <a:prstGeom prst="rect">
             <a:avLst/>
@@ -34026,7 +34146,7 @@
         <p:spPr>
           <a:xfrm>
             <a:off x="838080" y="1825560"/>
-            <a:ext cx="10760040" cy="4745160"/>
+            <a:ext cx="10759680" cy="4744800"/>
           </a:xfrm>
           <a:prstGeom prst="rect">
             <a:avLst/>
@@ -34115,7 +34235,7 @@
         <p:spPr>
           <a:xfrm>
             <a:off x="838080" y="365040"/>
-            <a:ext cx="10513080" cy="1323000"/>
+            <a:ext cx="10512720" cy="1322640"/>
           </a:xfrm>
           <a:prstGeom prst="rect">
             <a:avLst/>
@@ -34181,7 +34301,7 @@
         <p:spPr>
           <a:xfrm>
             <a:off x="838080" y="1825560"/>
-            <a:ext cx="10760040" cy="4745160"/>
+            <a:ext cx="10759680" cy="4744800"/>
           </a:xfrm>
           <a:prstGeom prst="rect">
             <a:avLst/>
@@ -34270,7 +34390,7 @@
         <p:spPr>
           <a:xfrm>
             <a:off x="838080" y="365040"/>
-            <a:ext cx="10513080" cy="1323000"/>
+            <a:ext cx="10512720" cy="1322640"/>
           </a:xfrm>
           <a:prstGeom prst="rect">
             <a:avLst/>
@@ -34336,7 +34456,7 @@
         <p:spPr>
           <a:xfrm>
             <a:off x="838080" y="1825560"/>
-            <a:ext cx="10760040" cy="4745160"/>
+            <a:ext cx="10759680" cy="4744800"/>
           </a:xfrm>
           <a:prstGeom prst="rect">
             <a:avLst/>
@@ -34425,7 +34545,7 @@
         <p:spPr>
           <a:xfrm>
             <a:off x="838080" y="365040"/>
-            <a:ext cx="10513080" cy="1323000"/>
+            <a:ext cx="10512720" cy="1322640"/>
           </a:xfrm>
           <a:prstGeom prst="rect">
             <a:avLst/>
@@ -34491,7 +34611,7 @@
         <p:spPr>
           <a:xfrm>
             <a:off x="838080" y="1825560"/>
-            <a:ext cx="10760040" cy="4745160"/>
+            <a:ext cx="10759680" cy="4744800"/>
           </a:xfrm>
           <a:prstGeom prst="rect">
             <a:avLst/>
@@ -34580,7 +34700,7 @@
         <p:spPr>
           <a:xfrm>
             <a:off x="838080" y="365040"/>
-            <a:ext cx="10513080" cy="1323000"/>
+            <a:ext cx="10512720" cy="1322640"/>
           </a:xfrm>
           <a:prstGeom prst="rect">
             <a:avLst/>
@@ -34646,7 +34766,7 @@
         <p:spPr>
           <a:xfrm>
             <a:off x="838080" y="1825560"/>
-            <a:ext cx="10760040" cy="4745160"/>
+            <a:ext cx="10759680" cy="4744800"/>
           </a:xfrm>
           <a:prstGeom prst="rect">
             <a:avLst/>
@@ -34735,7 +34855,7 @@
         <p:spPr>
           <a:xfrm>
             <a:off x="838080" y="365040"/>
-            <a:ext cx="10513080" cy="1323000"/>
+            <a:ext cx="10512720" cy="1322640"/>
           </a:xfrm>
           <a:prstGeom prst="rect">
             <a:avLst/>
@@ -34784,7 +34904,7 @@
         <p:spPr>
           <a:xfrm>
             <a:off x="838080" y="1825560"/>
-            <a:ext cx="10760040" cy="4745160"/>
+            <a:ext cx="10759680" cy="4744800"/>
           </a:xfrm>
           <a:prstGeom prst="rect">
             <a:avLst/>
@@ -34873,7 +34993,7 @@
         <p:spPr>
           <a:xfrm>
             <a:off x="838080" y="365040"/>
-            <a:ext cx="10513080" cy="1323000"/>
+            <a:ext cx="10512720" cy="1322640"/>
           </a:xfrm>
           <a:prstGeom prst="rect">
             <a:avLst/>
@@ -34922,7 +35042,7 @@
         <p:spPr>
           <a:xfrm>
             <a:off x="838080" y="1825560"/>
-            <a:ext cx="10760040" cy="4745160"/>
+            <a:ext cx="10759680" cy="4744800"/>
           </a:xfrm>
           <a:prstGeom prst="rect">
             <a:avLst/>
@@ -35011,7 +35131,7 @@
         <p:spPr>
           <a:xfrm>
             <a:off x="838080" y="365040"/>
-            <a:ext cx="10513080" cy="1323000"/>
+            <a:ext cx="10512720" cy="1322640"/>
           </a:xfrm>
           <a:prstGeom prst="rect">
             <a:avLst/>
@@ -35060,7 +35180,7 @@
         <p:spPr>
           <a:xfrm>
             <a:off x="838080" y="1825560"/>
-            <a:ext cx="10760040" cy="4745160"/>
+            <a:ext cx="10759680" cy="4744800"/>
           </a:xfrm>
           <a:prstGeom prst="rect">
             <a:avLst/>
@@ -35149,7 +35269,7 @@
         <p:spPr>
           <a:xfrm>
             <a:off x="838080" y="365040"/>
-            <a:ext cx="10513080" cy="1323000"/>
+            <a:ext cx="10512720" cy="1322640"/>
           </a:xfrm>
           <a:prstGeom prst="rect">
             <a:avLst/>
@@ -35198,7 +35318,7 @@
         <p:spPr>
           <a:xfrm>
             <a:off x="838080" y="1825560"/>
-            <a:ext cx="10760040" cy="4745160"/>
+            <a:ext cx="10759680" cy="4744800"/>
           </a:xfrm>
           <a:prstGeom prst="rect">
             <a:avLst/>
@@ -35276,7 +35396,7 @@
         <p:spPr>
           <a:xfrm>
             <a:off x="202680" y="147240"/>
-            <a:ext cx="989640" cy="638280"/>
+            <a:ext cx="989280" cy="638280"/>
           </a:xfrm>
           <a:prstGeom prst="rect">
             <a:avLst/>
@@ -35331,7 +35451,7 @@
         <p:spPr>
           <a:xfrm>
             <a:off x="1283040" y="1018080"/>
-            <a:ext cx="911880" cy="911880"/>
+            <a:ext cx="911520" cy="911520"/>
           </a:xfrm>
           <a:prstGeom prst="roundRect">
             <a:avLst>
@@ -35400,7 +35520,7 @@
         <p:spPr>
           <a:xfrm>
             <a:off x="243720" y="5844240"/>
-            <a:ext cx="911880" cy="911880"/>
+            <a:ext cx="911520" cy="911520"/>
           </a:xfrm>
           <a:prstGeom prst="roundRect">
             <a:avLst>
@@ -35468,8 +35588,8 @@
         </p:nvSpPr>
         <p:spPr>
           <a:xfrm flipH="1" rot="16200000">
-            <a:off x="650520" y="842400"/>
-            <a:ext cx="678960" cy="581760"/>
+            <a:off x="650160" y="842400"/>
+            <a:ext cx="678600" cy="581400"/>
           </a:xfrm>
           <a:prstGeom prst="bentConnector2">
             <a:avLst/>
@@ -35504,7 +35624,7 @@
         <p:spPr>
           <a:xfrm flipH="1" rot="16200000">
             <a:off x="-1824480" y="3317400"/>
-            <a:ext cx="5047920" cy="360"/>
+            <a:ext cx="5047560" cy="360"/>
           </a:xfrm>
           <a:prstGeom prst="bentConnector3">
             <a:avLst>
@@ -35541,7 +35661,7 @@
         <p:spPr>
           <a:xfrm>
             <a:off x="2660040" y="83520"/>
-            <a:ext cx="5697360" cy="5891400"/>
+            <a:ext cx="5697000" cy="5891040"/>
           </a:xfrm>
           <a:prstGeom prst="roundRect">
             <a:avLst>
@@ -35952,7 +36072,7 @@
         <p:spPr>
           <a:xfrm>
             <a:off x="8427960" y="479520"/>
-            <a:ext cx="3514320" cy="1348200"/>
+            <a:ext cx="3513960" cy="1347840"/>
           </a:xfrm>
           <a:prstGeom prst="rect">
             <a:avLst/>
@@ -35975,7 +36095,7 @@
         <p:spPr>
           <a:xfrm>
             <a:off x="8427960" y="2002680"/>
-            <a:ext cx="3506760" cy="1601640"/>
+            <a:ext cx="3506400" cy="1601280"/>
           </a:xfrm>
           <a:prstGeom prst="rect">
             <a:avLst/>
@@ -35998,7 +36118,7 @@
         <p:spPr>
           <a:xfrm>
             <a:off x="8427960" y="3779640"/>
-            <a:ext cx="2627640" cy="937080"/>
+            <a:ext cx="2627280" cy="936720"/>
           </a:xfrm>
           <a:prstGeom prst="rect">
             <a:avLst/>
@@ -36021,7 +36141,7 @@
         <p:spPr>
           <a:xfrm>
             <a:off x="8427960" y="4827960"/>
-            <a:ext cx="2080440" cy="1146960"/>
+            <a:ext cx="2080080" cy="1146600"/>
           </a:xfrm>
           <a:prstGeom prst="rect">
             <a:avLst/>
@@ -36074,7 +36194,7 @@
         <p:spPr>
           <a:xfrm>
             <a:off x="838080" y="365040"/>
-            <a:ext cx="10513080" cy="1323000"/>
+            <a:ext cx="10512720" cy="1322640"/>
           </a:xfrm>
           <a:prstGeom prst="rect">
             <a:avLst/>
@@ -36123,7 +36243,7 @@
         <p:spPr>
           <a:xfrm>
             <a:off x="838080" y="1825560"/>
-            <a:ext cx="10513080" cy="4917960"/>
+            <a:ext cx="10512720" cy="4917600"/>
           </a:xfrm>
           <a:prstGeom prst="rect">
             <a:avLst/>
@@ -36432,7 +36552,7 @@
         <p:spPr>
           <a:xfrm>
             <a:off x="8089920" y="6279840"/>
-            <a:ext cx="3921840" cy="423720"/>
+            <a:ext cx="3921480" cy="423360"/>
           </a:xfrm>
           <a:prstGeom prst="rect">
             <a:avLst/>
@@ -36485,7 +36605,7 @@
         <p:spPr>
           <a:xfrm>
             <a:off x="838080" y="365040"/>
-            <a:ext cx="10513080" cy="1323000"/>
+            <a:ext cx="10512720" cy="1322640"/>
           </a:xfrm>
           <a:prstGeom prst="rect">
             <a:avLst/>
@@ -36534,7 +36654,7 @@
         <p:spPr>
           <a:xfrm>
             <a:off x="838080" y="1825560"/>
-            <a:ext cx="10513080" cy="4938480"/>
+            <a:ext cx="10512720" cy="4938120"/>
           </a:xfrm>
           <a:prstGeom prst="rect">
             <a:avLst/>
@@ -36838,7 +36958,7 @@
         <p:spPr>
           <a:xfrm>
             <a:off x="838080" y="365040"/>
-            <a:ext cx="10513080" cy="1323000"/>
+            <a:ext cx="10512720" cy="1322640"/>
           </a:xfrm>
           <a:prstGeom prst="rect">
             <a:avLst/>
@@ -36887,7 +37007,7 @@
         <p:spPr>
           <a:xfrm>
             <a:off x="838080" y="1825560"/>
-            <a:ext cx="10513080" cy="5121360"/>
+            <a:ext cx="10512720" cy="5121000"/>
           </a:xfrm>
           <a:prstGeom prst="rect">
             <a:avLst/>
@@ -37093,7 +37213,7 @@
         <p:spPr>
           <a:xfrm>
             <a:off x="1236240" y="4067280"/>
-            <a:ext cx="8291160" cy="1661040"/>
+            <a:ext cx="8290800" cy="1660680"/>
           </a:xfrm>
           <a:prstGeom prst="rect">
             <a:avLst/>
@@ -37146,7 +37266,7 @@
         <p:spPr>
           <a:xfrm>
             <a:off x="838080" y="365040"/>
-            <a:ext cx="10513080" cy="1323000"/>
+            <a:ext cx="10512720" cy="1322640"/>
           </a:xfrm>
           <a:prstGeom prst="rect">
             <a:avLst/>
@@ -37195,7 +37315,7 @@
         <p:spPr>
           <a:xfrm>
             <a:off x="838080" y="1825560"/>
-            <a:ext cx="10513080" cy="4877280"/>
+            <a:ext cx="10512720" cy="4876920"/>
           </a:xfrm>
           <a:prstGeom prst="rect">
             <a:avLst/>

</xml_diff>

<commit_message>
finsished feature engineering and added comments to each of the features
</commit_message>
<xml_diff>
--- a/docs/Project_help_n_ideas.pptx
+++ b/docs/Project_help_n_ideas.pptx
@@ -53,8 +53,6 @@
     <p:sldId id="300" r:id="rId48"/>
     <p:sldId id="301" r:id="rId49"/>
     <p:sldId id="302" r:id="rId50"/>
-    <p:sldId id="303" r:id="rId51"/>
-    <p:sldId id="304" r:id="rId52"/>
   </p:sldIdLst>
   <p:sldSz cx="12192000" cy="6858000"/>
   <p:notesSz cx="7772400" cy="10058400"/>
@@ -112,7 +110,7 @@
         <p:txBody>
           <a:bodyPr/>
           <a:p>
-            <a:fld id="{A7963331-4D96-4062-800E-692377038F8E}" type="slidenum">
+            <a:fld id="{BBC1A291-027F-407E-875D-6EB901729CB6}" type="slidenum">
               <a:t>&lt;#&gt;</a:t>
             </a:fld>
           </a:p>
@@ -300,7 +298,7 @@
         <p:txBody>
           <a:bodyPr/>
           <a:p>
-            <a:fld id="{BFE49F09-1442-4996-B044-9CEECDF51268}" type="slidenum">
+            <a:fld id="{77D02882-73D2-4BF1-B0DD-B8758D14C1FC}" type="slidenum">
               <a:t>&lt;#&gt;</a:t>
             </a:fld>
           </a:p>
@@ -556,7 +554,7 @@
         <p:txBody>
           <a:bodyPr/>
           <a:p>
-            <a:fld id="{C66109EA-931A-4CD6-AF04-BCFF4D80CE4B}" type="slidenum">
+            <a:fld id="{0C2B6CEE-402C-4E78-8E4C-6D13F8A49C12}" type="slidenum">
               <a:t>&lt;#&gt;</a:t>
             </a:fld>
           </a:p>
@@ -880,7 +878,7 @@
         <p:txBody>
           <a:bodyPr/>
           <a:p>
-            <a:fld id="{B8F1315A-57E3-4F5D-B69D-84497328BC43}" type="slidenum">
+            <a:fld id="{FE24A3BB-EB30-4650-BC81-683656F7E75C}" type="slidenum">
               <a:t>&lt;#&gt;</a:t>
             </a:fld>
           </a:p>
@@ -963,7 +961,7 @@
         <p:txBody>
           <a:bodyPr/>
           <a:p>
-            <a:fld id="{6D652D88-1307-4CEE-95EA-860348734FF7}" type="slidenum">
+            <a:fld id="{63EB15FF-241F-4E6C-902B-16D38B62B14F}" type="slidenum">
               <a:t>&lt;#&gt;</a:t>
             </a:fld>
           </a:p>
@@ -1120,7 +1118,7 @@
         <p:txBody>
           <a:bodyPr/>
           <a:p>
-            <a:fld id="{A83F9D71-1706-48E0-AE94-529FE555EDDB}" type="slidenum">
+            <a:fld id="{567D30C0-C8ED-4F36-BE97-766A936A8B38}" type="slidenum">
               <a:t>&lt;#&gt;</a:t>
             </a:fld>
           </a:p>
@@ -1274,7 +1272,7 @@
         <p:txBody>
           <a:bodyPr/>
           <a:p>
-            <a:fld id="{A2F46537-18FC-4C9F-A82D-1C3CEC80D9B7}" type="slidenum">
+            <a:fld id="{9B2DC456-EA42-409D-B5E8-B9BAB9FD95F7}" type="slidenum">
               <a:t>&lt;#&gt;</a:t>
             </a:fld>
           </a:p>
@@ -1462,7 +1460,7 @@
         <p:txBody>
           <a:bodyPr/>
           <a:p>
-            <a:fld id="{86B2FADC-2EB8-4AF8-8E1B-52D702A2F28F}" type="slidenum">
+            <a:fld id="{1CAF6E38-92E6-478B-8F96-45B7D2DE94A9}" type="slidenum">
               <a:t>&lt;#&gt;</a:t>
             </a:fld>
           </a:p>
@@ -1582,7 +1580,7 @@
         <p:txBody>
           <a:bodyPr/>
           <a:p>
-            <a:fld id="{A839C96F-E734-495C-B711-C6AE01B44CB2}" type="slidenum">
+            <a:fld id="{79DC9F3A-7F15-48A3-837E-24430CB28F2D}" type="slidenum">
               <a:t>&lt;#&gt;</a:t>
             </a:fld>
           </a:p>
@@ -1702,7 +1700,7 @@
         <p:txBody>
           <a:bodyPr/>
           <a:p>
-            <a:fld id="{291DBB36-67D0-4288-A8FF-B60740773AB2}" type="slidenum">
+            <a:fld id="{154C193F-B9D2-45E0-81D9-7DB1BC361403}" type="slidenum">
               <a:t>&lt;#&gt;</a:t>
             </a:fld>
           </a:p>
@@ -1924,7 +1922,7 @@
         <p:txBody>
           <a:bodyPr/>
           <a:p>
-            <a:fld id="{AA443C2E-7C7E-4AB6-89E8-29D51952A129}" type="slidenum">
+            <a:fld id="{95A63651-A419-4D3F-AF08-58F3BAC8835E}" type="slidenum">
               <a:t>&lt;#&gt;</a:t>
             </a:fld>
           </a:p>
@@ -2081,7 +2079,7 @@
         <p:txBody>
           <a:bodyPr/>
           <a:p>
-            <a:fld id="{184AB0DD-5A5D-46D1-850C-410B9E44B63C}" type="slidenum">
+            <a:fld id="{628A5DEF-A5C0-4C7D-8F30-B55BC39B98ED}" type="slidenum">
               <a:t>&lt;#&gt;</a:t>
             </a:fld>
           </a:p>
@@ -2303,7 +2301,7 @@
         <p:txBody>
           <a:bodyPr/>
           <a:p>
-            <a:fld id="{41B6FBA6-A005-4222-AA91-BF17C96B6541}" type="slidenum">
+            <a:fld id="{C367D814-5D58-4850-90E7-78FF64FF2E2D}" type="slidenum">
               <a:t>&lt;#&gt;</a:t>
             </a:fld>
           </a:p>
@@ -2525,7 +2523,7 @@
         <p:txBody>
           <a:bodyPr/>
           <a:p>
-            <a:fld id="{6EAE39CD-6AAE-4916-B9C1-018F3141D50C}" type="slidenum">
+            <a:fld id="{C5E4242B-DC99-403B-942B-9D52B54364DF}" type="slidenum">
               <a:t>&lt;#&gt;</a:t>
             </a:fld>
           </a:p>
@@ -2713,7 +2711,7 @@
         <p:txBody>
           <a:bodyPr/>
           <a:p>
-            <a:fld id="{980F32C9-0840-49AA-AFA2-025D91EEF0A0}" type="slidenum">
+            <a:fld id="{026F2128-94AE-4D0A-B55E-50DDF0CEDC99}" type="slidenum">
               <a:t>&lt;#&gt;</a:t>
             </a:fld>
           </a:p>
@@ -2969,7 +2967,7 @@
         <p:txBody>
           <a:bodyPr/>
           <a:p>
-            <a:fld id="{C4F0D739-83A3-42BD-BDAE-290F21DE0293}" type="slidenum">
+            <a:fld id="{7E6BBFB2-C782-4256-8E76-4730E7536102}" type="slidenum">
               <a:t>&lt;#&gt;</a:t>
             </a:fld>
           </a:p>
@@ -3293,7 +3291,7 @@
         <p:txBody>
           <a:bodyPr/>
           <a:p>
-            <a:fld id="{07AC932E-C8BC-4548-BD8B-44022EE9508F}" type="slidenum">
+            <a:fld id="{F478F617-723B-414D-AF03-0A578722FDBF}" type="slidenum">
               <a:t>&lt;#&gt;</a:t>
             </a:fld>
           </a:p>
@@ -3447,7 +3445,7 @@
         <p:txBody>
           <a:bodyPr/>
           <a:p>
-            <a:fld id="{23800623-7033-4709-8508-16F920787761}" type="slidenum">
+            <a:fld id="{21E0EC7E-2D08-478F-BD46-E51F5752F25D}" type="slidenum">
               <a:t>&lt;#&gt;</a:t>
             </a:fld>
           </a:p>
@@ -3635,7 +3633,7 @@
         <p:txBody>
           <a:bodyPr/>
           <a:p>
-            <a:fld id="{7E3CDF32-78EE-477D-AC39-30DF50B87929}" type="slidenum">
+            <a:fld id="{0CB90A1C-F22E-4A81-BE20-31AC59A810A8}" type="slidenum">
               <a:t>&lt;#&gt;</a:t>
             </a:fld>
           </a:p>
@@ -3755,7 +3753,7 @@
         <p:txBody>
           <a:bodyPr/>
           <a:p>
-            <a:fld id="{013C6800-66FE-4802-9CEA-E50250C0ED44}" type="slidenum">
+            <a:fld id="{CD2E7123-6B0A-4559-B3B6-28AEDE0CA107}" type="slidenum">
               <a:t>&lt;#&gt;</a:t>
             </a:fld>
           </a:p>
@@ -3875,7 +3873,7 @@
         <p:txBody>
           <a:bodyPr/>
           <a:p>
-            <a:fld id="{6AFC7E5D-C6F0-41D2-8B9A-AB439C6818D8}" type="slidenum">
+            <a:fld id="{892696B6-0E61-4AE3-8D1C-785E5137C8CA}" type="slidenum">
               <a:t>&lt;#&gt;</a:t>
             </a:fld>
           </a:p>
@@ -4097,7 +4095,7 @@
         <p:txBody>
           <a:bodyPr/>
           <a:p>
-            <a:fld id="{86FC7D9F-7F94-455C-88F0-54F49D36F661}" type="slidenum">
+            <a:fld id="{67EB5795-D322-4E05-A0A3-E466FFA4A5DF}" type="slidenum">
               <a:t>&lt;#&gt;</a:t>
             </a:fld>
           </a:p>
@@ -4319,7 +4317,7 @@
         <p:txBody>
           <a:bodyPr/>
           <a:p>
-            <a:fld id="{6705B21F-B248-4F29-9F7E-2530FB16074B}" type="slidenum">
+            <a:fld id="{FE5DF9B2-F2C6-4ED2-99E5-76AF74A2BE4F}" type="slidenum">
               <a:t>&lt;#&gt;</a:t>
             </a:fld>
           </a:p>
@@ -4541,7 +4539,7 @@
         <p:txBody>
           <a:bodyPr/>
           <a:p>
-            <a:fld id="{32D9DB48-9739-43F6-AADE-A0941A662EA6}" type="slidenum">
+            <a:fld id="{47085373-099A-495F-B4DD-5BD6E7B73BE9}" type="slidenum">
               <a:t>&lt;#&gt;</a:t>
             </a:fld>
           </a:p>
@@ -4610,7 +4608,7 @@
         <p:spPr>
           <a:xfrm>
             <a:off x="4038480" y="6356520"/>
-            <a:ext cx="4111920" cy="362160"/>
+            <a:ext cx="4111560" cy="361800"/>
           </a:xfrm>
           <a:prstGeom prst="rect">
             <a:avLst/>
@@ -4667,7 +4665,7 @@
         <p:spPr>
           <a:xfrm>
             <a:off x="8610480" y="6356520"/>
-            <a:ext cx="2740320" cy="362160"/>
+            <a:ext cx="2739960" cy="361800"/>
           </a:xfrm>
           <a:prstGeom prst="rect">
             <a:avLst/>
@@ -4702,7 +4700,7 @@
               </a:lnSpc>
               <a:buNone/>
             </a:pPr>
-            <a:fld id="{1C02D604-4C08-487E-AD3B-6F66C734B2D9}" type="slidenum">
+            <a:fld id="{F9A576C3-2DE0-4A85-BD8C-1E39AE5CF046}" type="slidenum">
               <a:rPr b="0" lang="en-SG" sz="1200" spc="-1" strike="noStrike">
                 <a:solidFill>
                   <a:srgbClr val="8b8b8b"/>
@@ -4730,7 +4728,7 @@
         <p:spPr>
           <a:xfrm>
             <a:off x="838080" y="6356520"/>
-            <a:ext cx="2740320" cy="362160"/>
+            <a:ext cx="2739960" cy="361800"/>
           </a:xfrm>
           <a:prstGeom prst="rect">
             <a:avLst/>
@@ -5047,7 +5045,7 @@
         <p:spPr>
           <a:xfrm>
             <a:off x="4038480" y="6356520"/>
-            <a:ext cx="4111920" cy="362160"/>
+            <a:ext cx="4111560" cy="361800"/>
           </a:xfrm>
           <a:prstGeom prst="rect">
             <a:avLst/>
@@ -5104,7 +5102,7 @@
         <p:spPr>
           <a:xfrm>
             <a:off x="8610480" y="6356520"/>
-            <a:ext cx="2740320" cy="362160"/>
+            <a:ext cx="2739960" cy="361800"/>
           </a:xfrm>
           <a:prstGeom prst="rect">
             <a:avLst/>
@@ -5139,7 +5137,7 @@
               </a:lnSpc>
               <a:buNone/>
             </a:pPr>
-            <a:fld id="{6ED35691-0E51-4EE7-8B9D-F5B61B2AA602}" type="slidenum">
+            <a:fld id="{0D17188E-A6E4-4E0E-8B9F-771110D83EC9}" type="slidenum">
               <a:rPr b="0" lang="en-SG" sz="1200" spc="-1" strike="noStrike">
                 <a:solidFill>
                   <a:srgbClr val="8b8b8b"/>
@@ -5167,7 +5165,7 @@
         <p:spPr>
           <a:xfrm>
             <a:off x="838080" y="6356520"/>
-            <a:ext cx="2740320" cy="362160"/>
+            <a:ext cx="2739960" cy="361800"/>
           </a:xfrm>
           <a:prstGeom prst="rect">
             <a:avLst/>
@@ -5477,7 +5475,7 @@
         <p:spPr>
           <a:xfrm>
             <a:off x="1523880" y="1122480"/>
-            <a:ext cx="9141120" cy="2384640"/>
+            <a:ext cx="9140760" cy="2384280"/>
           </a:xfrm>
           <a:prstGeom prst="rect">
             <a:avLst/>
@@ -5526,7 +5524,7 @@
         <p:spPr>
           <a:xfrm>
             <a:off x="1523880" y="3602160"/>
-            <a:ext cx="9141120" cy="1652760"/>
+            <a:ext cx="9140760" cy="1652400"/>
           </a:xfrm>
           <a:prstGeom prst="rect">
             <a:avLst/>
@@ -5611,7 +5609,7 @@
         <p:spPr>
           <a:xfrm>
             <a:off x="838080" y="365040"/>
-            <a:ext cx="10512720" cy="1322640"/>
+            <a:ext cx="10512360" cy="1322280"/>
           </a:xfrm>
           <a:prstGeom prst="rect">
             <a:avLst/>
@@ -5660,7 +5658,7 @@
         <p:spPr>
           <a:xfrm>
             <a:off x="838080" y="1825560"/>
-            <a:ext cx="10512720" cy="4348440"/>
+            <a:ext cx="10512360" cy="4348080"/>
           </a:xfrm>
           <a:prstGeom prst="rect">
             <a:avLst/>
@@ -5818,7 +5816,7 @@
         <p:spPr>
           <a:xfrm>
             <a:off x="838080" y="365040"/>
-            <a:ext cx="10512720" cy="1322640"/>
+            <a:ext cx="10512360" cy="1322280"/>
           </a:xfrm>
           <a:prstGeom prst="rect">
             <a:avLst/>
@@ -5867,7 +5865,7 @@
         <p:spPr>
           <a:xfrm>
             <a:off x="838080" y="1825560"/>
-            <a:ext cx="10512720" cy="4348440"/>
+            <a:ext cx="10512360" cy="4348080"/>
           </a:xfrm>
           <a:prstGeom prst="rect">
             <a:avLst/>
@@ -6008,7 +6006,7 @@
         <p:spPr>
           <a:xfrm>
             <a:off x="202680" y="147240"/>
-            <a:ext cx="989280" cy="638280"/>
+            <a:ext cx="988920" cy="638280"/>
           </a:xfrm>
           <a:prstGeom prst="rect">
             <a:avLst/>
@@ -6063,7 +6061,7 @@
         <p:spPr>
           <a:xfrm>
             <a:off x="1283040" y="1018080"/>
-            <a:ext cx="911520" cy="911520"/>
+            <a:ext cx="911160" cy="911160"/>
           </a:xfrm>
           <a:prstGeom prst="roundRect">
             <a:avLst>
@@ -6132,7 +6130,7 @@
         <p:spPr>
           <a:xfrm>
             <a:off x="243720" y="5844240"/>
-            <a:ext cx="911520" cy="911520"/>
+            <a:ext cx="911160" cy="911160"/>
           </a:xfrm>
           <a:prstGeom prst="roundRect">
             <a:avLst>
@@ -6200,8 +6198,8 @@
         </p:nvSpPr>
         <p:spPr>
           <a:xfrm flipH="1" rot="16200000">
-            <a:off x="650160" y="842400"/>
-            <a:ext cx="678600" cy="581400"/>
+            <a:off x="650520" y="842400"/>
+            <a:ext cx="678240" cy="581040"/>
           </a:xfrm>
           <a:prstGeom prst="bentConnector2">
             <a:avLst/>
@@ -6235,8 +6233,8 @@
         </p:nvSpPr>
         <p:spPr>
           <a:xfrm flipH="1" rot="16200000">
-            <a:off x="-1824480" y="3317400"/>
-            <a:ext cx="5047560" cy="360"/>
+            <a:off x="-1824840" y="3317040"/>
+            <a:ext cx="5047200" cy="360"/>
           </a:xfrm>
           <a:prstGeom prst="bentConnector3">
             <a:avLst>
@@ -6273,7 +6271,7 @@
         <p:spPr>
           <a:xfrm>
             <a:off x="2794680" y="612720"/>
-            <a:ext cx="4779000" cy="2703240"/>
+            <a:ext cx="4778640" cy="2702880"/>
           </a:xfrm>
           <a:prstGeom prst="roundRect">
             <a:avLst>
@@ -6408,7 +6406,7 @@
         <p:spPr>
           <a:xfrm>
             <a:off x="838080" y="365040"/>
-            <a:ext cx="10512720" cy="1322640"/>
+            <a:ext cx="10512360" cy="1322280"/>
           </a:xfrm>
           <a:prstGeom prst="rect">
             <a:avLst/>
@@ -6457,7 +6455,7 @@
         <p:spPr>
           <a:xfrm>
             <a:off x="838080" y="1825560"/>
-            <a:ext cx="10512720" cy="4348440"/>
+            <a:ext cx="10512360" cy="4348080"/>
           </a:xfrm>
           <a:prstGeom prst="rect">
             <a:avLst/>
@@ -6633,7 +6631,7 @@
         <p:spPr>
           <a:xfrm>
             <a:off x="838080" y="365040"/>
-            <a:ext cx="10512720" cy="1322640"/>
+            <a:ext cx="10512360" cy="1322280"/>
           </a:xfrm>
           <a:prstGeom prst="rect">
             <a:avLst/>
@@ -6694,7 +6692,7 @@
         <p:spPr>
           <a:xfrm>
             <a:off x="838080" y="1825560"/>
-            <a:ext cx="10512720" cy="4744800"/>
+            <a:ext cx="10512360" cy="4744440"/>
           </a:xfrm>
           <a:prstGeom prst="rect">
             <a:avLst/>
@@ -9020,7 +9018,7 @@
         <p:spPr>
           <a:xfrm>
             <a:off x="838080" y="365040"/>
-            <a:ext cx="10512720" cy="1322640"/>
+            <a:ext cx="10512360" cy="1322280"/>
           </a:xfrm>
           <a:prstGeom prst="rect">
             <a:avLst/>
@@ -9081,7 +9079,7 @@
         <p:spPr>
           <a:xfrm>
             <a:off x="838080" y="1825560"/>
-            <a:ext cx="10512720" cy="4784760"/>
+            <a:ext cx="10512360" cy="4784400"/>
           </a:xfrm>
           <a:prstGeom prst="rect">
             <a:avLst/>
@@ -9206,25 +9204,7 @@
                 </a:solidFill>
                 <a:latin typeface="Consolas"/>
               </a:rPr>
-              <a:t>This function computes the optimal wap price using a different formula. If wap computed using our formula is different from the optimal </a:t>
-            </a:r>
-            <a:r>
-              <a:rPr b="0" lang="en-SG" sz="1000" spc="-1" strike="noStrike">
-                <a:solidFill>
-                  <a:srgbClr val="cccccc"/>
-                </a:solidFill>
-                <a:latin typeface="Consolas"/>
-              </a:rPr>
-              <a:t>wap price then there it might indicate high or low volatility?? what is difference between wap formula and jager’s bisection algorithm </a:t>
-            </a:r>
-            <a:r>
-              <a:rPr b="0" lang="en-SG" sz="1000" spc="-1" strike="noStrike">
-                <a:solidFill>
-                  <a:srgbClr val="cccccc"/>
-                </a:solidFill>
-                <a:latin typeface="Consolas"/>
-              </a:rPr>
-              <a:t>finding it?</a:t>
+              <a:t>This function computes the optimal wap price using a different formula. If wap computed using our formula is different from the optimal wap price then there it might indicate high or low volatility?? what is difference between wap formula and jager’s bisection algorithm finding it?</a:t>
             </a:r>
             <a:endParaRPr b="0" lang="en-US" sz="1000" spc="-1" strike="noStrike">
               <a:latin typeface="Arial"/>
@@ -9251,16 +9231,7 @@
                 </a:solidFill>
                 <a:latin typeface="Consolas"/>
               </a:rPr>
-              <a:t>the `full_book_wap_bisect` function uses a bisection search algorithm to iteratively narrow down the range of prices and find the </a:t>
-            </a:r>
-            <a:r>
-              <a:rPr b="0" lang="en-US" sz="1000" spc="-1" strike="noStrike">
-                <a:solidFill>
-                  <a:srgbClr val="cccccc"/>
-                </a:solidFill>
-                <a:latin typeface="Consolas"/>
-              </a:rPr>
-              <a:t>weighted average price of a full book based on logarithmic ask and bid prices and their corresponding sizes.</a:t>
+              <a:t>the `full_book_wap_bisect` function uses a bisection search algorithm to iteratively narrow down the range of prices and find the weighted average price of a full book based on logarithmic ask and bid prices and their corresponding sizes.</a:t>
             </a:r>
             <a:r>
               <a:rPr b="0" lang="en-SG" sz="1000" spc="-1" strike="noStrike">
@@ -9292,43 +9263,7 @@
                 </a:solidFill>
                 <a:latin typeface="Consolas"/>
               </a:rPr>
-              <a:t>In the code the wap (equilibrium price) is computed using the function full_book_wap_bisect( df_book, lvl=0) using a bisection algorithm </a:t>
-            </a:r>
-            <a:r>
-              <a:rPr b="0" lang="en-SG" sz="1000" spc="-1" strike="noStrike">
-                <a:solidFill>
-                  <a:srgbClr val="cccccc"/>
-                </a:solidFill>
-                <a:latin typeface="Consolas"/>
-              </a:rPr>
-              <a:t>iteratively and the wap moves towards the price (either bid or ask price) which has bigger bid or ask size and smaller . increasing lvl </a:t>
-            </a:r>
-            <a:r>
-              <a:rPr b="0" lang="en-SG" sz="1000" spc="-1" strike="noStrike">
-                <a:solidFill>
-                  <a:srgbClr val="cccccc"/>
-                </a:solidFill>
-                <a:latin typeface="Consolas"/>
-              </a:rPr>
-              <a:t>increases importance/weight of distance compared to size in f calculation. Higher lvl. Additionally, odd values of lvl make s negative and </a:t>
-            </a:r>
-            <a:r>
-              <a:rPr b="0" lang="en-SG" sz="1000" spc="-1" strike="noStrike">
-                <a:solidFill>
-                  <a:srgbClr val="cccccc"/>
-                </a:solidFill>
-                <a:latin typeface="Consolas"/>
-              </a:rPr>
-              <a:t>if bid size/price &gt; ask size/price then p moves towards ask price. Similarly, opposite is true. For even values, always pushed towards ask </a:t>
-            </a:r>
-            <a:r>
-              <a:rPr b="0" lang="en-SG" sz="1000" spc="-1" strike="noStrike">
-                <a:solidFill>
-                  <a:srgbClr val="cccccc"/>
-                </a:solidFill>
-                <a:latin typeface="Consolas"/>
-              </a:rPr>
-              <a:t>price??</a:t>
+              <a:t>In the code the wap (equilibrium price) is computed using the function full_book_wap_bisect( df_book, lvl=0) using a bisection algorithm iteratively and the wap moves towards the price (either bid or ask price) which has bigger bid or ask size and smaller . increasing lvl increases importance/weight of distance compared to size in f calculation. Higher lvl. Additionally, odd values of lvl make s negative and if bid size/price &gt; ask size/price then p moves towards ask price. Similarly, opposite is true. For even values, always pushed towards ask price??</a:t>
             </a:r>
             <a:endParaRPr b="0" lang="en-US" sz="1000" spc="-1" strike="noStrike">
               <a:latin typeface="Arial"/>
@@ -10674,16 +10609,7 @@
                 </a:solidFill>
                 <a:latin typeface="Consolas"/>
               </a:rPr>
-              <a:t>This calculation appears to be a measure of liquidity, which in finance is a measure of the ability to buy or sell assets without </a:t>
-            </a:r>
-            <a:r>
-              <a:rPr b="0" lang="en-US" sz="1000" spc="-1" strike="noStrike">
-                <a:solidFill>
-                  <a:srgbClr val="cccccc"/>
-                </a:solidFill>
-                <a:latin typeface="Consolas"/>
-              </a:rPr>
-              <a:t>causing a significant change in their price. If log_ask/bid price is far away from wap that means that the asset is not liquid.</a:t>
+              <a:t>This calculation appears to be a measure of liquidity, which in finance is a measure of the ability to buy or sell assets without causing a significant change in their price. If log_ask/bid price is far away from wap that means that the asset is not liquid.</a:t>
             </a:r>
             <a:endParaRPr b="0" lang="en-US" sz="1000" spc="-1" strike="noStrike">
               <a:latin typeface="Arial"/>
@@ -11607,17 +11533,7 @@
                 <a:latin typeface="Consolas"/>
                 <a:ea typeface="Noto Sans CJK SC"/>
               </a:rPr>
-              <a:t>Why is it bid minus ask in the above where liquidity is odd? And bid plus ask when liquidity is even. This is because wapq1 &lt; log_ask1 so </a:t>
-            </a:r>
-            <a:r>
-              <a:rPr b="0" lang="en-SG" sz="1000" spc="-1" strike="noStrike">
-                <a:solidFill>
-                  <a:srgbClr val="cccccc"/>
-                </a:solidFill>
-                <a:latin typeface="Consolas"/>
-                <a:ea typeface="Noto Sans CJK SC"/>
-              </a:rPr>
-              <a:t>wapq1 &lt; log_ask1 is negative and we need to have negative sign to make it positive. </a:t>
+              <a:t>Why is it bid minus ask in the above where liquidity is odd? And bid plus ask when liquidity is even. This is because wapq1 &lt; log_ask1 so wapq1 &lt; log_ask1 is negative and we need to have negative sign to make it positive. </a:t>
             </a:r>
             <a:br>
               <a:rPr sz="1000"/>
@@ -11688,7 +11604,7 @@
         <p:spPr>
           <a:xfrm>
             <a:off x="838080" y="365040"/>
-            <a:ext cx="10512720" cy="1322640"/>
+            <a:ext cx="10512360" cy="1322280"/>
           </a:xfrm>
           <a:prstGeom prst="rect">
             <a:avLst/>
@@ -11749,7 +11665,7 @@
         <p:spPr>
           <a:xfrm>
             <a:off x="838080" y="1825560"/>
-            <a:ext cx="10759680" cy="4744800"/>
+            <a:ext cx="10759320" cy="4744440"/>
           </a:xfrm>
           <a:prstGeom prst="rect">
             <a:avLst/>
@@ -15514,7 +15430,7 @@
         <p:spPr>
           <a:xfrm>
             <a:off x="838080" y="365040"/>
-            <a:ext cx="10512720" cy="1322640"/>
+            <a:ext cx="10512360" cy="1322280"/>
           </a:xfrm>
           <a:prstGeom prst="rect">
             <a:avLst/>
@@ -15575,7 +15491,7 @@
         <p:spPr>
           <a:xfrm>
             <a:off x="838080" y="1825560"/>
-            <a:ext cx="10759680" cy="4744800"/>
+            <a:ext cx="10759320" cy="4744440"/>
           </a:xfrm>
           <a:prstGeom prst="rect">
             <a:avLst/>
@@ -17572,7 +17488,7 @@
         <p:spPr>
           <a:xfrm>
             <a:off x="838080" y="365040"/>
-            <a:ext cx="10512720" cy="1322640"/>
+            <a:ext cx="10512360" cy="1322280"/>
           </a:xfrm>
           <a:prstGeom prst="rect">
             <a:avLst/>
@@ -17633,7 +17549,7 @@
         <p:spPr>
           <a:xfrm>
             <a:off x="838080" y="1825560"/>
-            <a:ext cx="10759680" cy="4744800"/>
+            <a:ext cx="10759320" cy="4744440"/>
           </a:xfrm>
           <a:prstGeom prst="rect">
             <a:avLst/>
@@ -19418,7 +19334,7 @@
         <p:spPr>
           <a:xfrm>
             <a:off x="838080" y="365040"/>
-            <a:ext cx="10512720" cy="1322640"/>
+            <a:ext cx="10512360" cy="1322280"/>
           </a:xfrm>
           <a:prstGeom prst="rect">
             <a:avLst/>
@@ -19479,7 +19395,7 @@
         <p:spPr>
           <a:xfrm>
             <a:off x="838080" y="1825560"/>
-            <a:ext cx="10759680" cy="4744800"/>
+            <a:ext cx="10759320" cy="4744440"/>
           </a:xfrm>
           <a:prstGeom prst="rect">
             <a:avLst/>
@@ -20269,7 +20185,7 @@
         <p:spPr>
           <a:xfrm>
             <a:off x="1776960" y="126000"/>
-            <a:ext cx="8635320" cy="6602760"/>
+            <a:ext cx="8634960" cy="6602400"/>
           </a:xfrm>
           <a:prstGeom prst="rect">
             <a:avLst/>
@@ -20329,7 +20245,7 @@
         <p:spPr>
           <a:xfrm>
             <a:off x="838080" y="365040"/>
-            <a:ext cx="10512720" cy="1322640"/>
+            <a:ext cx="10512360" cy="1322280"/>
           </a:xfrm>
           <a:prstGeom prst="rect">
             <a:avLst/>
@@ -20405,7 +20321,7 @@
         <p:spPr>
           <a:xfrm>
             <a:off x="838080" y="1825560"/>
-            <a:ext cx="10759680" cy="4744800"/>
+            <a:ext cx="10759320" cy="4744440"/>
           </a:xfrm>
           <a:prstGeom prst="rect">
             <a:avLst/>
@@ -22830,7 +22746,7 @@
         <p:spPr>
           <a:xfrm>
             <a:off x="838080" y="365040"/>
-            <a:ext cx="10512720" cy="1322640"/>
+            <a:ext cx="10512360" cy="1322280"/>
           </a:xfrm>
           <a:prstGeom prst="rect">
             <a:avLst/>
@@ -22896,7 +22812,7 @@
         <p:spPr>
           <a:xfrm>
             <a:off x="838080" y="1825560"/>
-            <a:ext cx="10759680" cy="4744800"/>
+            <a:ext cx="10759320" cy="4744440"/>
           </a:xfrm>
           <a:prstGeom prst="rect">
             <a:avLst/>
@@ -25380,7 +25296,7 @@
         <p:spPr>
           <a:xfrm>
             <a:off x="838080" y="365040"/>
-            <a:ext cx="10512720" cy="1322640"/>
+            <a:ext cx="10512360" cy="1322280"/>
           </a:xfrm>
           <a:prstGeom prst="rect">
             <a:avLst/>
@@ -25446,7 +25362,7 @@
         <p:spPr>
           <a:xfrm>
             <a:off x="838080" y="1825560"/>
-            <a:ext cx="10759680" cy="4744800"/>
+            <a:ext cx="10759320" cy="4744440"/>
           </a:xfrm>
           <a:prstGeom prst="rect">
             <a:avLst/>
@@ -27800,7 +27716,7 @@
         <p:spPr>
           <a:xfrm>
             <a:off x="838080" y="365040"/>
-            <a:ext cx="10512720" cy="1322640"/>
+            <a:ext cx="10512360" cy="1322280"/>
           </a:xfrm>
           <a:prstGeom prst="rect">
             <a:avLst/>
@@ -27866,7 +27782,7 @@
         <p:spPr>
           <a:xfrm>
             <a:off x="838080" y="1825560"/>
-            <a:ext cx="10759680" cy="4744800"/>
+            <a:ext cx="10759320" cy="4744440"/>
           </a:xfrm>
           <a:prstGeom prst="rect">
             <a:avLst/>
@@ -29492,7 +29408,7 @@
         <p:spPr>
           <a:xfrm>
             <a:off x="838080" y="365040"/>
-            <a:ext cx="10512720" cy="1322640"/>
+            <a:ext cx="10512360" cy="1322280"/>
           </a:xfrm>
           <a:prstGeom prst="rect">
             <a:avLst/>
@@ -29558,7 +29474,7 @@
         <p:spPr>
           <a:xfrm>
             <a:off x="838080" y="1825560"/>
-            <a:ext cx="10759680" cy="4744800"/>
+            <a:ext cx="10759320" cy="4744440"/>
           </a:xfrm>
           <a:prstGeom prst="rect">
             <a:avLst/>
@@ -29794,7 +29710,7 @@
         <p:spPr>
           <a:xfrm>
             <a:off x="3778200" y="2779200"/>
-            <a:ext cx="2687400" cy="2057040"/>
+            <a:ext cx="2687040" cy="2056680"/>
           </a:xfrm>
           <a:prstGeom prst="rect">
             <a:avLst/>
@@ -29854,7 +29770,7 @@
         <p:spPr>
           <a:xfrm>
             <a:off x="838080" y="365040"/>
-            <a:ext cx="10512720" cy="1322640"/>
+            <a:ext cx="10512360" cy="1322280"/>
           </a:xfrm>
           <a:prstGeom prst="rect">
             <a:avLst/>
@@ -29899,7 +29815,7 @@
                 <a:latin typeface="Consolas"/>
                 <a:ea typeface="Noto Sans CJK SC"/>
               </a:rPr>
-              <a:t>CLUSTERING</a:t>
+              <a:t>Feature Engineering</a:t>
             </a:r>
             <a:endParaRPr b="0" lang="en-US" sz="2400" spc="-1" strike="noStrike">
               <a:latin typeface="Arial"/>
@@ -29920,7 +29836,7 @@
         <p:spPr>
           <a:xfrm>
             <a:off x="838080" y="1825560"/>
-            <a:ext cx="10759680" cy="4744800"/>
+            <a:ext cx="10759320" cy="4744440"/>
           </a:xfrm>
           <a:prstGeom prst="rect">
             <a:avLst/>
@@ -29937,6 +29853,106 @@
           <a:p>
             <a:pPr>
               <a:lnSpc>
+                <a:spcPct val="100000"/>
+              </a:lnSpc>
+              <a:buNone/>
+            </a:pPr>
+            <a:r>
+              <a:rPr b="0" lang="en-SG" sz="1000" spc="-1" strike="noStrike">
+                <a:solidFill>
+                  <a:srgbClr val="cccccc"/>
+                </a:solidFill>
+                <a:latin typeface="Consolas"/>
+              </a:rPr>
+              <a:t>1.</a:t>
+            </a:r>
+            <a:r>
+              <a:rPr b="0" lang="en-SG" sz="1050" spc="-1" strike="noStrike">
+                <a:solidFill>
+                  <a:srgbClr val="9cdcfe"/>
+                </a:solidFill>
+                <a:latin typeface="Droid Sans Mono;monospace"/>
+                <a:ea typeface="Noto Sans CJK SC"/>
+              </a:rPr>
+              <a:t>train_feat</a:t>
+            </a:r>
+            <a:r>
+              <a:rPr b="0" lang="en-SG" sz="1050" spc="-1" strike="noStrike">
+                <a:solidFill>
+                  <a:srgbClr val="cccccc"/>
+                </a:solidFill>
+                <a:latin typeface="Droid Sans Mono;monospace"/>
+                <a:ea typeface="Noto Sans CJK SC"/>
+              </a:rPr>
+              <a:t> </a:t>
+            </a:r>
+            <a:r>
+              <a:rPr b="0" lang="en-SG" sz="1050" spc="-1" strike="noStrike">
+                <a:solidFill>
+                  <a:srgbClr val="d4d4d4"/>
+                </a:solidFill>
+                <a:latin typeface="Droid Sans Mono;monospace"/>
+                <a:ea typeface="Noto Sans CJK SC"/>
+              </a:rPr>
+              <a:t>=</a:t>
+            </a:r>
+            <a:r>
+              <a:rPr b="0" lang="en-SG" sz="1050" spc="-1" strike="noStrike">
+                <a:solidFill>
+                  <a:srgbClr val="cccccc"/>
+                </a:solidFill>
+                <a:latin typeface="Droid Sans Mono;monospace"/>
+                <a:ea typeface="Noto Sans CJK SC"/>
+              </a:rPr>
+              <a:t> </a:t>
+            </a:r>
+            <a:r>
+              <a:rPr b="0" lang="en-SG" sz="1050" spc="-1" strike="noStrike">
+                <a:solidFill>
+                  <a:srgbClr val="dcdcaa"/>
+                </a:solidFill>
+                <a:latin typeface="Droid Sans Mono;monospace"/>
+                <a:ea typeface="Noto Sans CJK SC"/>
+              </a:rPr>
+              <a:t>get_features</a:t>
+            </a:r>
+            <a:r>
+              <a:rPr b="0" lang="en-SG" sz="1050" spc="-1" strike="noStrike">
+                <a:solidFill>
+                  <a:srgbClr val="cccccc"/>
+                </a:solidFill>
+                <a:latin typeface="Droid Sans Mono;monospace"/>
+                <a:ea typeface="Noto Sans CJK SC"/>
+              </a:rPr>
+              <a:t>(</a:t>
+            </a:r>
+            <a:r>
+              <a:rPr b="0" lang="en-SG" sz="1050" spc="-1" strike="noStrike">
+                <a:solidFill>
+                  <a:srgbClr val="9cdcfe"/>
+                </a:solidFill>
+                <a:latin typeface="Droid Sans Mono;monospace"/>
+                <a:ea typeface="Noto Sans CJK SC"/>
+              </a:rPr>
+              <a:t>train_binned</a:t>
+            </a:r>
+            <a:r>
+              <a:rPr b="0" lang="en-SG" sz="1050" spc="-1" strike="noStrike">
+                <a:solidFill>
+                  <a:srgbClr val="cccccc"/>
+                </a:solidFill>
+                <a:latin typeface="Droid Sans Mono;monospace"/>
+                <a:ea typeface="Noto Sans CJK SC"/>
+              </a:rPr>
+              <a:t>)</a:t>
+            </a:r>
+            <a:endParaRPr b="0" lang="en-US" sz="1050" spc="-1" strike="noStrike">
+              <a:latin typeface="Arial"/>
+            </a:endParaRPr>
+          </a:p>
+          <a:p>
+            <a:pPr algn="ctr">
+              <a:lnSpc>
                 <a:spcPct val="90000"/>
               </a:lnSpc>
               <a:spcBef>
@@ -29950,8 +29966,111 @@
                   <a:srgbClr val="cccccc"/>
                 </a:solidFill>
                 <a:latin typeface="Consolas"/>
-              </a:rPr>
-              <a:t>1. </a:t>
+                <a:ea typeface="Noto Sans CJK SC"/>
+              </a:rPr>
+              <a:t>Back Inside </a:t>
+            </a:r>
+            <a:r>
+              <a:rPr b="0" lang="en-SG" sz="1050" spc="-1" strike="noStrike">
+                <a:solidFill>
+                  <a:srgbClr val="cccccc"/>
+                </a:solidFill>
+                <a:latin typeface="Droid Sans Mono;monospace"/>
+                <a:ea typeface="Noto Sans CJK SC"/>
+              </a:rPr>
+              <a:t> </a:t>
+            </a:r>
+            <a:r>
+              <a:rPr b="0" lang="en-SG" sz="1050" spc="-1" strike="noStrike">
+                <a:solidFill>
+                  <a:srgbClr val="dcdcaa"/>
+                </a:solidFill>
+                <a:latin typeface="Droid Sans Mono;monospace"/>
+                <a:ea typeface="Noto Sans CJK SC"/>
+              </a:rPr>
+              <a:t>get_features</a:t>
+            </a:r>
+            <a:r>
+              <a:rPr b="0" lang="en-US" sz="800" spc="-1" strike="noStrike">
+                <a:solidFill>
+                  <a:srgbClr val="cccccc"/>
+                </a:solidFill>
+                <a:latin typeface="Droid Sans Mono;monospace"/>
+                <a:ea typeface="Noto Sans CJK SC"/>
+              </a:rPr>
+              <a:t>()</a:t>
+            </a:r>
+            <a:endParaRPr b="0" lang="en-US" sz="800" spc="-1" strike="noStrike">
+              <a:latin typeface="Arial"/>
+            </a:endParaRPr>
+          </a:p>
+          <a:p>
+            <a:pPr>
+              <a:lnSpc>
+                <a:spcPct val="100000"/>
+              </a:lnSpc>
+              <a:buNone/>
+            </a:pPr>
+            <a:r>
+              <a:rPr b="0" lang="en-SG" sz="1050" spc="-1" strike="noStrike">
+                <a:solidFill>
+                  <a:srgbClr val="9cdcfe"/>
+                </a:solidFill>
+                <a:latin typeface="Droid Sans Mono;monospace"/>
+                <a:ea typeface="Noto Sans CJK SC"/>
+              </a:rPr>
+              <a:t>final_features</a:t>
+            </a:r>
+            <a:r>
+              <a:rPr b="0" lang="en-SG" sz="1050" spc="-1" strike="noStrike">
+                <a:solidFill>
+                  <a:srgbClr val="cccccc"/>
+                </a:solidFill>
+                <a:latin typeface="Droid Sans Mono;monospace"/>
+                <a:ea typeface="Noto Sans CJK SC"/>
+              </a:rPr>
+              <a:t> </a:t>
+            </a:r>
+            <a:r>
+              <a:rPr b="0" lang="en-SG" sz="1050" spc="-1" strike="noStrike">
+                <a:solidFill>
+                  <a:srgbClr val="d4d4d4"/>
+                </a:solidFill>
+                <a:latin typeface="Droid Sans Mono;monospace"/>
+                <a:ea typeface="Noto Sans CJK SC"/>
+              </a:rPr>
+              <a:t>=</a:t>
+            </a:r>
+            <a:r>
+              <a:rPr b="0" lang="en-SG" sz="1050" spc="-1" strike="noStrike">
+                <a:solidFill>
+                  <a:srgbClr val="cccccc"/>
+                </a:solidFill>
+                <a:latin typeface="Droid Sans Mono;monospace"/>
+                <a:ea typeface="Noto Sans CJK SC"/>
+              </a:rPr>
+              <a:t> {}</a:t>
+            </a:r>
+            <a:endParaRPr b="0" lang="en-US" sz="1050" spc="-1" strike="noStrike">
+              <a:latin typeface="Arial"/>
+            </a:endParaRPr>
+          </a:p>
+          <a:p>
+            <a:pPr>
+              <a:lnSpc>
+                <a:spcPct val="100000"/>
+              </a:lnSpc>
+              <a:buNone/>
+            </a:pPr>
+            <a:r>
+              <a:rPr b="0" lang="en-SG" sz="1000" spc="-1" strike="noStrike">
+                <a:solidFill>
+                  <a:srgbClr val="cccccc"/>
+                </a:solidFill>
+                <a:latin typeface="Consolas"/>
+                <a:ea typeface="Noto Sans CJK SC"/>
+              </a:rPr>
+              <a:t> </a:t>
             </a:r>
             <a:endParaRPr b="0" lang="en-US" sz="1000" spc="-1" strike="noStrike">
               <a:latin typeface="Arial"/>
@@ -29959,6 +30078,52 @@
           </a:p>
         </p:txBody>
       </p:sp>
+      <p:pic>
+        <p:nvPicPr>
+          <p:cNvPr id="152" name="" descr=""/>
+          <p:cNvPicPr/>
+          <p:nvPr/>
+        </p:nvPicPr>
+        <p:blipFill>
+          <a:blip r:embed="rId1"/>
+          <a:stretch/>
+        </p:blipFill>
+        <p:spPr>
+          <a:xfrm>
+            <a:off x="1600200" y="4648680"/>
+            <a:ext cx="7457760" cy="1980720"/>
+          </a:xfrm>
+          <a:prstGeom prst="rect">
+            <a:avLst/>
+          </a:prstGeom>
+          <a:ln w="0">
+            <a:noFill/>
+          </a:ln>
+        </p:spPr>
+      </p:pic>
+      <p:pic>
+        <p:nvPicPr>
+          <p:cNvPr id="153" name="" descr=""/>
+          <p:cNvPicPr/>
+          <p:nvPr/>
+        </p:nvPicPr>
+        <p:blipFill>
+          <a:blip r:embed="rId2"/>
+          <a:stretch/>
+        </p:blipFill>
+        <p:spPr>
+          <a:xfrm>
+            <a:off x="1495800" y="2667240"/>
+            <a:ext cx="7419600" cy="1904760"/>
+          </a:xfrm>
+          <a:prstGeom prst="rect">
+            <a:avLst/>
+          </a:prstGeom>
+          <a:ln w="0">
+            <a:noFill/>
+          </a:ln>
+        </p:spPr>
+      </p:pic>
     </p:spTree>
   </p:cSld>
   <mc:AlternateContent>
@@ -29998,7 +30163,7 @@
       </p:grpSpPr>
       <p:sp>
         <p:nvSpPr>
-          <p:cNvPr id="152" name="PlaceHolder 1"/>
+          <p:cNvPr id="154" name="PlaceHolder 1"/>
           <p:cNvSpPr>
             <a:spLocks noGrp="1"/>
           </p:cNvSpPr>
@@ -30009,7 +30174,7 @@
         <p:spPr>
           <a:xfrm>
             <a:off x="838080" y="365040"/>
-            <a:ext cx="10512720" cy="1322640"/>
+            <a:ext cx="10512360" cy="1322280"/>
           </a:xfrm>
           <a:prstGeom prst="rect">
             <a:avLst/>
@@ -30054,7 +30219,7 @@
                 <a:latin typeface="Consolas"/>
                 <a:ea typeface="Noto Sans CJK SC"/>
               </a:rPr>
-              <a:t>CLUSTERING</a:t>
+              <a:t>Feature Engineering</a:t>
             </a:r>
             <a:endParaRPr b="0" lang="en-US" sz="2400" spc="-1" strike="noStrike">
               <a:latin typeface="Arial"/>
@@ -30064,7 +30229,7 @@
       </p:sp>
       <p:sp>
         <p:nvSpPr>
-          <p:cNvPr id="153" name="PlaceHolder 2"/>
+          <p:cNvPr id="155" name="PlaceHolder 2"/>
           <p:cNvSpPr>
             <a:spLocks noGrp="1"/>
           </p:cNvSpPr>
@@ -30075,7 +30240,7 @@
         <p:spPr>
           <a:xfrm>
             <a:off x="838080" y="1825560"/>
-            <a:ext cx="10759680" cy="4744800"/>
+            <a:ext cx="10759320" cy="4744440"/>
           </a:xfrm>
           <a:prstGeom prst="rect">
             <a:avLst/>
@@ -30153,7 +30318,7 @@
       </p:grpSpPr>
       <p:sp>
         <p:nvSpPr>
-          <p:cNvPr id="154" name="PlaceHolder 1"/>
+          <p:cNvPr id="156" name="PlaceHolder 1"/>
           <p:cNvSpPr>
             <a:spLocks noGrp="1"/>
           </p:cNvSpPr>
@@ -30164,7 +30329,7 @@
         <p:spPr>
           <a:xfrm>
             <a:off x="838080" y="365040"/>
-            <a:ext cx="10512720" cy="1322640"/>
+            <a:ext cx="10512360" cy="1322280"/>
           </a:xfrm>
           <a:prstGeom prst="rect">
             <a:avLst/>
@@ -30219,7 +30384,7 @@
       </p:sp>
       <p:sp>
         <p:nvSpPr>
-          <p:cNvPr id="155" name="PlaceHolder 2"/>
+          <p:cNvPr id="157" name="PlaceHolder 2"/>
           <p:cNvSpPr>
             <a:spLocks noGrp="1"/>
           </p:cNvSpPr>
@@ -30230,7 +30395,7 @@
         <p:spPr>
           <a:xfrm>
             <a:off x="838080" y="1825560"/>
-            <a:ext cx="10759680" cy="4744800"/>
+            <a:ext cx="10759320" cy="4744440"/>
           </a:xfrm>
           <a:prstGeom prst="rect">
             <a:avLst/>
@@ -30247,106 +30412,6 @@
           <a:p>
             <a:pPr>
               <a:lnSpc>
-                <a:spcPct val="100000"/>
-              </a:lnSpc>
-              <a:buNone/>
-            </a:pPr>
-            <a:r>
-              <a:rPr b="0" lang="en-SG" sz="1000" spc="-1" strike="noStrike">
-                <a:solidFill>
-                  <a:srgbClr val="cccccc"/>
-                </a:solidFill>
-                <a:latin typeface="Consolas"/>
-              </a:rPr>
-              <a:t>1.</a:t>
-            </a:r>
-            <a:r>
-              <a:rPr b="0" lang="en-SG" sz="1050" spc="-1" strike="noStrike">
-                <a:solidFill>
-                  <a:srgbClr val="9cdcfe"/>
-                </a:solidFill>
-                <a:latin typeface="Droid Sans Mono;monospace"/>
-                <a:ea typeface="Noto Sans CJK SC"/>
-              </a:rPr>
-              <a:t>train_feat</a:t>
-            </a:r>
-            <a:r>
-              <a:rPr b="0" lang="en-SG" sz="1050" spc="-1" strike="noStrike">
-                <a:solidFill>
-                  <a:srgbClr val="cccccc"/>
-                </a:solidFill>
-                <a:latin typeface="Droid Sans Mono;monospace"/>
-                <a:ea typeface="Noto Sans CJK SC"/>
-              </a:rPr>
-              <a:t> </a:t>
-            </a:r>
-            <a:r>
-              <a:rPr b="0" lang="en-SG" sz="1050" spc="-1" strike="noStrike">
-                <a:solidFill>
-                  <a:srgbClr val="d4d4d4"/>
-                </a:solidFill>
-                <a:latin typeface="Droid Sans Mono;monospace"/>
-                <a:ea typeface="Noto Sans CJK SC"/>
-              </a:rPr>
-              <a:t>=</a:t>
-            </a:r>
-            <a:r>
-              <a:rPr b="0" lang="en-SG" sz="1050" spc="-1" strike="noStrike">
-                <a:solidFill>
-                  <a:srgbClr val="cccccc"/>
-                </a:solidFill>
-                <a:latin typeface="Droid Sans Mono;monospace"/>
-                <a:ea typeface="Noto Sans CJK SC"/>
-              </a:rPr>
-              <a:t> </a:t>
-            </a:r>
-            <a:r>
-              <a:rPr b="0" lang="en-SG" sz="1050" spc="-1" strike="noStrike">
-                <a:solidFill>
-                  <a:srgbClr val="dcdcaa"/>
-                </a:solidFill>
-                <a:latin typeface="Droid Sans Mono;monospace"/>
-                <a:ea typeface="Noto Sans CJK SC"/>
-              </a:rPr>
-              <a:t>get_features</a:t>
-            </a:r>
-            <a:r>
-              <a:rPr b="0" lang="en-SG" sz="1050" spc="-1" strike="noStrike">
-                <a:solidFill>
-                  <a:srgbClr val="cccccc"/>
-                </a:solidFill>
-                <a:latin typeface="Droid Sans Mono;monospace"/>
-                <a:ea typeface="Noto Sans CJK SC"/>
-              </a:rPr>
-              <a:t>(</a:t>
-            </a:r>
-            <a:r>
-              <a:rPr b="0" lang="en-SG" sz="1050" spc="-1" strike="noStrike">
-                <a:solidFill>
-                  <a:srgbClr val="9cdcfe"/>
-                </a:solidFill>
-                <a:latin typeface="Droid Sans Mono;monospace"/>
-                <a:ea typeface="Noto Sans CJK SC"/>
-              </a:rPr>
-              <a:t>train_binned</a:t>
-            </a:r>
-            <a:r>
-              <a:rPr b="0" lang="en-SG" sz="1050" spc="-1" strike="noStrike">
-                <a:solidFill>
-                  <a:srgbClr val="cccccc"/>
-                </a:solidFill>
-                <a:latin typeface="Droid Sans Mono;monospace"/>
-                <a:ea typeface="Noto Sans CJK SC"/>
-              </a:rPr>
-              <a:t>)</a:t>
-            </a:r>
-            <a:endParaRPr b="0" lang="en-US" sz="1050" spc="-1" strike="noStrike">
-              <a:latin typeface="Arial"/>
-            </a:endParaRPr>
-          </a:p>
-          <a:p>
-            <a:pPr algn="ctr">
-              <a:lnSpc>
                 <a:spcPct val="90000"/>
               </a:lnSpc>
               <a:spcBef>
@@ -30360,111 +30425,8 @@
                   <a:srgbClr val="cccccc"/>
                 </a:solidFill>
                 <a:latin typeface="Consolas"/>
-                <a:ea typeface="Noto Sans CJK SC"/>
-              </a:rPr>
-              <a:t>Back Inside </a:t>
-            </a:r>
-            <a:r>
-              <a:rPr b="0" lang="en-SG" sz="1050" spc="-1" strike="noStrike">
-                <a:solidFill>
-                  <a:srgbClr val="cccccc"/>
-                </a:solidFill>
-                <a:latin typeface="Droid Sans Mono;monospace"/>
-                <a:ea typeface="Noto Sans CJK SC"/>
-              </a:rPr>
-              <a:t> </a:t>
-            </a:r>
-            <a:r>
-              <a:rPr b="0" lang="en-SG" sz="1050" spc="-1" strike="noStrike">
-                <a:solidFill>
-                  <a:srgbClr val="dcdcaa"/>
-                </a:solidFill>
-                <a:latin typeface="Droid Sans Mono;monospace"/>
-                <a:ea typeface="Noto Sans CJK SC"/>
-              </a:rPr>
-              <a:t>get_features</a:t>
-            </a:r>
-            <a:r>
-              <a:rPr b="0" lang="en-US" sz="800" spc="-1" strike="noStrike">
-                <a:solidFill>
-                  <a:srgbClr val="cccccc"/>
-                </a:solidFill>
-                <a:latin typeface="Droid Sans Mono;monospace"/>
-                <a:ea typeface="Noto Sans CJK SC"/>
-              </a:rPr>
-              <a:t>()</a:t>
-            </a:r>
-            <a:endParaRPr b="0" lang="en-US" sz="800" spc="-1" strike="noStrike">
-              <a:latin typeface="Arial"/>
-            </a:endParaRPr>
-          </a:p>
-          <a:p>
-            <a:pPr>
-              <a:lnSpc>
-                <a:spcPct val="100000"/>
-              </a:lnSpc>
-              <a:buNone/>
-            </a:pPr>
-            <a:r>
-              <a:rPr b="0" lang="en-SG" sz="1050" spc="-1" strike="noStrike">
-                <a:solidFill>
-                  <a:srgbClr val="9cdcfe"/>
-                </a:solidFill>
-                <a:latin typeface="Droid Sans Mono;monospace"/>
-                <a:ea typeface="Noto Sans CJK SC"/>
-              </a:rPr>
-              <a:t>final_features</a:t>
-            </a:r>
-            <a:r>
-              <a:rPr b="0" lang="en-SG" sz="1050" spc="-1" strike="noStrike">
-                <a:solidFill>
-                  <a:srgbClr val="cccccc"/>
-                </a:solidFill>
-                <a:latin typeface="Droid Sans Mono;monospace"/>
-                <a:ea typeface="Noto Sans CJK SC"/>
-              </a:rPr>
-              <a:t> </a:t>
-            </a:r>
-            <a:r>
-              <a:rPr b="0" lang="en-SG" sz="1050" spc="-1" strike="noStrike">
-                <a:solidFill>
-                  <a:srgbClr val="d4d4d4"/>
-                </a:solidFill>
-                <a:latin typeface="Droid Sans Mono;monospace"/>
-                <a:ea typeface="Noto Sans CJK SC"/>
-              </a:rPr>
-              <a:t>=</a:t>
-            </a:r>
-            <a:r>
-              <a:rPr b="0" lang="en-SG" sz="1050" spc="-1" strike="noStrike">
-                <a:solidFill>
-                  <a:srgbClr val="cccccc"/>
-                </a:solidFill>
-                <a:latin typeface="Droid Sans Mono;monospace"/>
-                <a:ea typeface="Noto Sans CJK SC"/>
-              </a:rPr>
-              <a:t> {}</a:t>
-            </a:r>
-            <a:endParaRPr b="0" lang="en-US" sz="1050" spc="-1" strike="noStrike">
-              <a:latin typeface="Arial"/>
-            </a:endParaRPr>
-          </a:p>
-          <a:p>
-            <a:pPr>
-              <a:lnSpc>
-                <a:spcPct val="100000"/>
-              </a:lnSpc>
-              <a:buNone/>
-            </a:pPr>
-            <a:r>
-              <a:rPr b="0" lang="en-SG" sz="1000" spc="-1" strike="noStrike">
-                <a:solidFill>
-                  <a:srgbClr val="cccccc"/>
-                </a:solidFill>
-                <a:latin typeface="Consolas"/>
-                <a:ea typeface="Noto Sans CJK SC"/>
-              </a:rPr>
-              <a:t> </a:t>
+              </a:rPr>
+              <a:t>1. </a:t>
             </a:r>
             <a:endParaRPr b="0" lang="en-US" sz="1000" spc="-1" strike="noStrike">
               <a:latin typeface="Arial"/>
@@ -30511,7 +30473,7 @@
       </p:grpSpPr>
       <p:sp>
         <p:nvSpPr>
-          <p:cNvPr id="156" name="PlaceHolder 1"/>
+          <p:cNvPr id="158" name="PlaceHolder 1"/>
           <p:cNvSpPr>
             <a:spLocks noGrp="1"/>
           </p:cNvSpPr>
@@ -30522,7 +30484,7 @@
         <p:spPr>
           <a:xfrm>
             <a:off x="838080" y="365040"/>
-            <a:ext cx="10512720" cy="1322640"/>
+            <a:ext cx="10512360" cy="1322280"/>
           </a:xfrm>
           <a:prstGeom prst="rect">
             <a:avLst/>
@@ -30567,7 +30529,7 @@
                 <a:latin typeface="Consolas"/>
                 <a:ea typeface="Noto Sans CJK SC"/>
               </a:rPr>
-              <a:t>Feature Engineering – Important features from LGBM</a:t>
+              <a:t>Feature Engineering</a:t>
             </a:r>
             <a:endParaRPr b="0" lang="en-US" sz="2400" spc="-1" strike="noStrike">
               <a:latin typeface="Arial"/>
@@ -30577,7 +30539,7 @@
       </p:sp>
       <p:sp>
         <p:nvSpPr>
-          <p:cNvPr id="157" name="PlaceHolder 2"/>
+          <p:cNvPr id="159" name="PlaceHolder 2"/>
           <p:cNvSpPr>
             <a:spLocks noGrp="1"/>
           </p:cNvSpPr>
@@ -30588,7 +30550,7 @@
         <p:spPr>
           <a:xfrm>
             <a:off x="838080" y="1825560"/>
-            <a:ext cx="10759680" cy="4744800"/>
+            <a:ext cx="10759320" cy="4744440"/>
           </a:xfrm>
           <a:prstGeom prst="rect">
             <a:avLst/>
@@ -30600,7 +30562,7 @@
         </p:spPr>
         <p:txBody>
           <a:bodyPr lIns="90000" rIns="90000" tIns="45000" bIns="45000" anchor="t">
-            <a:normAutofit fontScale="69000"/>
+            <a:normAutofit/>
           </a:bodyPr>
           <a:p>
             <a:pPr>
@@ -30613,602 +30575,14 @@
               <a:buNone/>
             </a:pPr>
             <a:r>
-              <a:rPr b="1" lang="en-SG" sz="1000" spc="-1" strike="noStrike" u="sng">
-                <a:solidFill>
-                  <a:srgbClr val="cccccc"/>
-                </a:solidFill>
-                <a:uFillTx/>
-                <a:latin typeface="Consolas"/>
-              </a:rPr>
-              <a:t>Important features 1</a:t>
-            </a:r>
-            <a:endParaRPr b="0" lang="en-US" sz="1000" spc="-1" strike="noStrike">
-              <a:latin typeface="Arial"/>
-            </a:endParaRPr>
-          </a:p>
-          <a:p>
-            <a:pPr>
-              <a:lnSpc>
-                <a:spcPct val="90000"/>
-              </a:lnSpc>
-              <a:spcBef>
-                <a:spcPts val="1001"/>
-              </a:spcBef>
-              <a:buNone/>
-            </a:pPr>
-            <a:r>
               <a:rPr b="0" lang="en-SG" sz="1000" spc="-1" strike="noStrike">
                 <a:solidFill>
                   <a:srgbClr val="cccccc"/>
                 </a:solidFill>
                 <a:latin typeface="Consolas"/>
               </a:rPr>
-              <a:t>tbin_var_from_20</a:t>
-            </a:r>
-            <a:endParaRPr b="0" lang="en-US" sz="1000" spc="-1" strike="noStrike">
-              <a:latin typeface="Arial"/>
-            </a:endParaRPr>
-          </a:p>
-          <a:p>
-            <a:pPr>
-              <a:lnSpc>
-                <a:spcPct val="90000"/>
-              </a:lnSpc>
-              <a:spcBef>
-                <a:spcPts val="1001"/>
-              </a:spcBef>
-              <a:buNone/>
-            </a:pPr>
-            <a:r>
-              <a:rPr b="0" lang="en-SG" sz="1000" spc="-1" strike="noStrike">
-                <a:solidFill>
-                  <a:srgbClr val="cccccc"/>
-                </a:solidFill>
-                <a:latin typeface="Consolas"/>
-              </a:rPr>
-              <a:t>V1spprojt15f25</a:t>
-            </a:r>
-            <a:endParaRPr b="0" lang="en-US" sz="1000" spc="-1" strike="noStrike">
-              <a:latin typeface="Arial"/>
-            </a:endParaRPr>
-          </a:p>
-          <a:p>
-            <a:pPr>
-              <a:lnSpc>
-                <a:spcPct val="90000"/>
-              </a:lnSpc>
-              <a:spcBef>
-                <a:spcPts val="1001"/>
-              </a:spcBef>
-              <a:buNone/>
-            </a:pPr>
-            <a:r>
-              <a:rPr b="0" lang="en-SG" sz="1000" spc="-1" strike="noStrike">
-                <a:solidFill>
-                  <a:srgbClr val="cccccc"/>
-                </a:solidFill>
-                <a:latin typeface="Consolas"/>
-              </a:rPr>
-              <a:t>V1spprojt15f29</a:t>
-            </a:r>
-            <a:endParaRPr b="0" lang="en-US" sz="1000" spc="-1" strike="noStrike">
-              <a:latin typeface="Arial"/>
-            </a:endParaRPr>
-          </a:p>
-          <a:p>
-            <a:pPr>
-              <a:lnSpc>
-                <a:spcPct val="90000"/>
-              </a:lnSpc>
-              <a:spcBef>
-                <a:spcPts val="1001"/>
-              </a:spcBef>
-              <a:buNone/>
-            </a:pPr>
-            <a:r>
-              <a:rPr b="0" lang="en-SG" sz="1000" spc="-1" strike="noStrike">
-                <a:solidFill>
-                  <a:srgbClr val="cccccc"/>
-                </a:solidFill>
-                <a:latin typeface="Consolas"/>
-              </a:rPr>
-              <a:t>stock_id</a:t>
-            </a:r>
-            <a:endParaRPr b="0" lang="en-US" sz="1000" spc="-1" strike="noStrike">
-              <a:latin typeface="Arial"/>
-            </a:endParaRPr>
-          </a:p>
-          <a:p>
-            <a:pPr>
-              <a:lnSpc>
-                <a:spcPct val="90000"/>
-              </a:lnSpc>
-              <a:spcBef>
-                <a:spcPts val="1001"/>
-              </a:spcBef>
-              <a:buNone/>
-            </a:pPr>
-            <a:r>
-              <a:rPr b="0" lang="en-SG" sz="1000" spc="-1" strike="noStrike">
-                <a:solidFill>
-                  <a:srgbClr val="cccccc"/>
-                </a:solidFill>
-                <a:latin typeface="Consolas"/>
-              </a:rPr>
-              <a:t>vol1stock_mean_from_25</a:t>
-            </a:r>
-            <a:endParaRPr b="0" lang="en-US" sz="1000" spc="-1" strike="noStrike">
-              <a:latin typeface="Arial"/>
-            </a:endParaRPr>
-          </a:p>
-          <a:p>
-            <a:pPr>
-              <a:lnSpc>
-                <a:spcPct val="90000"/>
-              </a:lnSpc>
-              <a:spcBef>
-                <a:spcPts val="1001"/>
-              </a:spcBef>
-              <a:buNone/>
-            </a:pPr>
-            <a:r>
-              <a:rPr b="0" lang="en-SG" sz="1000" spc="-1" strike="noStrike">
-                <a:solidFill>
-                  <a:srgbClr val="cccccc"/>
-                </a:solidFill>
-                <a:latin typeface="Consolas"/>
-              </a:rPr>
-              <a:t>Vlsprojt5f25</a:t>
-            </a:r>
-            <a:endParaRPr b="0" lang="en-US" sz="1000" spc="-1" strike="noStrike">
-              <a:latin typeface="Arial"/>
-            </a:endParaRPr>
-          </a:p>
-          <a:p>
-            <a:pPr>
-              <a:lnSpc>
-                <a:spcPct val="90000"/>
-              </a:lnSpc>
-              <a:spcBef>
-                <a:spcPts val="1001"/>
-              </a:spcBef>
-              <a:buNone/>
-            </a:pPr>
-            <a:r>
-              <a:rPr b="0" lang="en-SG" sz="1000" spc="-1" strike="noStrike">
-                <a:solidFill>
-                  <a:srgbClr val="cccccc"/>
-                </a:solidFill>
-                <a:latin typeface="Consolas"/>
-              </a:rPr>
-              <a:t>tbin_var_from_10</a:t>
-            </a:r>
-            <a:endParaRPr b="0" lang="en-US" sz="1000" spc="-1" strike="noStrike">
-              <a:latin typeface="Arial"/>
-            </a:endParaRPr>
-          </a:p>
-          <a:p>
-            <a:pPr>
-              <a:lnSpc>
-                <a:spcPct val="90000"/>
-              </a:lnSpc>
-              <a:spcBef>
-                <a:spcPts val="1001"/>
-              </a:spcBef>
-              <a:buNone/>
-            </a:pPr>
-            <a:endParaRPr b="0" lang="en-US" sz="1000" spc="-1" strike="noStrike">
-              <a:latin typeface="Arial"/>
-            </a:endParaRPr>
-          </a:p>
-          <a:p>
-            <a:pPr>
-              <a:lnSpc>
-                <a:spcPct val="90000"/>
-              </a:lnSpc>
-              <a:spcBef>
-                <a:spcPts val="1001"/>
-              </a:spcBef>
-              <a:buNone/>
-            </a:pPr>
-            <a:r>
-              <a:rPr b="1" lang="en-SG" sz="1000" spc="-1" strike="noStrike" u="sng">
-                <a:solidFill>
-                  <a:srgbClr val="cccccc"/>
-                </a:solidFill>
-                <a:uFillTx/>
-                <a:latin typeface="Consolas"/>
-              </a:rPr>
-              <a:t>Important features 2</a:t>
-            </a:r>
-            <a:endParaRPr b="0" lang="en-US" sz="1000" spc="-1" strike="noStrike">
-              <a:latin typeface="Arial"/>
-            </a:endParaRPr>
-          </a:p>
-          <a:p>
-            <a:pPr>
-              <a:lnSpc>
-                <a:spcPct val="90000"/>
-              </a:lnSpc>
-              <a:spcBef>
-                <a:spcPts val="1001"/>
-              </a:spcBef>
-              <a:buNone/>
-            </a:pPr>
-            <a:r>
-              <a:rPr b="0" lang="en-SG" sz="1000" spc="-1" strike="noStrike">
-                <a:solidFill>
-                  <a:srgbClr val="cccccc"/>
-                </a:solidFill>
-                <a:latin typeface="Consolas"/>
-              </a:rPr>
-              <a:t>v1spprojt15f25_g1</a:t>
-            </a:r>
-            <a:endParaRPr b="0" lang="en-US" sz="1000" spc="-1" strike="noStrike">
-              <a:latin typeface="Arial"/>
-            </a:endParaRPr>
-          </a:p>
-          <a:p>
-            <a:pPr>
-              <a:lnSpc>
-                <a:spcPct val="90000"/>
-              </a:lnSpc>
-              <a:spcBef>
-                <a:spcPts val="1001"/>
-              </a:spcBef>
-              <a:buNone/>
-            </a:pPr>
-            <a:r>
-              <a:rPr b="0" lang="en-SG" sz="1000" spc="-1" strike="noStrike">
-                <a:solidFill>
-                  <a:srgbClr val="cccccc"/>
-                </a:solidFill>
-                <a:latin typeface="Consolas"/>
-              </a:rPr>
-              <a:t>tbin_var_from_20</a:t>
-            </a:r>
-            <a:endParaRPr b="0" lang="en-US" sz="1000" spc="-1" strike="noStrike">
-              <a:latin typeface="Arial"/>
-            </a:endParaRPr>
-          </a:p>
-          <a:p>
-            <a:pPr>
-              <a:lnSpc>
-                <a:spcPct val="90000"/>
-              </a:lnSpc>
-              <a:spcBef>
-                <a:spcPts val="1001"/>
-              </a:spcBef>
-              <a:buNone/>
-            </a:pPr>
-            <a:r>
-              <a:rPr b="0" lang="en-SG" sz="1000" spc="-1" strike="noStrike">
-                <a:solidFill>
-                  <a:srgbClr val="cccccc"/>
-                </a:solidFill>
-                <a:latin typeface="Consolas"/>
-              </a:rPr>
-              <a:t>V1spprojt15f25</a:t>
-            </a:r>
-            <a:endParaRPr b="0" lang="en-US" sz="1000" spc="-1" strike="noStrike">
-              <a:latin typeface="Arial"/>
-            </a:endParaRPr>
-          </a:p>
-          <a:p>
-            <a:pPr>
-              <a:lnSpc>
-                <a:spcPct val="90000"/>
-              </a:lnSpc>
-              <a:spcBef>
-                <a:spcPts val="1001"/>
-              </a:spcBef>
-              <a:buNone/>
-            </a:pPr>
-            <a:r>
-              <a:rPr b="0" lang="en-SG" sz="1000" spc="-1" strike="noStrike">
-                <a:solidFill>
-                  <a:srgbClr val="cccccc"/>
-                </a:solidFill>
-                <a:latin typeface="Consolas"/>
-              </a:rPr>
-              <a:t>V1spprojt15f29</a:t>
-            </a:r>
-            <a:endParaRPr b="0" lang="en-US" sz="1000" spc="-1" strike="noStrike">
-              <a:latin typeface="Arial"/>
-            </a:endParaRPr>
-          </a:p>
-          <a:p>
-            <a:pPr>
-              <a:lnSpc>
-                <a:spcPct val="90000"/>
-              </a:lnSpc>
-              <a:spcBef>
-                <a:spcPts val="1001"/>
-              </a:spcBef>
-              <a:buNone/>
-            </a:pPr>
-            <a:r>
-              <a:rPr b="0" lang="en-SG" sz="1000" spc="-1" strike="noStrike">
-                <a:solidFill>
-                  <a:srgbClr val="cccccc"/>
-                </a:solidFill>
-                <a:latin typeface="Consolas"/>
-              </a:rPr>
-              <a:t>vol1stock_mean_from_25</a:t>
-            </a:r>
-            <a:endParaRPr b="0" lang="en-US" sz="1000" spc="-1" strike="noStrike">
-              <a:latin typeface="Arial"/>
-            </a:endParaRPr>
-          </a:p>
-          <a:p>
-            <a:pPr>
-              <a:lnSpc>
-                <a:spcPct val="90000"/>
-              </a:lnSpc>
-              <a:spcBef>
-                <a:spcPts val="1001"/>
-              </a:spcBef>
-              <a:buNone/>
-            </a:pPr>
-            <a:r>
-              <a:rPr b="0" lang="en-SG" sz="1000" spc="-1" strike="noStrike">
-                <a:solidFill>
-                  <a:srgbClr val="cccccc"/>
-                </a:solidFill>
-                <a:latin typeface="Consolas"/>
-              </a:rPr>
-              <a:t>tbin_var_from_10</a:t>
-            </a:r>
-            <a:endParaRPr b="0" lang="en-US" sz="1000" spc="-1" strike="noStrike">
-              <a:latin typeface="Arial"/>
-            </a:endParaRPr>
-          </a:p>
-          <a:p>
-            <a:pPr>
-              <a:lnSpc>
-                <a:spcPct val="90000"/>
-              </a:lnSpc>
-              <a:spcBef>
-                <a:spcPts val="1001"/>
-              </a:spcBef>
-              <a:buNone/>
-            </a:pPr>
-            <a:r>
-              <a:rPr b="0" lang="en-SG" sz="1000" spc="-1" strike="noStrike">
-                <a:solidFill>
-                  <a:srgbClr val="cccccc"/>
-                </a:solidFill>
-                <a:latin typeface="Consolas"/>
-              </a:rPr>
-              <a:t>v1liq3projt5f25</a:t>
-            </a:r>
-            <a:endParaRPr b="0" lang="en-US" sz="1000" spc="-1" strike="noStrike">
-              <a:latin typeface="Arial"/>
-            </a:endParaRPr>
-          </a:p>
-          <a:p>
-            <a:pPr>
-              <a:lnSpc>
-                <a:spcPct val="90000"/>
-              </a:lnSpc>
-              <a:spcBef>
-                <a:spcPts val="1001"/>
-              </a:spcBef>
-              <a:buNone/>
-            </a:pPr>
-            <a:endParaRPr b="0" lang="en-US" sz="1000" spc="-1" strike="noStrike">
-              <a:latin typeface="Arial"/>
-            </a:endParaRPr>
-          </a:p>
-          <a:p>
-            <a:pPr>
-              <a:lnSpc>
-                <a:spcPct val="90000"/>
-              </a:lnSpc>
-              <a:spcBef>
-                <a:spcPts val="1001"/>
-              </a:spcBef>
-              <a:buNone/>
-            </a:pPr>
-            <a:r>
-              <a:rPr b="1" lang="en-SG" sz="1000" spc="-1" strike="noStrike" u="sng">
-                <a:solidFill>
-                  <a:srgbClr val="cccccc"/>
-                </a:solidFill>
-                <a:uFillTx/>
-                <a:latin typeface="Consolas"/>
-              </a:rPr>
-              <a:t>Important features 3</a:t>
-            </a:r>
-            <a:endParaRPr b="0" lang="en-US" sz="1000" spc="-1" strike="noStrike">
-              <a:latin typeface="Arial"/>
-            </a:endParaRPr>
-          </a:p>
-          <a:p>
-            <a:pPr>
-              <a:lnSpc>
-                <a:spcPct val="90000"/>
-              </a:lnSpc>
-              <a:spcBef>
-                <a:spcPts val="1001"/>
-              </a:spcBef>
-              <a:buNone/>
-            </a:pPr>
-            <a:r>
-              <a:rPr b="0" lang="en-SG" sz="1000" spc="-1" strike="noStrike">
-                <a:solidFill>
-                  <a:srgbClr val="cccccc"/>
-                </a:solidFill>
-                <a:latin typeface="Consolas"/>
-              </a:rPr>
-              <a:t>V1spprojt15f25</a:t>
-            </a:r>
-            <a:endParaRPr b="0" lang="en-US" sz="1000" spc="-1" strike="noStrike">
-              <a:latin typeface="Arial"/>
-            </a:endParaRPr>
-          </a:p>
-          <a:p>
-            <a:pPr>
-              <a:lnSpc>
-                <a:spcPct val="90000"/>
-              </a:lnSpc>
-              <a:spcBef>
-                <a:spcPts val="1001"/>
-              </a:spcBef>
-              <a:buNone/>
-            </a:pPr>
-            <a:r>
-              <a:rPr b="0" lang="en-SG" sz="1000" spc="-1" strike="noStrike">
-                <a:solidFill>
-                  <a:srgbClr val="cccccc"/>
-                </a:solidFill>
-                <a:latin typeface="Consolas"/>
-              </a:rPr>
-              <a:t>V1liq3sprojt5f25</a:t>
-            </a:r>
-            <a:endParaRPr b="0" lang="en-US" sz="1000" spc="-1" strike="noStrike">
-              <a:latin typeface="Arial"/>
-            </a:endParaRPr>
-          </a:p>
-          <a:p>
-            <a:pPr>
-              <a:lnSpc>
-                <a:spcPct val="90000"/>
-              </a:lnSpc>
-              <a:spcBef>
-                <a:spcPts val="1001"/>
-              </a:spcBef>
-              <a:buNone/>
-            </a:pPr>
-            <a:r>
-              <a:rPr b="0" lang="en-SG" sz="1000" spc="-1" strike="noStrike">
-                <a:solidFill>
-                  <a:srgbClr val="cccccc"/>
-                </a:solidFill>
-                <a:latin typeface="Consolas"/>
-              </a:rPr>
-              <a:t>vol1stock_mean_From_25</a:t>
-            </a:r>
-            <a:endParaRPr b="0" lang="en-US" sz="1000" spc="-1" strike="noStrike">
-              <a:latin typeface="Arial"/>
-            </a:endParaRPr>
-          </a:p>
-          <a:p>
-            <a:pPr>
-              <a:lnSpc>
-                <a:spcPct val="90000"/>
-              </a:lnSpc>
-              <a:spcBef>
-                <a:spcPts val="1001"/>
-              </a:spcBef>
-              <a:buNone/>
-            </a:pPr>
-            <a:r>
-              <a:rPr b="0" lang="en-SG" sz="1000" spc="-1" strike="noStrike">
-                <a:solidFill>
-                  <a:srgbClr val="cccccc"/>
-                </a:solidFill>
-                <a:latin typeface="Consolas"/>
-              </a:rPr>
-              <a:t>v1spprojt15f25_g1</a:t>
-            </a:r>
-            <a:endParaRPr b="0" lang="en-US" sz="1000" spc="-1" strike="noStrike">
-              <a:latin typeface="Arial"/>
-            </a:endParaRPr>
-          </a:p>
-          <a:p>
-            <a:pPr>
-              <a:lnSpc>
-                <a:spcPct val="90000"/>
-              </a:lnSpc>
-              <a:spcBef>
-                <a:spcPts val="1001"/>
-              </a:spcBef>
-              <a:buNone/>
-            </a:pPr>
-            <a:r>
-              <a:rPr b="0" lang="en-SG" sz="1000" spc="-1" strike="noStrike">
-                <a:solidFill>
-                  <a:srgbClr val="cccccc"/>
-                </a:solidFill>
-                <a:latin typeface="Consolas"/>
-              </a:rPr>
-              <a:t>V1spprojt15f29</a:t>
-            </a:r>
-            <a:endParaRPr b="0" lang="en-US" sz="1000" spc="-1" strike="noStrike">
-              <a:latin typeface="Arial"/>
-            </a:endParaRPr>
-          </a:p>
-          <a:p>
-            <a:pPr>
-              <a:lnSpc>
-                <a:spcPct val="90000"/>
-              </a:lnSpc>
-              <a:spcBef>
-                <a:spcPts val="1001"/>
-              </a:spcBef>
-              <a:buNone/>
-            </a:pPr>
-            <a:r>
-              <a:rPr b="0" lang="en-SG" sz="1000" spc="-1" strike="noStrike">
-                <a:solidFill>
-                  <a:srgbClr val="cccccc"/>
-                </a:solidFill>
-                <a:latin typeface="Consolas"/>
-              </a:rPr>
-              <a:t>cvol1_15_15s</a:t>
-            </a:r>
-            <a:endParaRPr b="0" lang="en-US" sz="1000" spc="-1" strike="noStrike">
-              <a:latin typeface="Arial"/>
-            </a:endParaRPr>
-          </a:p>
-          <a:p>
-            <a:pPr>
-              <a:lnSpc>
-                <a:spcPct val="90000"/>
-              </a:lnSpc>
-              <a:spcBef>
-                <a:spcPts val="1001"/>
-              </a:spcBef>
-              <a:buNone/>
-            </a:pPr>
-            <a:r>
-              <a:rPr b="0" lang="en-SG" sz="1000" spc="-1" strike="noStrike">
-                <a:solidFill>
-                  <a:srgbClr val="cccccc"/>
-                </a:solidFill>
-                <a:latin typeface="Consolas"/>
-              </a:rPr>
-              <a:t>vol1stock_mean_from_20</a:t>
-            </a:r>
-            <a:endParaRPr b="0" lang="en-US" sz="1000" spc="-1" strike="noStrike">
-              <a:latin typeface="Arial"/>
-            </a:endParaRPr>
-          </a:p>
-          <a:p>
-            <a:pPr>
-              <a:lnSpc>
-                <a:spcPct val="90000"/>
-              </a:lnSpc>
-              <a:spcBef>
-                <a:spcPts val="1001"/>
-              </a:spcBef>
-              <a:buNone/>
-            </a:pPr>
-            <a:endParaRPr b="0" lang="en-US" sz="1000" spc="-1" strike="noStrike">
-              <a:latin typeface="Arial"/>
-            </a:endParaRPr>
-          </a:p>
-          <a:p>
-            <a:pPr>
-              <a:lnSpc>
-                <a:spcPct val="90000"/>
-              </a:lnSpc>
-              <a:spcBef>
-                <a:spcPts val="1001"/>
-              </a:spcBef>
-              <a:buNone/>
-            </a:pPr>
+              <a:t>1. </a:t>
+            </a:r>
             <a:endParaRPr b="0" lang="en-US" sz="1000" spc="-1" strike="noStrike">
               <a:latin typeface="Arial"/>
             </a:endParaRPr>
@@ -31254,7 +30628,7 @@
       </p:grpSpPr>
       <p:sp>
         <p:nvSpPr>
-          <p:cNvPr id="158" name="PlaceHolder 1"/>
+          <p:cNvPr id="160" name="PlaceHolder 1"/>
           <p:cNvSpPr>
             <a:spLocks noGrp="1"/>
           </p:cNvSpPr>
@@ -31265,7 +30639,7 @@
         <p:spPr>
           <a:xfrm>
             <a:off x="838080" y="365040"/>
-            <a:ext cx="10512720" cy="1322640"/>
+            <a:ext cx="10512360" cy="1322280"/>
           </a:xfrm>
           <a:prstGeom prst="rect">
             <a:avLst/>
@@ -31320,7 +30694,7 @@
       </p:sp>
       <p:sp>
         <p:nvSpPr>
-          <p:cNvPr id="159" name="PlaceHolder 2"/>
+          <p:cNvPr id="161" name="PlaceHolder 2"/>
           <p:cNvSpPr>
             <a:spLocks noGrp="1"/>
           </p:cNvSpPr>
@@ -31331,7 +30705,7 @@
         <p:spPr>
           <a:xfrm>
             <a:off x="838080" y="1825560"/>
-            <a:ext cx="10759680" cy="4744800"/>
+            <a:ext cx="10759320" cy="4744440"/>
           </a:xfrm>
           <a:prstGeom prst="rect">
             <a:avLst/>
@@ -31409,7 +30783,7 @@
         <p:spPr>
           <a:xfrm>
             <a:off x="185760" y="2618280"/>
-            <a:ext cx="11817720" cy="8044920"/>
+            <a:ext cx="11817360" cy="8044920"/>
           </a:xfrm>
           <a:prstGeom prst="rect">
             <a:avLst/>
@@ -31793,7 +31167,7 @@
         <p:spPr>
           <a:xfrm>
             <a:off x="6289560" y="105840"/>
-            <a:ext cx="4817160" cy="594000"/>
+            <a:ext cx="4816800" cy="593640"/>
           </a:xfrm>
           <a:prstGeom prst="rect">
             <a:avLst/>
@@ -31816,7 +31190,7 @@
         <p:spPr>
           <a:xfrm>
             <a:off x="7717320" y="906480"/>
-            <a:ext cx="1502280" cy="587880"/>
+            <a:ext cx="1501920" cy="587520"/>
           </a:xfrm>
           <a:prstGeom prst="rect">
             <a:avLst/>
@@ -31839,7 +31213,7 @@
         <p:spPr>
           <a:xfrm>
             <a:off x="7755480" y="1700640"/>
-            <a:ext cx="1425960" cy="689400"/>
+            <a:ext cx="1425600" cy="689040"/>
           </a:xfrm>
           <a:prstGeom prst="rect">
             <a:avLst/>
@@ -31858,7 +31232,7 @@
         <p:spPr>
           <a:xfrm>
             <a:off x="9292320" y="832320"/>
-            <a:ext cx="2316960" cy="363960"/>
+            <a:ext cx="2316600" cy="363960"/>
           </a:xfrm>
           <a:prstGeom prst="rect">
             <a:avLst/>
@@ -31940,7 +31314,7 @@
       </p:grpSpPr>
       <p:sp>
         <p:nvSpPr>
-          <p:cNvPr id="160" name="PlaceHolder 1"/>
+          <p:cNvPr id="162" name="PlaceHolder 1"/>
           <p:cNvSpPr>
             <a:spLocks noGrp="1"/>
           </p:cNvSpPr>
@@ -31951,7 +31325,7 @@
         <p:spPr>
           <a:xfrm>
             <a:off x="838080" y="365040"/>
-            <a:ext cx="10512720" cy="1322640"/>
+            <a:ext cx="10512360" cy="1322280"/>
           </a:xfrm>
           <a:prstGeom prst="rect">
             <a:avLst/>
@@ -32006,7 +31380,7 @@
       </p:sp>
       <p:sp>
         <p:nvSpPr>
-          <p:cNvPr id="161" name="PlaceHolder 2"/>
+          <p:cNvPr id="163" name="PlaceHolder 2"/>
           <p:cNvSpPr>
             <a:spLocks noGrp="1"/>
           </p:cNvSpPr>
@@ -32017,7 +31391,7 @@
         <p:spPr>
           <a:xfrm>
             <a:off x="838080" y="1825560"/>
-            <a:ext cx="10759680" cy="4744800"/>
+            <a:ext cx="10759320" cy="4744440"/>
           </a:xfrm>
           <a:prstGeom prst="rect">
             <a:avLst/>
@@ -32095,7 +31469,7 @@
       </p:grpSpPr>
       <p:sp>
         <p:nvSpPr>
-          <p:cNvPr id="162" name="PlaceHolder 1"/>
+          <p:cNvPr id="164" name="PlaceHolder 1"/>
           <p:cNvSpPr>
             <a:spLocks noGrp="1"/>
           </p:cNvSpPr>
@@ -32106,7 +31480,7 @@
         <p:spPr>
           <a:xfrm>
             <a:off x="838080" y="365040"/>
-            <a:ext cx="10512720" cy="1322640"/>
+            <a:ext cx="10512360" cy="1322280"/>
           </a:xfrm>
           <a:prstGeom prst="rect">
             <a:avLst/>
@@ -32161,7 +31535,7 @@
       </p:sp>
       <p:sp>
         <p:nvSpPr>
-          <p:cNvPr id="163" name="PlaceHolder 2"/>
+          <p:cNvPr id="165" name="PlaceHolder 2"/>
           <p:cNvSpPr>
             <a:spLocks noGrp="1"/>
           </p:cNvSpPr>
@@ -32172,7 +31546,7 @@
         <p:spPr>
           <a:xfrm>
             <a:off x="838080" y="1825560"/>
-            <a:ext cx="10759680" cy="4744800"/>
+            <a:ext cx="10759320" cy="4744440"/>
           </a:xfrm>
           <a:prstGeom prst="rect">
             <a:avLst/>
@@ -32250,7 +31624,7 @@
       </p:grpSpPr>
       <p:sp>
         <p:nvSpPr>
-          <p:cNvPr id="164" name="PlaceHolder 1"/>
+          <p:cNvPr id="166" name="PlaceHolder 1"/>
           <p:cNvSpPr>
             <a:spLocks noGrp="1"/>
           </p:cNvSpPr>
@@ -32261,7 +31635,7 @@
         <p:spPr>
           <a:xfrm>
             <a:off x="838080" y="365040"/>
-            <a:ext cx="10512720" cy="1322640"/>
+            <a:ext cx="10512360" cy="1322280"/>
           </a:xfrm>
           <a:prstGeom prst="rect">
             <a:avLst/>
@@ -32316,7 +31690,7 @@
       </p:sp>
       <p:sp>
         <p:nvSpPr>
-          <p:cNvPr id="165" name="PlaceHolder 2"/>
+          <p:cNvPr id="167" name="PlaceHolder 2"/>
           <p:cNvSpPr>
             <a:spLocks noGrp="1"/>
           </p:cNvSpPr>
@@ -32327,7 +31701,7 @@
         <p:spPr>
           <a:xfrm>
             <a:off x="838080" y="1825560"/>
-            <a:ext cx="10759680" cy="4744800"/>
+            <a:ext cx="10759320" cy="4744440"/>
           </a:xfrm>
           <a:prstGeom prst="rect">
             <a:avLst/>
@@ -32405,7 +31779,7 @@
       </p:grpSpPr>
       <p:sp>
         <p:nvSpPr>
-          <p:cNvPr id="166" name="PlaceHolder 1"/>
+          <p:cNvPr id="168" name="PlaceHolder 1"/>
           <p:cNvSpPr>
             <a:spLocks noGrp="1"/>
           </p:cNvSpPr>
@@ -32416,7 +31790,7 @@
         <p:spPr>
           <a:xfrm>
             <a:off x="838080" y="365040"/>
-            <a:ext cx="10512720" cy="1322640"/>
+            <a:ext cx="10512360" cy="1322280"/>
           </a:xfrm>
           <a:prstGeom prst="rect">
             <a:avLst/>
@@ -32471,7 +31845,7 @@
       </p:sp>
       <p:sp>
         <p:nvSpPr>
-          <p:cNvPr id="167" name="PlaceHolder 2"/>
+          <p:cNvPr id="169" name="PlaceHolder 2"/>
           <p:cNvSpPr>
             <a:spLocks noGrp="1"/>
           </p:cNvSpPr>
@@ -32482,7 +31856,7 @@
         <p:spPr>
           <a:xfrm>
             <a:off x="838080" y="1825560"/>
-            <a:ext cx="10759680" cy="4744800"/>
+            <a:ext cx="10759320" cy="4744440"/>
           </a:xfrm>
           <a:prstGeom prst="rect">
             <a:avLst/>
@@ -32560,7 +31934,7 @@
       </p:grpSpPr>
       <p:sp>
         <p:nvSpPr>
-          <p:cNvPr id="168" name="PlaceHolder 1"/>
+          <p:cNvPr id="170" name="PlaceHolder 1"/>
           <p:cNvSpPr>
             <a:spLocks noGrp="1"/>
           </p:cNvSpPr>
@@ -32571,7 +31945,7 @@
         <p:spPr>
           <a:xfrm>
             <a:off x="838080" y="365040"/>
-            <a:ext cx="10512720" cy="1322640"/>
+            <a:ext cx="10512360" cy="1322280"/>
           </a:xfrm>
           <a:prstGeom prst="rect">
             <a:avLst/>
@@ -32626,7 +32000,7 @@
       </p:sp>
       <p:sp>
         <p:nvSpPr>
-          <p:cNvPr id="169" name="PlaceHolder 2"/>
+          <p:cNvPr id="171" name="PlaceHolder 2"/>
           <p:cNvSpPr>
             <a:spLocks noGrp="1"/>
           </p:cNvSpPr>
@@ -32637,7 +32011,7 @@
         <p:spPr>
           <a:xfrm>
             <a:off x="838080" y="1825560"/>
-            <a:ext cx="10759680" cy="4744800"/>
+            <a:ext cx="10759320" cy="4744440"/>
           </a:xfrm>
           <a:prstGeom prst="rect">
             <a:avLst/>
@@ -32715,7 +32089,7 @@
       </p:grpSpPr>
       <p:sp>
         <p:nvSpPr>
-          <p:cNvPr id="170" name="PlaceHolder 1"/>
+          <p:cNvPr id="172" name="PlaceHolder 1"/>
           <p:cNvSpPr>
             <a:spLocks noGrp="1"/>
           </p:cNvSpPr>
@@ -32726,7 +32100,7 @@
         <p:spPr>
           <a:xfrm>
             <a:off x="838080" y="365040"/>
-            <a:ext cx="10512720" cy="1322640"/>
+            <a:ext cx="10512360" cy="1322280"/>
           </a:xfrm>
           <a:prstGeom prst="rect">
             <a:avLst/>
@@ -32781,7 +32155,7 @@
       </p:sp>
       <p:sp>
         <p:nvSpPr>
-          <p:cNvPr id="171" name="PlaceHolder 2"/>
+          <p:cNvPr id="173" name="PlaceHolder 2"/>
           <p:cNvSpPr>
             <a:spLocks noGrp="1"/>
           </p:cNvSpPr>
@@ -32792,7 +32166,7 @@
         <p:spPr>
           <a:xfrm>
             <a:off x="838080" y="1825560"/>
-            <a:ext cx="10759680" cy="4744800"/>
+            <a:ext cx="10759320" cy="4744440"/>
           </a:xfrm>
           <a:prstGeom prst="rect">
             <a:avLst/>
@@ -32870,7 +32244,7 @@
       </p:grpSpPr>
       <p:sp>
         <p:nvSpPr>
-          <p:cNvPr id="172" name="PlaceHolder 1"/>
+          <p:cNvPr id="174" name="PlaceHolder 1"/>
           <p:cNvSpPr>
             <a:spLocks noGrp="1"/>
           </p:cNvSpPr>
@@ -32881,7 +32255,7 @@
         <p:spPr>
           <a:xfrm>
             <a:off x="838080" y="365040"/>
-            <a:ext cx="10512720" cy="1322640"/>
+            <a:ext cx="10512360" cy="1322280"/>
           </a:xfrm>
           <a:prstGeom prst="rect">
             <a:avLst/>
@@ -32936,7 +32310,7 @@
       </p:sp>
       <p:sp>
         <p:nvSpPr>
-          <p:cNvPr id="173" name="PlaceHolder 2"/>
+          <p:cNvPr id="175" name="PlaceHolder 2"/>
           <p:cNvSpPr>
             <a:spLocks noGrp="1"/>
           </p:cNvSpPr>
@@ -32947,7 +32321,7 @@
         <p:spPr>
           <a:xfrm>
             <a:off x="838080" y="1825560"/>
-            <a:ext cx="10759680" cy="4744800"/>
+            <a:ext cx="10759320" cy="4744440"/>
           </a:xfrm>
           <a:prstGeom prst="rect">
             <a:avLst/>
@@ -33025,7 +32399,7 @@
       </p:grpSpPr>
       <p:sp>
         <p:nvSpPr>
-          <p:cNvPr id="174" name="PlaceHolder 1"/>
+          <p:cNvPr id="176" name="PlaceHolder 1"/>
           <p:cNvSpPr>
             <a:spLocks noGrp="1"/>
           </p:cNvSpPr>
@@ -33036,7 +32410,7 @@
         <p:spPr>
           <a:xfrm>
             <a:off x="838080" y="365040"/>
-            <a:ext cx="10512720" cy="1322640"/>
+            <a:ext cx="10512360" cy="1322280"/>
           </a:xfrm>
           <a:prstGeom prst="rect">
             <a:avLst/>
@@ -33091,7 +32465,7 @@
       </p:sp>
       <p:sp>
         <p:nvSpPr>
-          <p:cNvPr id="175" name="PlaceHolder 2"/>
+          <p:cNvPr id="177" name="PlaceHolder 2"/>
           <p:cNvSpPr>
             <a:spLocks noGrp="1"/>
           </p:cNvSpPr>
@@ -33102,7 +32476,7 @@
         <p:spPr>
           <a:xfrm>
             <a:off x="838080" y="1825560"/>
-            <a:ext cx="10759680" cy="4744800"/>
+            <a:ext cx="10759320" cy="4744440"/>
           </a:xfrm>
           <a:prstGeom prst="rect">
             <a:avLst/>
@@ -33180,7 +32554,7 @@
       </p:grpSpPr>
       <p:sp>
         <p:nvSpPr>
-          <p:cNvPr id="176" name="PlaceHolder 1"/>
+          <p:cNvPr id="178" name="PlaceHolder 1"/>
           <p:cNvSpPr>
             <a:spLocks noGrp="1"/>
           </p:cNvSpPr>
@@ -33191,7 +32565,7 @@
         <p:spPr>
           <a:xfrm>
             <a:off x="838080" y="365040"/>
-            <a:ext cx="10512720" cy="1322640"/>
+            <a:ext cx="10512360" cy="1322280"/>
           </a:xfrm>
           <a:prstGeom prst="rect">
             <a:avLst/>
@@ -33246,7 +32620,7 @@
       </p:sp>
       <p:sp>
         <p:nvSpPr>
-          <p:cNvPr id="177" name="PlaceHolder 2"/>
+          <p:cNvPr id="179" name="PlaceHolder 2"/>
           <p:cNvSpPr>
             <a:spLocks noGrp="1"/>
           </p:cNvSpPr>
@@ -33257,7 +32631,7 @@
         <p:spPr>
           <a:xfrm>
             <a:off x="838080" y="1825560"/>
-            <a:ext cx="10759680" cy="4744800"/>
+            <a:ext cx="10759320" cy="4744440"/>
           </a:xfrm>
           <a:prstGeom prst="rect">
             <a:avLst/>
@@ -33335,7 +32709,7 @@
       </p:grpSpPr>
       <p:sp>
         <p:nvSpPr>
-          <p:cNvPr id="178" name="PlaceHolder 1"/>
+          <p:cNvPr id="180" name="PlaceHolder 1"/>
           <p:cNvSpPr>
             <a:spLocks noGrp="1"/>
           </p:cNvSpPr>
@@ -33346,7 +32720,7 @@
         <p:spPr>
           <a:xfrm>
             <a:off x="838080" y="365040"/>
-            <a:ext cx="10512720" cy="1322640"/>
+            <a:ext cx="10512360" cy="1322280"/>
           </a:xfrm>
           <a:prstGeom prst="rect">
             <a:avLst/>
@@ -33391,7 +32765,7 @@
                 <a:latin typeface="Consolas"/>
                 <a:ea typeface="Noto Sans CJK SC"/>
               </a:rPr>
-              <a:t>Feature Engineering</a:t>
+              <a:t>Feature Engineering – Important features from LGBM</a:t>
             </a:r>
             <a:endParaRPr b="0" lang="en-US" sz="2400" spc="-1" strike="noStrike">
               <a:latin typeface="Arial"/>
@@ -33401,7 +32775,7 @@
       </p:sp>
       <p:sp>
         <p:nvSpPr>
-          <p:cNvPr id="179" name="PlaceHolder 2"/>
+          <p:cNvPr id="181" name="PlaceHolder 2"/>
           <p:cNvSpPr>
             <a:spLocks noGrp="1"/>
           </p:cNvSpPr>
@@ -33412,7 +32786,7 @@
         <p:spPr>
           <a:xfrm>
             <a:off x="838080" y="1825560"/>
-            <a:ext cx="10759680" cy="4744800"/>
+            <a:ext cx="10759320" cy="4744440"/>
           </a:xfrm>
           <a:prstGeom prst="rect">
             <a:avLst/>
@@ -33424,7 +32798,7 @@
         </p:spPr>
         <p:txBody>
           <a:bodyPr lIns="90000" rIns="90000" tIns="45000" bIns="45000" anchor="t">
-            <a:normAutofit/>
+            <a:normAutofit fontScale="69000"/>
           </a:bodyPr>
           <a:p>
             <a:pPr>
@@ -33437,14 +32811,602 @@
               <a:buNone/>
             </a:pPr>
             <a:r>
+              <a:rPr b="1" lang="en-SG" sz="1000" spc="-1" strike="noStrike" u="sng">
+                <a:solidFill>
+                  <a:srgbClr val="cccccc"/>
+                </a:solidFill>
+                <a:uFillTx/>
+                <a:latin typeface="Consolas"/>
+              </a:rPr>
+              <a:t>Important features 1</a:t>
+            </a:r>
+            <a:endParaRPr b="0" lang="en-US" sz="1000" spc="-1" strike="noStrike">
+              <a:latin typeface="Arial"/>
+            </a:endParaRPr>
+          </a:p>
+          <a:p>
+            <a:pPr>
+              <a:lnSpc>
+                <a:spcPct val="90000"/>
+              </a:lnSpc>
+              <a:spcBef>
+                <a:spcPts val="1001"/>
+              </a:spcBef>
+              <a:buNone/>
+            </a:pPr>
+            <a:r>
               <a:rPr b="0" lang="en-SG" sz="1000" spc="-1" strike="noStrike">
                 <a:solidFill>
                   <a:srgbClr val="cccccc"/>
                 </a:solidFill>
                 <a:latin typeface="Consolas"/>
               </a:rPr>
-              <a:t>1. </a:t>
-            </a:r>
+              <a:t>tbin_var_from_20</a:t>
+            </a:r>
+            <a:endParaRPr b="0" lang="en-US" sz="1000" spc="-1" strike="noStrike">
+              <a:latin typeface="Arial"/>
+            </a:endParaRPr>
+          </a:p>
+          <a:p>
+            <a:pPr>
+              <a:lnSpc>
+                <a:spcPct val="90000"/>
+              </a:lnSpc>
+              <a:spcBef>
+                <a:spcPts val="1001"/>
+              </a:spcBef>
+              <a:buNone/>
+            </a:pPr>
+            <a:r>
+              <a:rPr b="0" lang="en-SG" sz="1000" spc="-1" strike="noStrike">
+                <a:solidFill>
+                  <a:srgbClr val="cccccc"/>
+                </a:solidFill>
+                <a:latin typeface="Consolas"/>
+              </a:rPr>
+              <a:t>V1spprojt15f25</a:t>
+            </a:r>
+            <a:endParaRPr b="0" lang="en-US" sz="1000" spc="-1" strike="noStrike">
+              <a:latin typeface="Arial"/>
+            </a:endParaRPr>
+          </a:p>
+          <a:p>
+            <a:pPr>
+              <a:lnSpc>
+                <a:spcPct val="90000"/>
+              </a:lnSpc>
+              <a:spcBef>
+                <a:spcPts val="1001"/>
+              </a:spcBef>
+              <a:buNone/>
+            </a:pPr>
+            <a:r>
+              <a:rPr b="0" lang="en-SG" sz="1000" spc="-1" strike="noStrike">
+                <a:solidFill>
+                  <a:srgbClr val="cccccc"/>
+                </a:solidFill>
+                <a:latin typeface="Consolas"/>
+              </a:rPr>
+              <a:t>V1spprojt15f29</a:t>
+            </a:r>
+            <a:endParaRPr b="0" lang="en-US" sz="1000" spc="-1" strike="noStrike">
+              <a:latin typeface="Arial"/>
+            </a:endParaRPr>
+          </a:p>
+          <a:p>
+            <a:pPr>
+              <a:lnSpc>
+                <a:spcPct val="90000"/>
+              </a:lnSpc>
+              <a:spcBef>
+                <a:spcPts val="1001"/>
+              </a:spcBef>
+              <a:buNone/>
+            </a:pPr>
+            <a:r>
+              <a:rPr b="0" lang="en-SG" sz="1000" spc="-1" strike="noStrike">
+                <a:solidFill>
+                  <a:srgbClr val="cccccc"/>
+                </a:solidFill>
+                <a:latin typeface="Consolas"/>
+              </a:rPr>
+              <a:t>stock_id</a:t>
+            </a:r>
+            <a:endParaRPr b="0" lang="en-US" sz="1000" spc="-1" strike="noStrike">
+              <a:latin typeface="Arial"/>
+            </a:endParaRPr>
+          </a:p>
+          <a:p>
+            <a:pPr>
+              <a:lnSpc>
+                <a:spcPct val="90000"/>
+              </a:lnSpc>
+              <a:spcBef>
+                <a:spcPts val="1001"/>
+              </a:spcBef>
+              <a:buNone/>
+            </a:pPr>
+            <a:r>
+              <a:rPr b="0" lang="en-SG" sz="1000" spc="-1" strike="noStrike">
+                <a:solidFill>
+                  <a:srgbClr val="cccccc"/>
+                </a:solidFill>
+                <a:latin typeface="Consolas"/>
+              </a:rPr>
+              <a:t>vol1stock_mean_from_25</a:t>
+            </a:r>
+            <a:endParaRPr b="0" lang="en-US" sz="1000" spc="-1" strike="noStrike">
+              <a:latin typeface="Arial"/>
+            </a:endParaRPr>
+          </a:p>
+          <a:p>
+            <a:pPr>
+              <a:lnSpc>
+                <a:spcPct val="90000"/>
+              </a:lnSpc>
+              <a:spcBef>
+                <a:spcPts val="1001"/>
+              </a:spcBef>
+              <a:buNone/>
+            </a:pPr>
+            <a:r>
+              <a:rPr b="0" lang="en-SG" sz="1000" spc="-1" strike="noStrike">
+                <a:solidFill>
+                  <a:srgbClr val="cccccc"/>
+                </a:solidFill>
+                <a:latin typeface="Consolas"/>
+              </a:rPr>
+              <a:t>Vlsprojt5f25</a:t>
+            </a:r>
+            <a:endParaRPr b="0" lang="en-US" sz="1000" spc="-1" strike="noStrike">
+              <a:latin typeface="Arial"/>
+            </a:endParaRPr>
+          </a:p>
+          <a:p>
+            <a:pPr>
+              <a:lnSpc>
+                <a:spcPct val="90000"/>
+              </a:lnSpc>
+              <a:spcBef>
+                <a:spcPts val="1001"/>
+              </a:spcBef>
+              <a:buNone/>
+            </a:pPr>
+            <a:r>
+              <a:rPr b="0" lang="en-SG" sz="1000" spc="-1" strike="noStrike">
+                <a:solidFill>
+                  <a:srgbClr val="cccccc"/>
+                </a:solidFill>
+                <a:latin typeface="Consolas"/>
+              </a:rPr>
+              <a:t>tbin_var_from_10</a:t>
+            </a:r>
+            <a:endParaRPr b="0" lang="en-US" sz="1000" spc="-1" strike="noStrike">
+              <a:latin typeface="Arial"/>
+            </a:endParaRPr>
+          </a:p>
+          <a:p>
+            <a:pPr>
+              <a:lnSpc>
+                <a:spcPct val="90000"/>
+              </a:lnSpc>
+              <a:spcBef>
+                <a:spcPts val="1001"/>
+              </a:spcBef>
+              <a:buNone/>
+            </a:pPr>
+            <a:endParaRPr b="0" lang="en-US" sz="1000" spc="-1" strike="noStrike">
+              <a:latin typeface="Arial"/>
+            </a:endParaRPr>
+          </a:p>
+          <a:p>
+            <a:pPr>
+              <a:lnSpc>
+                <a:spcPct val="90000"/>
+              </a:lnSpc>
+              <a:spcBef>
+                <a:spcPts val="1001"/>
+              </a:spcBef>
+              <a:buNone/>
+            </a:pPr>
+            <a:r>
+              <a:rPr b="1" lang="en-SG" sz="1000" spc="-1" strike="noStrike" u="sng">
+                <a:solidFill>
+                  <a:srgbClr val="cccccc"/>
+                </a:solidFill>
+                <a:uFillTx/>
+                <a:latin typeface="Consolas"/>
+              </a:rPr>
+              <a:t>Important features 2</a:t>
+            </a:r>
+            <a:endParaRPr b="0" lang="en-US" sz="1000" spc="-1" strike="noStrike">
+              <a:latin typeface="Arial"/>
+            </a:endParaRPr>
+          </a:p>
+          <a:p>
+            <a:pPr>
+              <a:lnSpc>
+                <a:spcPct val="90000"/>
+              </a:lnSpc>
+              <a:spcBef>
+                <a:spcPts val="1001"/>
+              </a:spcBef>
+              <a:buNone/>
+            </a:pPr>
+            <a:r>
+              <a:rPr b="0" lang="en-SG" sz="1000" spc="-1" strike="noStrike">
+                <a:solidFill>
+                  <a:srgbClr val="cccccc"/>
+                </a:solidFill>
+                <a:latin typeface="Consolas"/>
+              </a:rPr>
+              <a:t>v1spprojt15f25_g1</a:t>
+            </a:r>
+            <a:endParaRPr b="0" lang="en-US" sz="1000" spc="-1" strike="noStrike">
+              <a:latin typeface="Arial"/>
+            </a:endParaRPr>
+          </a:p>
+          <a:p>
+            <a:pPr>
+              <a:lnSpc>
+                <a:spcPct val="90000"/>
+              </a:lnSpc>
+              <a:spcBef>
+                <a:spcPts val="1001"/>
+              </a:spcBef>
+              <a:buNone/>
+            </a:pPr>
+            <a:r>
+              <a:rPr b="0" lang="en-SG" sz="1000" spc="-1" strike="noStrike">
+                <a:solidFill>
+                  <a:srgbClr val="cccccc"/>
+                </a:solidFill>
+                <a:latin typeface="Consolas"/>
+              </a:rPr>
+              <a:t>tbin_var_from_20</a:t>
+            </a:r>
+            <a:endParaRPr b="0" lang="en-US" sz="1000" spc="-1" strike="noStrike">
+              <a:latin typeface="Arial"/>
+            </a:endParaRPr>
+          </a:p>
+          <a:p>
+            <a:pPr>
+              <a:lnSpc>
+                <a:spcPct val="90000"/>
+              </a:lnSpc>
+              <a:spcBef>
+                <a:spcPts val="1001"/>
+              </a:spcBef>
+              <a:buNone/>
+            </a:pPr>
+            <a:r>
+              <a:rPr b="0" lang="en-SG" sz="1000" spc="-1" strike="noStrike">
+                <a:solidFill>
+                  <a:srgbClr val="cccccc"/>
+                </a:solidFill>
+                <a:latin typeface="Consolas"/>
+              </a:rPr>
+              <a:t>V1spprojt15f25</a:t>
+            </a:r>
+            <a:endParaRPr b="0" lang="en-US" sz="1000" spc="-1" strike="noStrike">
+              <a:latin typeface="Arial"/>
+            </a:endParaRPr>
+          </a:p>
+          <a:p>
+            <a:pPr>
+              <a:lnSpc>
+                <a:spcPct val="90000"/>
+              </a:lnSpc>
+              <a:spcBef>
+                <a:spcPts val="1001"/>
+              </a:spcBef>
+              <a:buNone/>
+            </a:pPr>
+            <a:r>
+              <a:rPr b="0" lang="en-SG" sz="1000" spc="-1" strike="noStrike">
+                <a:solidFill>
+                  <a:srgbClr val="cccccc"/>
+                </a:solidFill>
+                <a:latin typeface="Consolas"/>
+              </a:rPr>
+              <a:t>V1spprojt15f29</a:t>
+            </a:r>
+            <a:endParaRPr b="0" lang="en-US" sz="1000" spc="-1" strike="noStrike">
+              <a:latin typeface="Arial"/>
+            </a:endParaRPr>
+          </a:p>
+          <a:p>
+            <a:pPr>
+              <a:lnSpc>
+                <a:spcPct val="90000"/>
+              </a:lnSpc>
+              <a:spcBef>
+                <a:spcPts val="1001"/>
+              </a:spcBef>
+              <a:buNone/>
+            </a:pPr>
+            <a:r>
+              <a:rPr b="0" lang="en-SG" sz="1000" spc="-1" strike="noStrike">
+                <a:solidFill>
+                  <a:srgbClr val="cccccc"/>
+                </a:solidFill>
+                <a:latin typeface="Consolas"/>
+              </a:rPr>
+              <a:t>vol1stock_mean_from_25</a:t>
+            </a:r>
+            <a:endParaRPr b="0" lang="en-US" sz="1000" spc="-1" strike="noStrike">
+              <a:latin typeface="Arial"/>
+            </a:endParaRPr>
+          </a:p>
+          <a:p>
+            <a:pPr>
+              <a:lnSpc>
+                <a:spcPct val="90000"/>
+              </a:lnSpc>
+              <a:spcBef>
+                <a:spcPts val="1001"/>
+              </a:spcBef>
+              <a:buNone/>
+            </a:pPr>
+            <a:r>
+              <a:rPr b="0" lang="en-SG" sz="1000" spc="-1" strike="noStrike">
+                <a:solidFill>
+                  <a:srgbClr val="cccccc"/>
+                </a:solidFill>
+                <a:latin typeface="Consolas"/>
+              </a:rPr>
+              <a:t>tbin_var_from_10</a:t>
+            </a:r>
+            <a:endParaRPr b="0" lang="en-US" sz="1000" spc="-1" strike="noStrike">
+              <a:latin typeface="Arial"/>
+            </a:endParaRPr>
+          </a:p>
+          <a:p>
+            <a:pPr>
+              <a:lnSpc>
+                <a:spcPct val="90000"/>
+              </a:lnSpc>
+              <a:spcBef>
+                <a:spcPts val="1001"/>
+              </a:spcBef>
+              <a:buNone/>
+            </a:pPr>
+            <a:r>
+              <a:rPr b="0" lang="en-SG" sz="1000" spc="-1" strike="noStrike">
+                <a:solidFill>
+                  <a:srgbClr val="cccccc"/>
+                </a:solidFill>
+                <a:latin typeface="Consolas"/>
+              </a:rPr>
+              <a:t>v1liq3projt5f25</a:t>
+            </a:r>
+            <a:endParaRPr b="0" lang="en-US" sz="1000" spc="-1" strike="noStrike">
+              <a:latin typeface="Arial"/>
+            </a:endParaRPr>
+          </a:p>
+          <a:p>
+            <a:pPr>
+              <a:lnSpc>
+                <a:spcPct val="90000"/>
+              </a:lnSpc>
+              <a:spcBef>
+                <a:spcPts val="1001"/>
+              </a:spcBef>
+              <a:buNone/>
+            </a:pPr>
+            <a:endParaRPr b="0" lang="en-US" sz="1000" spc="-1" strike="noStrike">
+              <a:latin typeface="Arial"/>
+            </a:endParaRPr>
+          </a:p>
+          <a:p>
+            <a:pPr>
+              <a:lnSpc>
+                <a:spcPct val="90000"/>
+              </a:lnSpc>
+              <a:spcBef>
+                <a:spcPts val="1001"/>
+              </a:spcBef>
+              <a:buNone/>
+            </a:pPr>
+            <a:r>
+              <a:rPr b="1" lang="en-SG" sz="1000" spc="-1" strike="noStrike" u="sng">
+                <a:solidFill>
+                  <a:srgbClr val="cccccc"/>
+                </a:solidFill>
+                <a:uFillTx/>
+                <a:latin typeface="Consolas"/>
+              </a:rPr>
+              <a:t>Important features 3</a:t>
+            </a:r>
+            <a:endParaRPr b="0" lang="en-US" sz="1000" spc="-1" strike="noStrike">
+              <a:latin typeface="Arial"/>
+            </a:endParaRPr>
+          </a:p>
+          <a:p>
+            <a:pPr>
+              <a:lnSpc>
+                <a:spcPct val="90000"/>
+              </a:lnSpc>
+              <a:spcBef>
+                <a:spcPts val="1001"/>
+              </a:spcBef>
+              <a:buNone/>
+            </a:pPr>
+            <a:r>
+              <a:rPr b="0" lang="en-SG" sz="1000" spc="-1" strike="noStrike">
+                <a:solidFill>
+                  <a:srgbClr val="cccccc"/>
+                </a:solidFill>
+                <a:latin typeface="Consolas"/>
+              </a:rPr>
+              <a:t>V1spprojt15f25</a:t>
+            </a:r>
+            <a:endParaRPr b="0" lang="en-US" sz="1000" spc="-1" strike="noStrike">
+              <a:latin typeface="Arial"/>
+            </a:endParaRPr>
+          </a:p>
+          <a:p>
+            <a:pPr>
+              <a:lnSpc>
+                <a:spcPct val="90000"/>
+              </a:lnSpc>
+              <a:spcBef>
+                <a:spcPts val="1001"/>
+              </a:spcBef>
+              <a:buNone/>
+            </a:pPr>
+            <a:r>
+              <a:rPr b="0" lang="en-SG" sz="1000" spc="-1" strike="noStrike">
+                <a:solidFill>
+                  <a:srgbClr val="cccccc"/>
+                </a:solidFill>
+                <a:latin typeface="Consolas"/>
+              </a:rPr>
+              <a:t>V1liq3sprojt5f25</a:t>
+            </a:r>
+            <a:endParaRPr b="0" lang="en-US" sz="1000" spc="-1" strike="noStrike">
+              <a:latin typeface="Arial"/>
+            </a:endParaRPr>
+          </a:p>
+          <a:p>
+            <a:pPr>
+              <a:lnSpc>
+                <a:spcPct val="90000"/>
+              </a:lnSpc>
+              <a:spcBef>
+                <a:spcPts val="1001"/>
+              </a:spcBef>
+              <a:buNone/>
+            </a:pPr>
+            <a:r>
+              <a:rPr b="0" lang="en-SG" sz="1000" spc="-1" strike="noStrike">
+                <a:solidFill>
+                  <a:srgbClr val="cccccc"/>
+                </a:solidFill>
+                <a:latin typeface="Consolas"/>
+              </a:rPr>
+              <a:t>vol1stock_mean_From_25</a:t>
+            </a:r>
+            <a:endParaRPr b="0" lang="en-US" sz="1000" spc="-1" strike="noStrike">
+              <a:latin typeface="Arial"/>
+            </a:endParaRPr>
+          </a:p>
+          <a:p>
+            <a:pPr>
+              <a:lnSpc>
+                <a:spcPct val="90000"/>
+              </a:lnSpc>
+              <a:spcBef>
+                <a:spcPts val="1001"/>
+              </a:spcBef>
+              <a:buNone/>
+            </a:pPr>
+            <a:r>
+              <a:rPr b="0" lang="en-SG" sz="1000" spc="-1" strike="noStrike">
+                <a:solidFill>
+                  <a:srgbClr val="cccccc"/>
+                </a:solidFill>
+                <a:latin typeface="Consolas"/>
+              </a:rPr>
+              <a:t>v1spprojt15f25_g1</a:t>
+            </a:r>
+            <a:endParaRPr b="0" lang="en-US" sz="1000" spc="-1" strike="noStrike">
+              <a:latin typeface="Arial"/>
+            </a:endParaRPr>
+          </a:p>
+          <a:p>
+            <a:pPr>
+              <a:lnSpc>
+                <a:spcPct val="90000"/>
+              </a:lnSpc>
+              <a:spcBef>
+                <a:spcPts val="1001"/>
+              </a:spcBef>
+              <a:buNone/>
+            </a:pPr>
+            <a:r>
+              <a:rPr b="0" lang="en-SG" sz="1000" spc="-1" strike="noStrike">
+                <a:solidFill>
+                  <a:srgbClr val="cccccc"/>
+                </a:solidFill>
+                <a:latin typeface="Consolas"/>
+              </a:rPr>
+              <a:t>V1spprojt15f29</a:t>
+            </a:r>
+            <a:endParaRPr b="0" lang="en-US" sz="1000" spc="-1" strike="noStrike">
+              <a:latin typeface="Arial"/>
+            </a:endParaRPr>
+          </a:p>
+          <a:p>
+            <a:pPr>
+              <a:lnSpc>
+                <a:spcPct val="90000"/>
+              </a:lnSpc>
+              <a:spcBef>
+                <a:spcPts val="1001"/>
+              </a:spcBef>
+              <a:buNone/>
+            </a:pPr>
+            <a:r>
+              <a:rPr b="0" lang="en-SG" sz="1000" spc="-1" strike="noStrike">
+                <a:solidFill>
+                  <a:srgbClr val="cccccc"/>
+                </a:solidFill>
+                <a:latin typeface="Consolas"/>
+              </a:rPr>
+              <a:t>cvol1_15_15s</a:t>
+            </a:r>
+            <a:endParaRPr b="0" lang="en-US" sz="1000" spc="-1" strike="noStrike">
+              <a:latin typeface="Arial"/>
+            </a:endParaRPr>
+          </a:p>
+          <a:p>
+            <a:pPr>
+              <a:lnSpc>
+                <a:spcPct val="90000"/>
+              </a:lnSpc>
+              <a:spcBef>
+                <a:spcPts val="1001"/>
+              </a:spcBef>
+              <a:buNone/>
+            </a:pPr>
+            <a:r>
+              <a:rPr b="0" lang="en-SG" sz="1000" spc="-1" strike="noStrike">
+                <a:solidFill>
+                  <a:srgbClr val="cccccc"/>
+                </a:solidFill>
+                <a:latin typeface="Consolas"/>
+              </a:rPr>
+              <a:t>vol1stock_mean_from_20</a:t>
+            </a:r>
+            <a:endParaRPr b="0" lang="en-US" sz="1000" spc="-1" strike="noStrike">
+              <a:latin typeface="Arial"/>
+            </a:endParaRPr>
+          </a:p>
+          <a:p>
+            <a:pPr>
+              <a:lnSpc>
+                <a:spcPct val="90000"/>
+              </a:lnSpc>
+              <a:spcBef>
+                <a:spcPts val="1001"/>
+              </a:spcBef>
+              <a:buNone/>
+            </a:pPr>
+            <a:endParaRPr b="0" lang="en-US" sz="1000" spc="-1" strike="noStrike">
+              <a:latin typeface="Arial"/>
+            </a:endParaRPr>
+          </a:p>
+          <a:p>
+            <a:pPr>
+              <a:lnSpc>
+                <a:spcPct val="90000"/>
+              </a:lnSpc>
+              <a:spcBef>
+                <a:spcPts val="1001"/>
+              </a:spcBef>
+              <a:buNone/>
+            </a:pPr>
             <a:endParaRPr b="0" lang="en-US" sz="1000" spc="-1" strike="noStrike">
               <a:latin typeface="Arial"/>
             </a:endParaRPr>
@@ -33490,7 +33452,7 @@
         <p:spPr>
           <a:xfrm>
             <a:off x="190440" y="444600"/>
-            <a:ext cx="5369400" cy="1735560"/>
+            <a:ext cx="5369040" cy="1735560"/>
           </a:xfrm>
           <a:prstGeom prst="rect">
             <a:avLst/>
@@ -33587,7 +33549,7 @@
         <p:spPr>
           <a:xfrm>
             <a:off x="190440" y="2323080"/>
-            <a:ext cx="5369400" cy="912600"/>
+            <a:ext cx="5369040" cy="912600"/>
           </a:xfrm>
           <a:prstGeom prst="rect">
             <a:avLst/>
@@ -33655,7 +33617,7 @@
         <p:spPr>
           <a:xfrm>
             <a:off x="190440" y="3371040"/>
-            <a:ext cx="5369400" cy="2284200"/>
+            <a:ext cx="5369040" cy="2284200"/>
           </a:xfrm>
           <a:prstGeom prst="rect">
             <a:avLst/>
@@ -33710,7 +33672,7 @@
         <p:spPr>
           <a:xfrm>
             <a:off x="190440" y="5356080"/>
-            <a:ext cx="5369400" cy="1735560"/>
+            <a:ext cx="5369040" cy="1735560"/>
           </a:xfrm>
           <a:prstGeom prst="rect">
             <a:avLst/>
@@ -33765,7 +33727,7 @@
         <p:spPr>
           <a:xfrm>
             <a:off x="6337440" y="318600"/>
-            <a:ext cx="5369400" cy="2832840"/>
+            <a:ext cx="5369040" cy="2832840"/>
           </a:xfrm>
           <a:prstGeom prst="rect">
             <a:avLst/>
@@ -33914,7 +33876,7 @@
       </p:grpSpPr>
       <p:sp>
         <p:nvSpPr>
-          <p:cNvPr id="180" name="PlaceHolder 1"/>
+          <p:cNvPr id="182" name="PlaceHolder 1"/>
           <p:cNvSpPr>
             <a:spLocks noGrp="1"/>
           </p:cNvSpPr>
@@ -33925,7 +33887,7 @@
         <p:spPr>
           <a:xfrm>
             <a:off x="838080" y="365040"/>
-            <a:ext cx="10512720" cy="1322640"/>
+            <a:ext cx="10512360" cy="1322280"/>
           </a:xfrm>
           <a:prstGeom prst="rect">
             <a:avLst/>
@@ -33980,7 +33942,7 @@
       </p:sp>
       <p:sp>
         <p:nvSpPr>
-          <p:cNvPr id="181" name="PlaceHolder 2"/>
+          <p:cNvPr id="183" name="PlaceHolder 2"/>
           <p:cNvSpPr>
             <a:spLocks noGrp="1"/>
           </p:cNvSpPr>
@@ -33991,7 +33953,7 @@
         <p:spPr>
           <a:xfrm>
             <a:off x="838080" y="1825560"/>
-            <a:ext cx="10759680" cy="4744800"/>
+            <a:ext cx="10759320" cy="4744440"/>
           </a:xfrm>
           <a:prstGeom prst="rect">
             <a:avLst/>
@@ -34069,7 +34031,7 @@
       </p:grpSpPr>
       <p:sp>
         <p:nvSpPr>
-          <p:cNvPr id="182" name="PlaceHolder 1"/>
+          <p:cNvPr id="184" name="PlaceHolder 1"/>
           <p:cNvSpPr>
             <a:spLocks noGrp="1"/>
           </p:cNvSpPr>
@@ -34080,7 +34042,7 @@
         <p:spPr>
           <a:xfrm>
             <a:off x="838080" y="365040"/>
-            <a:ext cx="10512720" cy="1322640"/>
+            <a:ext cx="10512360" cy="1322280"/>
           </a:xfrm>
           <a:prstGeom prst="rect">
             <a:avLst/>
@@ -34135,7 +34097,7 @@
       </p:sp>
       <p:sp>
         <p:nvSpPr>
-          <p:cNvPr id="183" name="PlaceHolder 2"/>
+          <p:cNvPr id="185" name="PlaceHolder 2"/>
           <p:cNvSpPr>
             <a:spLocks noGrp="1"/>
           </p:cNvSpPr>
@@ -34146,7 +34108,7 @@
         <p:spPr>
           <a:xfrm>
             <a:off x="838080" y="1825560"/>
-            <a:ext cx="10759680" cy="4744800"/>
+            <a:ext cx="10759320" cy="4744440"/>
           </a:xfrm>
           <a:prstGeom prst="rect">
             <a:avLst/>
@@ -34224,7 +34186,7 @@
       </p:grpSpPr>
       <p:sp>
         <p:nvSpPr>
-          <p:cNvPr id="184" name="PlaceHolder 1"/>
+          <p:cNvPr id="186" name="PlaceHolder 1"/>
           <p:cNvSpPr>
             <a:spLocks noGrp="1"/>
           </p:cNvSpPr>
@@ -34235,7 +34197,7 @@
         <p:spPr>
           <a:xfrm>
             <a:off x="838080" y="365040"/>
-            <a:ext cx="10512720" cy="1322640"/>
+            <a:ext cx="10512360" cy="1322280"/>
           </a:xfrm>
           <a:prstGeom prst="rect">
             <a:avLst/>
@@ -34290,7 +34252,7 @@
       </p:sp>
       <p:sp>
         <p:nvSpPr>
-          <p:cNvPr id="185" name="PlaceHolder 2"/>
+          <p:cNvPr id="187" name="PlaceHolder 2"/>
           <p:cNvSpPr>
             <a:spLocks noGrp="1"/>
           </p:cNvSpPr>
@@ -34301,7 +34263,7 @@
         <p:spPr>
           <a:xfrm>
             <a:off x="838080" y="1825560"/>
-            <a:ext cx="10759680" cy="4744800"/>
+            <a:ext cx="10759320" cy="4744440"/>
           </a:xfrm>
           <a:prstGeom prst="rect">
             <a:avLst/>
@@ -34379,7 +34341,7 @@
       </p:grpSpPr>
       <p:sp>
         <p:nvSpPr>
-          <p:cNvPr id="186" name="PlaceHolder 1"/>
+          <p:cNvPr id="188" name="PlaceHolder 1"/>
           <p:cNvSpPr>
             <a:spLocks noGrp="1"/>
           </p:cNvSpPr>
@@ -34390,7 +34352,7 @@
         <p:spPr>
           <a:xfrm>
             <a:off x="838080" y="365040"/>
-            <a:ext cx="10512720" cy="1322640"/>
+            <a:ext cx="10512360" cy="1322280"/>
           </a:xfrm>
           <a:prstGeom prst="rect">
             <a:avLst/>
@@ -34445,7 +34407,7 @@
       </p:sp>
       <p:sp>
         <p:nvSpPr>
-          <p:cNvPr id="187" name="PlaceHolder 2"/>
+          <p:cNvPr id="189" name="PlaceHolder 2"/>
           <p:cNvSpPr>
             <a:spLocks noGrp="1"/>
           </p:cNvSpPr>
@@ -34456,7 +34418,7 @@
         <p:spPr>
           <a:xfrm>
             <a:off x="838080" y="1825560"/>
-            <a:ext cx="10759680" cy="4744800"/>
+            <a:ext cx="10759320" cy="4744440"/>
           </a:xfrm>
           <a:prstGeom prst="rect">
             <a:avLst/>
@@ -34534,7 +34496,7 @@
       </p:grpSpPr>
       <p:sp>
         <p:nvSpPr>
-          <p:cNvPr id="188" name="PlaceHolder 1"/>
+          <p:cNvPr id="190" name="PlaceHolder 1"/>
           <p:cNvSpPr>
             <a:spLocks noGrp="1"/>
           </p:cNvSpPr>
@@ -34545,7 +34507,7 @@
         <p:spPr>
           <a:xfrm>
             <a:off x="838080" y="365040"/>
-            <a:ext cx="10512720" cy="1322640"/>
+            <a:ext cx="10512360" cy="1322280"/>
           </a:xfrm>
           <a:prstGeom prst="rect">
             <a:avLst/>
@@ -34564,9 +34526,6 @@
               <a:lnSpc>
                 <a:spcPct val="90000"/>
               </a:lnSpc>
-              <a:spcBef>
-                <a:spcPts val="1001"/>
-              </a:spcBef>
               <a:buNone/>
             </a:pPr>
             <a:r>
@@ -34575,24 +34534,10 @@
                   <a:srgbClr val="ffffff"/>
                 </a:solidFill>
                 <a:latin typeface="Calibri Light"/>
-                <a:ea typeface="Noto Sans CJK SC"/>
               </a:rPr>
               <a:t>Reference: Jacoby jager’s FE code</a:t>
             </a:r>
-            <a:br>
-              <a:rPr sz="4400"/>
-            </a:br>
-            <a:r>
-              <a:rPr b="0" lang="en-SG" sz="2400" spc="-1" strike="noStrike">
-                <a:solidFill>
-                  <a:srgbClr val="cccccc"/>
-                </a:solidFill>
-                <a:latin typeface="Consolas"/>
-                <a:ea typeface="Noto Sans CJK SC"/>
-              </a:rPr>
-              <a:t>Feature Engineering</a:t>
-            </a:r>
-            <a:endParaRPr b="0" lang="en-US" sz="2400" spc="-1" strike="noStrike">
+            <a:endParaRPr b="0" lang="en-US" sz="4400" spc="-1" strike="noStrike">
               <a:latin typeface="Arial"/>
             </a:endParaRPr>
           </a:p>
@@ -34600,7 +34545,7 @@
       </p:sp>
       <p:sp>
         <p:nvSpPr>
-          <p:cNvPr id="189" name="PlaceHolder 2"/>
+          <p:cNvPr id="191" name="PlaceHolder 2"/>
           <p:cNvSpPr>
             <a:spLocks noGrp="1"/>
           </p:cNvSpPr>
@@ -34611,7 +34556,7 @@
         <p:spPr>
           <a:xfrm>
             <a:off x="838080" y="1825560"/>
-            <a:ext cx="10759680" cy="4744800"/>
+            <a:ext cx="10759320" cy="4744440"/>
           </a:xfrm>
           <a:prstGeom prst="rect">
             <a:avLst/>
@@ -34689,7 +34634,7 @@
       </p:grpSpPr>
       <p:sp>
         <p:nvSpPr>
-          <p:cNvPr id="190" name="PlaceHolder 1"/>
+          <p:cNvPr id="192" name="PlaceHolder 1"/>
           <p:cNvSpPr>
             <a:spLocks noGrp="1"/>
           </p:cNvSpPr>
@@ -34700,7 +34645,7 @@
         <p:spPr>
           <a:xfrm>
             <a:off x="838080" y="365040"/>
-            <a:ext cx="10512720" cy="1322640"/>
+            <a:ext cx="10512360" cy="1322280"/>
           </a:xfrm>
           <a:prstGeom prst="rect">
             <a:avLst/>
@@ -34719,9 +34664,6 @@
               <a:lnSpc>
                 <a:spcPct val="90000"/>
               </a:lnSpc>
-              <a:spcBef>
-                <a:spcPts val="1001"/>
-              </a:spcBef>
               <a:buNone/>
             </a:pPr>
             <a:r>
@@ -34730,24 +34672,10 @@
                   <a:srgbClr val="ffffff"/>
                 </a:solidFill>
                 <a:latin typeface="Calibri Light"/>
-                <a:ea typeface="Noto Sans CJK SC"/>
               </a:rPr>
               <a:t>Reference: Jacoby jager’s FE code</a:t>
             </a:r>
-            <a:br>
-              <a:rPr sz="4400"/>
-            </a:br>
-            <a:r>
-              <a:rPr b="0" lang="en-SG" sz="2400" spc="-1" strike="noStrike">
-                <a:solidFill>
-                  <a:srgbClr val="cccccc"/>
-                </a:solidFill>
-                <a:latin typeface="Consolas"/>
-                <a:ea typeface="Noto Sans CJK SC"/>
-              </a:rPr>
-              <a:t>Feature Engineering</a:t>
-            </a:r>
-            <a:endParaRPr b="0" lang="en-US" sz="2400" spc="-1" strike="noStrike">
+            <a:endParaRPr b="0" lang="en-US" sz="4400" spc="-1" strike="noStrike">
               <a:latin typeface="Arial"/>
             </a:endParaRPr>
           </a:p>
@@ -34755,7 +34683,7 @@
       </p:sp>
       <p:sp>
         <p:nvSpPr>
-          <p:cNvPr id="191" name="PlaceHolder 2"/>
+          <p:cNvPr id="193" name="PlaceHolder 2"/>
           <p:cNvSpPr>
             <a:spLocks noGrp="1"/>
           </p:cNvSpPr>
@@ -34766,7 +34694,7 @@
         <p:spPr>
           <a:xfrm>
             <a:off x="838080" y="1825560"/>
-            <a:ext cx="10759680" cy="4744800"/>
+            <a:ext cx="10759320" cy="4744440"/>
           </a:xfrm>
           <a:prstGeom prst="rect">
             <a:avLst/>
@@ -34844,7 +34772,7 @@
       </p:grpSpPr>
       <p:sp>
         <p:nvSpPr>
-          <p:cNvPr id="192" name="PlaceHolder 1"/>
+          <p:cNvPr id="194" name="PlaceHolder 1"/>
           <p:cNvSpPr>
             <a:spLocks noGrp="1"/>
           </p:cNvSpPr>
@@ -34855,7 +34783,7 @@
         <p:spPr>
           <a:xfrm>
             <a:off x="838080" y="365040"/>
-            <a:ext cx="10512720" cy="1322640"/>
+            <a:ext cx="10512360" cy="1322280"/>
           </a:xfrm>
           <a:prstGeom prst="rect">
             <a:avLst/>
@@ -34893,7 +34821,7 @@
       </p:sp>
       <p:sp>
         <p:nvSpPr>
-          <p:cNvPr id="193" name="PlaceHolder 2"/>
+          <p:cNvPr id="195" name="PlaceHolder 2"/>
           <p:cNvSpPr>
             <a:spLocks noGrp="1"/>
           </p:cNvSpPr>
@@ -34904,7 +34832,7 @@
         <p:spPr>
           <a:xfrm>
             <a:off x="838080" y="1825560"/>
-            <a:ext cx="10759680" cy="4744800"/>
+            <a:ext cx="10759320" cy="4744440"/>
           </a:xfrm>
           <a:prstGeom prst="rect">
             <a:avLst/>
@@ -34982,144 +34910,6 @@
       </p:grpSpPr>
       <p:sp>
         <p:nvSpPr>
-          <p:cNvPr id="194" name="PlaceHolder 1"/>
-          <p:cNvSpPr>
-            <a:spLocks noGrp="1"/>
-          </p:cNvSpPr>
-          <p:nvPr>
-            <p:ph type="title"/>
-          </p:nvPr>
-        </p:nvSpPr>
-        <p:spPr>
-          <a:xfrm>
-            <a:off x="838080" y="365040"/>
-            <a:ext cx="10512720" cy="1322640"/>
-          </a:xfrm>
-          <a:prstGeom prst="rect">
-            <a:avLst/>
-          </a:prstGeom>
-          <a:noFill/>
-          <a:ln w="0">
-            <a:noFill/>
-          </a:ln>
-        </p:spPr>
-        <p:txBody>
-          <a:bodyPr lIns="90000" rIns="90000" tIns="45000" bIns="45000" anchor="ctr">
-            <a:noAutofit/>
-          </a:bodyPr>
-          <a:p>
-            <a:pPr>
-              <a:lnSpc>
-                <a:spcPct val="90000"/>
-              </a:lnSpc>
-              <a:buNone/>
-            </a:pPr>
-            <a:r>
-              <a:rPr b="0" lang="en-SG" sz="4400" spc="-1" strike="noStrike">
-                <a:solidFill>
-                  <a:srgbClr val="ffffff"/>
-                </a:solidFill>
-                <a:latin typeface="Calibri Light"/>
-              </a:rPr>
-              <a:t>Reference: Jacoby jager’s FE code</a:t>
-            </a:r>
-            <a:endParaRPr b="0" lang="en-US" sz="4400" spc="-1" strike="noStrike">
-              <a:latin typeface="Arial"/>
-            </a:endParaRPr>
-          </a:p>
-        </p:txBody>
-      </p:sp>
-      <p:sp>
-        <p:nvSpPr>
-          <p:cNvPr id="195" name="PlaceHolder 2"/>
-          <p:cNvSpPr>
-            <a:spLocks noGrp="1"/>
-          </p:cNvSpPr>
-          <p:nvPr>
-            <p:ph/>
-          </p:nvPr>
-        </p:nvSpPr>
-        <p:spPr>
-          <a:xfrm>
-            <a:off x="838080" y="1825560"/>
-            <a:ext cx="10759680" cy="4744800"/>
-          </a:xfrm>
-          <a:prstGeom prst="rect">
-            <a:avLst/>
-          </a:prstGeom>
-          <a:noFill/>
-          <a:ln w="0">
-            <a:noFill/>
-          </a:ln>
-        </p:spPr>
-        <p:txBody>
-          <a:bodyPr lIns="90000" rIns="90000" tIns="45000" bIns="45000" anchor="t">
-            <a:normAutofit/>
-          </a:bodyPr>
-          <a:p>
-            <a:pPr>
-              <a:lnSpc>
-                <a:spcPct val="90000"/>
-              </a:lnSpc>
-              <a:spcBef>
-                <a:spcPts val="1001"/>
-              </a:spcBef>
-              <a:buNone/>
-            </a:pPr>
-            <a:r>
-              <a:rPr b="0" lang="en-SG" sz="1000" spc="-1" strike="noStrike">
-                <a:solidFill>
-                  <a:srgbClr val="cccccc"/>
-                </a:solidFill>
-                <a:latin typeface="Consolas"/>
-              </a:rPr>
-              <a:t>1. </a:t>
-            </a:r>
-            <a:endParaRPr b="0" lang="en-US" sz="1000" spc="-1" strike="noStrike">
-              <a:latin typeface="Arial"/>
-            </a:endParaRPr>
-          </a:p>
-        </p:txBody>
-      </p:sp>
-    </p:spTree>
-  </p:cSld>
-  <mc:AlternateContent>
-    <mc:Choice Requires="p14">
-      <p:transition spd="slow" p14:dur="2000"/>
-    </mc:Choice>
-    <mc:Fallback>
-      <p:transition spd="slow"/>
-    </mc:Fallback>
-  </mc:AlternateContent>
-</p:sld>
-</file>
-
-<file path=ppt/slides/slide48.xml><?xml version="1.0" encoding="utf-8"?>
-<p:sld xmlns:a="http://schemas.openxmlformats.org/drawingml/2006/main" xmlns:p="http://schemas.openxmlformats.org/presentationml/2006/main" xmlns:r="http://schemas.openxmlformats.org/officeDocument/2006/relationships" xmlns:p14="http://schemas.microsoft.com/office/powerpoint/2010/main" xmlns:p15="http://schemas.microsoft.com/office/powerpoint/2012/main" xmlns:mc="http://schemas.openxmlformats.org/markup-compatibility/2006">
-  <p:cSld>
-    <p:bg>
-      <p:bgPr>
-        <a:solidFill>
-          <a:srgbClr val="000000"/>
-        </a:solidFill>
-      </p:bgPr>
-    </p:bg>
-    <p:spTree>
-      <p:nvGrpSpPr>
-        <p:cNvPr id="1" name=""/>
-        <p:cNvGrpSpPr/>
-        <p:nvPr/>
-      </p:nvGrpSpPr>
-      <p:grpSpPr>
-        <a:xfrm>
-          <a:off x="0" y="0"/>
-          <a:ext cx="0" cy="0"/>
-          <a:chOff x="0" y="0"/>
-          <a:chExt cx="0" cy="0"/>
-        </a:xfrm>
-      </p:grpSpPr>
-      <p:sp>
-        <p:nvSpPr>
           <p:cNvPr id="196" name="PlaceHolder 1"/>
           <p:cNvSpPr>
             <a:spLocks noGrp="1"/>
@@ -35131,7 +34921,7 @@
         <p:spPr>
           <a:xfrm>
             <a:off x="838080" y="365040"/>
-            <a:ext cx="10512720" cy="1322640"/>
+            <a:ext cx="10512360" cy="1322280"/>
           </a:xfrm>
           <a:prstGeom prst="rect">
             <a:avLst/>
@@ -35180,145 +34970,7 @@
         <p:spPr>
           <a:xfrm>
             <a:off x="838080" y="1825560"/>
-            <a:ext cx="10759680" cy="4744800"/>
-          </a:xfrm>
-          <a:prstGeom prst="rect">
-            <a:avLst/>
-          </a:prstGeom>
-          <a:noFill/>
-          <a:ln w="0">
-            <a:noFill/>
-          </a:ln>
-        </p:spPr>
-        <p:txBody>
-          <a:bodyPr lIns="90000" rIns="90000" tIns="45000" bIns="45000" anchor="t">
-            <a:normAutofit/>
-          </a:bodyPr>
-          <a:p>
-            <a:pPr>
-              <a:lnSpc>
-                <a:spcPct val="90000"/>
-              </a:lnSpc>
-              <a:spcBef>
-                <a:spcPts val="1001"/>
-              </a:spcBef>
-              <a:buNone/>
-            </a:pPr>
-            <a:r>
-              <a:rPr b="0" lang="en-SG" sz="1000" spc="-1" strike="noStrike">
-                <a:solidFill>
-                  <a:srgbClr val="cccccc"/>
-                </a:solidFill>
-                <a:latin typeface="Consolas"/>
-              </a:rPr>
-              <a:t>1. </a:t>
-            </a:r>
-            <a:endParaRPr b="0" lang="en-US" sz="1000" spc="-1" strike="noStrike">
-              <a:latin typeface="Arial"/>
-            </a:endParaRPr>
-          </a:p>
-        </p:txBody>
-      </p:sp>
-    </p:spTree>
-  </p:cSld>
-  <mc:AlternateContent>
-    <mc:Choice Requires="p14">
-      <p:transition spd="slow" p14:dur="2000"/>
-    </mc:Choice>
-    <mc:Fallback>
-      <p:transition spd="slow"/>
-    </mc:Fallback>
-  </mc:AlternateContent>
-</p:sld>
-</file>
-
-<file path=ppt/slides/slide49.xml><?xml version="1.0" encoding="utf-8"?>
-<p:sld xmlns:a="http://schemas.openxmlformats.org/drawingml/2006/main" xmlns:p="http://schemas.openxmlformats.org/presentationml/2006/main" xmlns:r="http://schemas.openxmlformats.org/officeDocument/2006/relationships" xmlns:p14="http://schemas.microsoft.com/office/powerpoint/2010/main" xmlns:p15="http://schemas.microsoft.com/office/powerpoint/2012/main" xmlns:mc="http://schemas.openxmlformats.org/markup-compatibility/2006">
-  <p:cSld>
-    <p:bg>
-      <p:bgPr>
-        <a:solidFill>
-          <a:srgbClr val="000000"/>
-        </a:solidFill>
-      </p:bgPr>
-    </p:bg>
-    <p:spTree>
-      <p:nvGrpSpPr>
-        <p:cNvPr id="1" name=""/>
-        <p:cNvGrpSpPr/>
-        <p:nvPr/>
-      </p:nvGrpSpPr>
-      <p:grpSpPr>
-        <a:xfrm>
-          <a:off x="0" y="0"/>
-          <a:ext cx="0" cy="0"/>
-          <a:chOff x="0" y="0"/>
-          <a:chExt cx="0" cy="0"/>
-        </a:xfrm>
-      </p:grpSpPr>
-      <p:sp>
-        <p:nvSpPr>
-          <p:cNvPr id="198" name="PlaceHolder 1"/>
-          <p:cNvSpPr>
-            <a:spLocks noGrp="1"/>
-          </p:cNvSpPr>
-          <p:nvPr>
-            <p:ph type="title"/>
-          </p:nvPr>
-        </p:nvSpPr>
-        <p:spPr>
-          <a:xfrm>
-            <a:off x="838080" y="365040"/>
-            <a:ext cx="10512720" cy="1322640"/>
-          </a:xfrm>
-          <a:prstGeom prst="rect">
-            <a:avLst/>
-          </a:prstGeom>
-          <a:noFill/>
-          <a:ln w="0">
-            <a:noFill/>
-          </a:ln>
-        </p:spPr>
-        <p:txBody>
-          <a:bodyPr lIns="90000" rIns="90000" tIns="45000" bIns="45000" anchor="ctr">
-            <a:noAutofit/>
-          </a:bodyPr>
-          <a:p>
-            <a:pPr>
-              <a:lnSpc>
-                <a:spcPct val="90000"/>
-              </a:lnSpc>
-              <a:buNone/>
-            </a:pPr>
-            <a:r>
-              <a:rPr b="0" lang="en-SG" sz="4400" spc="-1" strike="noStrike">
-                <a:solidFill>
-                  <a:srgbClr val="ffffff"/>
-                </a:solidFill>
-                <a:latin typeface="Calibri Light"/>
-              </a:rPr>
-              <a:t>Reference: Jacoby jager’s FE code</a:t>
-            </a:r>
-            <a:endParaRPr b="0" lang="en-US" sz="4400" spc="-1" strike="noStrike">
-              <a:latin typeface="Arial"/>
-            </a:endParaRPr>
-          </a:p>
-        </p:txBody>
-      </p:sp>
-      <p:sp>
-        <p:nvSpPr>
-          <p:cNvPr id="199" name="PlaceHolder 2"/>
-          <p:cNvSpPr>
-            <a:spLocks noGrp="1"/>
-          </p:cNvSpPr>
-          <p:nvPr>
-            <p:ph/>
-          </p:nvPr>
-        </p:nvSpPr>
-        <p:spPr>
-          <a:xfrm>
-            <a:off x="838080" y="1825560"/>
-            <a:ext cx="10759680" cy="4744800"/>
+            <a:ext cx="10759320" cy="4744440"/>
           </a:xfrm>
           <a:prstGeom prst="rect">
             <a:avLst/>
@@ -35396,7 +35048,7 @@
         <p:spPr>
           <a:xfrm>
             <a:off x="202680" y="147240"/>
-            <a:ext cx="989280" cy="638280"/>
+            <a:ext cx="988920" cy="638280"/>
           </a:xfrm>
           <a:prstGeom prst="rect">
             <a:avLst/>
@@ -35451,7 +35103,7 @@
         <p:spPr>
           <a:xfrm>
             <a:off x="1283040" y="1018080"/>
-            <a:ext cx="911520" cy="911520"/>
+            <a:ext cx="911160" cy="911160"/>
           </a:xfrm>
           <a:prstGeom prst="roundRect">
             <a:avLst>
@@ -35520,7 +35172,7 @@
         <p:spPr>
           <a:xfrm>
             <a:off x="243720" y="5844240"/>
-            <a:ext cx="911520" cy="911520"/>
+            <a:ext cx="911160" cy="911160"/>
           </a:xfrm>
           <a:prstGeom prst="roundRect">
             <a:avLst>
@@ -35588,8 +35240,8 @@
         </p:nvSpPr>
         <p:spPr>
           <a:xfrm flipH="1" rot="16200000">
-            <a:off x="650160" y="842400"/>
-            <a:ext cx="678600" cy="581400"/>
+            <a:off x="650520" y="842400"/>
+            <a:ext cx="678240" cy="581040"/>
           </a:xfrm>
           <a:prstGeom prst="bentConnector2">
             <a:avLst/>
@@ -35623,8 +35275,8 @@
         </p:nvSpPr>
         <p:spPr>
           <a:xfrm flipH="1" rot="16200000">
-            <a:off x="-1824480" y="3317400"/>
-            <a:ext cx="5047560" cy="360"/>
+            <a:off x="-1824840" y="3317040"/>
+            <a:ext cx="5047200" cy="360"/>
           </a:xfrm>
           <a:prstGeom prst="bentConnector3">
             <a:avLst>
@@ -35661,7 +35313,7 @@
         <p:spPr>
           <a:xfrm>
             <a:off x="2660040" y="83520"/>
-            <a:ext cx="5697000" cy="5891040"/>
+            <a:ext cx="5696640" cy="5890680"/>
           </a:xfrm>
           <a:prstGeom prst="roundRect">
             <a:avLst>
@@ -36072,7 +35724,7 @@
         <p:spPr>
           <a:xfrm>
             <a:off x="8427960" y="479520"/>
-            <a:ext cx="3513960" cy="1347840"/>
+            <a:ext cx="3513600" cy="1347480"/>
           </a:xfrm>
           <a:prstGeom prst="rect">
             <a:avLst/>
@@ -36095,7 +35747,7 @@
         <p:spPr>
           <a:xfrm>
             <a:off x="8427960" y="2002680"/>
-            <a:ext cx="3506400" cy="1601280"/>
+            <a:ext cx="3506040" cy="1600920"/>
           </a:xfrm>
           <a:prstGeom prst="rect">
             <a:avLst/>
@@ -36118,7 +35770,7 @@
         <p:spPr>
           <a:xfrm>
             <a:off x="8427960" y="3779640"/>
-            <a:ext cx="2627280" cy="936720"/>
+            <a:ext cx="2626920" cy="936360"/>
           </a:xfrm>
           <a:prstGeom prst="rect">
             <a:avLst/>
@@ -36141,7 +35793,7 @@
         <p:spPr>
           <a:xfrm>
             <a:off x="8427960" y="4827960"/>
-            <a:ext cx="2080080" cy="1146600"/>
+            <a:ext cx="2079720" cy="1146240"/>
           </a:xfrm>
           <a:prstGeom prst="rect">
             <a:avLst/>
@@ -36194,7 +35846,7 @@
         <p:spPr>
           <a:xfrm>
             <a:off x="838080" y="365040"/>
-            <a:ext cx="10512720" cy="1322640"/>
+            <a:ext cx="10512360" cy="1322280"/>
           </a:xfrm>
           <a:prstGeom prst="rect">
             <a:avLst/>
@@ -36243,7 +35895,7 @@
         <p:spPr>
           <a:xfrm>
             <a:off x="838080" y="1825560"/>
-            <a:ext cx="10512720" cy="4917600"/>
+            <a:ext cx="10512360" cy="4917240"/>
           </a:xfrm>
           <a:prstGeom prst="rect">
             <a:avLst/>
@@ -36552,7 +36204,7 @@
         <p:spPr>
           <a:xfrm>
             <a:off x="8089920" y="6279840"/>
-            <a:ext cx="3921480" cy="423360"/>
+            <a:ext cx="3921120" cy="423000"/>
           </a:xfrm>
           <a:prstGeom prst="rect">
             <a:avLst/>
@@ -36605,7 +36257,7 @@
         <p:spPr>
           <a:xfrm>
             <a:off x="838080" y="365040"/>
-            <a:ext cx="10512720" cy="1322640"/>
+            <a:ext cx="10512360" cy="1322280"/>
           </a:xfrm>
           <a:prstGeom prst="rect">
             <a:avLst/>
@@ -36654,7 +36306,7 @@
         <p:spPr>
           <a:xfrm>
             <a:off x="838080" y="1825560"/>
-            <a:ext cx="10512720" cy="4938120"/>
+            <a:ext cx="10512360" cy="4937760"/>
           </a:xfrm>
           <a:prstGeom prst="rect">
             <a:avLst/>
@@ -36958,7 +36610,7 @@
         <p:spPr>
           <a:xfrm>
             <a:off x="838080" y="365040"/>
-            <a:ext cx="10512720" cy="1322640"/>
+            <a:ext cx="10512360" cy="1322280"/>
           </a:xfrm>
           <a:prstGeom prst="rect">
             <a:avLst/>
@@ -37007,7 +36659,7 @@
         <p:spPr>
           <a:xfrm>
             <a:off x="838080" y="1825560"/>
-            <a:ext cx="10512720" cy="5121000"/>
+            <a:ext cx="10512360" cy="5120640"/>
           </a:xfrm>
           <a:prstGeom prst="rect">
             <a:avLst/>
@@ -37213,7 +36865,7 @@
         <p:spPr>
           <a:xfrm>
             <a:off x="1236240" y="4067280"/>
-            <a:ext cx="8290800" cy="1660680"/>
+            <a:ext cx="8290440" cy="1660320"/>
           </a:xfrm>
           <a:prstGeom prst="rect">
             <a:avLst/>
@@ -37266,7 +36918,7 @@
         <p:spPr>
           <a:xfrm>
             <a:off x="838080" y="365040"/>
-            <a:ext cx="10512720" cy="1322640"/>
+            <a:ext cx="10512360" cy="1322280"/>
           </a:xfrm>
           <a:prstGeom prst="rect">
             <a:avLst/>
@@ -37315,7 +36967,7 @@
         <p:spPr>
           <a:xfrm>
             <a:off x="838080" y="1825560"/>
-            <a:ext cx="10512720" cy="4876920"/>
+            <a:ext cx="10512360" cy="4876560"/>
           </a:xfrm>
           <a:prstGeom prst="rect">
             <a:avLst/>

</xml_diff>

<commit_message>
collated all the features. need to check the features for correctness and then feature selection can be done.
</commit_message>
<xml_diff>
--- a/docs/Project_help_n_ideas.pptx
+++ b/docs/Project_help_n_ideas.pptx
@@ -110,7 +110,7 @@
         <p:txBody>
           <a:bodyPr/>
           <a:p>
-            <a:fld id="{BBC1A291-027F-407E-875D-6EB901729CB6}" type="slidenum">
+            <a:fld id="{4A279A06-2700-471B-8C0F-75DF82859E62}" type="slidenum">
               <a:t>&lt;#&gt;</a:t>
             </a:fld>
           </a:p>
@@ -298,7 +298,7 @@
         <p:txBody>
           <a:bodyPr/>
           <a:p>
-            <a:fld id="{77D02882-73D2-4BF1-B0DD-B8758D14C1FC}" type="slidenum">
+            <a:fld id="{FC390580-B8EB-42CA-8942-94E302A81547}" type="slidenum">
               <a:t>&lt;#&gt;</a:t>
             </a:fld>
           </a:p>
@@ -554,7 +554,7 @@
         <p:txBody>
           <a:bodyPr/>
           <a:p>
-            <a:fld id="{0C2B6CEE-402C-4E78-8E4C-6D13F8A49C12}" type="slidenum">
+            <a:fld id="{7E56B80B-7AFE-4456-98D0-7F408ED9DC6A}" type="slidenum">
               <a:t>&lt;#&gt;</a:t>
             </a:fld>
           </a:p>
@@ -878,7 +878,7 @@
         <p:txBody>
           <a:bodyPr/>
           <a:p>
-            <a:fld id="{FE24A3BB-EB30-4650-BC81-683656F7E75C}" type="slidenum">
+            <a:fld id="{948FFD09-31A8-4BE7-A08A-8C20475C65C0}" type="slidenum">
               <a:t>&lt;#&gt;</a:t>
             </a:fld>
           </a:p>
@@ -961,7 +961,7 @@
         <p:txBody>
           <a:bodyPr/>
           <a:p>
-            <a:fld id="{63EB15FF-241F-4E6C-902B-16D38B62B14F}" type="slidenum">
+            <a:fld id="{F7B0F993-25C7-4EC6-86C2-C3882F58E0CD}" type="slidenum">
               <a:t>&lt;#&gt;</a:t>
             </a:fld>
           </a:p>
@@ -1118,7 +1118,7 @@
         <p:txBody>
           <a:bodyPr/>
           <a:p>
-            <a:fld id="{567D30C0-C8ED-4F36-BE97-766A936A8B38}" type="slidenum">
+            <a:fld id="{9A516290-DDC1-4E81-BA41-21FFCD270D82}" type="slidenum">
               <a:t>&lt;#&gt;</a:t>
             </a:fld>
           </a:p>
@@ -1272,7 +1272,7 @@
         <p:txBody>
           <a:bodyPr/>
           <a:p>
-            <a:fld id="{9B2DC456-EA42-409D-B5E8-B9BAB9FD95F7}" type="slidenum">
+            <a:fld id="{7F8566F0-87D3-4E38-9B36-839EA256C6F8}" type="slidenum">
               <a:t>&lt;#&gt;</a:t>
             </a:fld>
           </a:p>
@@ -1460,7 +1460,7 @@
         <p:txBody>
           <a:bodyPr/>
           <a:p>
-            <a:fld id="{1CAF6E38-92E6-478B-8F96-45B7D2DE94A9}" type="slidenum">
+            <a:fld id="{B2089C0B-89DC-491B-984A-A85823EC3E39}" type="slidenum">
               <a:t>&lt;#&gt;</a:t>
             </a:fld>
           </a:p>
@@ -1580,7 +1580,7 @@
         <p:txBody>
           <a:bodyPr/>
           <a:p>
-            <a:fld id="{79DC9F3A-7F15-48A3-837E-24430CB28F2D}" type="slidenum">
+            <a:fld id="{A09650C0-898D-48B7-98EE-624E5F53DFBD}" type="slidenum">
               <a:t>&lt;#&gt;</a:t>
             </a:fld>
           </a:p>
@@ -1700,7 +1700,7 @@
         <p:txBody>
           <a:bodyPr/>
           <a:p>
-            <a:fld id="{154C193F-B9D2-45E0-81D9-7DB1BC361403}" type="slidenum">
+            <a:fld id="{B794C77A-967A-4472-8F79-3F4D758853AF}" type="slidenum">
               <a:t>&lt;#&gt;</a:t>
             </a:fld>
           </a:p>
@@ -1922,7 +1922,7 @@
         <p:txBody>
           <a:bodyPr/>
           <a:p>
-            <a:fld id="{95A63651-A419-4D3F-AF08-58F3BAC8835E}" type="slidenum">
+            <a:fld id="{598FD5F5-A8C5-4DF4-B0D5-D8B826274483}" type="slidenum">
               <a:t>&lt;#&gt;</a:t>
             </a:fld>
           </a:p>
@@ -2079,7 +2079,7 @@
         <p:txBody>
           <a:bodyPr/>
           <a:p>
-            <a:fld id="{628A5DEF-A5C0-4C7D-8F30-B55BC39B98ED}" type="slidenum">
+            <a:fld id="{D489326F-6C7D-4F28-B189-B91BB059CE11}" type="slidenum">
               <a:t>&lt;#&gt;</a:t>
             </a:fld>
           </a:p>
@@ -2301,7 +2301,7 @@
         <p:txBody>
           <a:bodyPr/>
           <a:p>
-            <a:fld id="{C367D814-5D58-4850-90E7-78FF64FF2E2D}" type="slidenum">
+            <a:fld id="{F4944C0E-CD87-42D7-9348-374481BC71DB}" type="slidenum">
               <a:t>&lt;#&gt;</a:t>
             </a:fld>
           </a:p>
@@ -2523,7 +2523,7 @@
         <p:txBody>
           <a:bodyPr/>
           <a:p>
-            <a:fld id="{C5E4242B-DC99-403B-942B-9D52B54364DF}" type="slidenum">
+            <a:fld id="{586F79AA-8DDA-4FBF-A467-7982AC847C64}" type="slidenum">
               <a:t>&lt;#&gt;</a:t>
             </a:fld>
           </a:p>
@@ -2711,7 +2711,7 @@
         <p:txBody>
           <a:bodyPr/>
           <a:p>
-            <a:fld id="{026F2128-94AE-4D0A-B55E-50DDF0CEDC99}" type="slidenum">
+            <a:fld id="{FDDBAE6A-ABB0-487E-9D55-69E75572BBF0}" type="slidenum">
               <a:t>&lt;#&gt;</a:t>
             </a:fld>
           </a:p>
@@ -2967,7 +2967,7 @@
         <p:txBody>
           <a:bodyPr/>
           <a:p>
-            <a:fld id="{7E6BBFB2-C782-4256-8E76-4730E7536102}" type="slidenum">
+            <a:fld id="{2776BC02-2C33-4718-A29B-174ED1A5AC7C}" type="slidenum">
               <a:t>&lt;#&gt;</a:t>
             </a:fld>
           </a:p>
@@ -3291,7 +3291,7 @@
         <p:txBody>
           <a:bodyPr/>
           <a:p>
-            <a:fld id="{F478F617-723B-414D-AF03-0A578722FDBF}" type="slidenum">
+            <a:fld id="{EDD3D729-8E3C-4E3B-9BFB-D04902E833CF}" type="slidenum">
               <a:t>&lt;#&gt;</a:t>
             </a:fld>
           </a:p>
@@ -3445,7 +3445,7 @@
         <p:txBody>
           <a:bodyPr/>
           <a:p>
-            <a:fld id="{21E0EC7E-2D08-478F-BD46-E51F5752F25D}" type="slidenum">
+            <a:fld id="{08AB54F5-C566-431A-A869-EDB13C64121E}" type="slidenum">
               <a:t>&lt;#&gt;</a:t>
             </a:fld>
           </a:p>
@@ -3633,7 +3633,7 @@
         <p:txBody>
           <a:bodyPr/>
           <a:p>
-            <a:fld id="{0CB90A1C-F22E-4A81-BE20-31AC59A810A8}" type="slidenum">
+            <a:fld id="{701B6448-2C65-4CBD-A67F-2E24033F4BA5}" type="slidenum">
               <a:t>&lt;#&gt;</a:t>
             </a:fld>
           </a:p>
@@ -3753,7 +3753,7 @@
         <p:txBody>
           <a:bodyPr/>
           <a:p>
-            <a:fld id="{CD2E7123-6B0A-4559-B3B6-28AEDE0CA107}" type="slidenum">
+            <a:fld id="{E2ECD519-AD89-48B5-87C0-5F914828359F}" type="slidenum">
               <a:t>&lt;#&gt;</a:t>
             </a:fld>
           </a:p>
@@ -3873,7 +3873,7 @@
         <p:txBody>
           <a:bodyPr/>
           <a:p>
-            <a:fld id="{892696B6-0E61-4AE3-8D1C-785E5137C8CA}" type="slidenum">
+            <a:fld id="{5CD24657-2EDE-425A-A267-740B5F548E72}" type="slidenum">
               <a:t>&lt;#&gt;</a:t>
             </a:fld>
           </a:p>
@@ -4095,7 +4095,7 @@
         <p:txBody>
           <a:bodyPr/>
           <a:p>
-            <a:fld id="{67EB5795-D322-4E05-A0A3-E466FFA4A5DF}" type="slidenum">
+            <a:fld id="{2F6DBA86-8F99-4116-ADE9-23BBCB8D3EF8}" type="slidenum">
               <a:t>&lt;#&gt;</a:t>
             </a:fld>
           </a:p>
@@ -4317,7 +4317,7 @@
         <p:txBody>
           <a:bodyPr/>
           <a:p>
-            <a:fld id="{FE5DF9B2-F2C6-4ED2-99E5-76AF74A2BE4F}" type="slidenum">
+            <a:fld id="{491A06A8-C33C-4A26-ABF0-31072CDBE893}" type="slidenum">
               <a:t>&lt;#&gt;</a:t>
             </a:fld>
           </a:p>
@@ -4539,7 +4539,7 @@
         <p:txBody>
           <a:bodyPr/>
           <a:p>
-            <a:fld id="{47085373-099A-495F-B4DD-5BD6E7B73BE9}" type="slidenum">
+            <a:fld id="{905D93B1-8BDE-4204-8F71-45757BFA13C9}" type="slidenum">
               <a:t>&lt;#&gt;</a:t>
             </a:fld>
           </a:p>
@@ -4608,7 +4608,7 @@
         <p:spPr>
           <a:xfrm>
             <a:off x="4038480" y="6356520"/>
-            <a:ext cx="4111560" cy="361800"/>
+            <a:ext cx="4111200" cy="361440"/>
           </a:xfrm>
           <a:prstGeom prst="rect">
             <a:avLst/>
@@ -4644,7 +4644,7 @@
               <a:rPr b="0" lang="en-US" sz="1400" spc="-1" strike="noStrike">
                 <a:latin typeface="Times New Roman"/>
               </a:rPr>
-              <a:t> </a:t>
+              <a:t>&lt;footer&gt;</a:t>
             </a:r>
             <a:endParaRPr b="0" lang="en-US" sz="1400" spc="-1" strike="noStrike">
               <a:latin typeface="Times New Roman"/>
@@ -4665,7 +4665,7 @@
         <p:spPr>
           <a:xfrm>
             <a:off x="8610480" y="6356520"/>
-            <a:ext cx="2739960" cy="361800"/>
+            <a:ext cx="2739600" cy="361440"/>
           </a:xfrm>
           <a:prstGeom prst="rect">
             <a:avLst/>
@@ -4700,14 +4700,14 @@
               </a:lnSpc>
               <a:buNone/>
             </a:pPr>
-            <a:fld id="{F9A576C3-2DE0-4A85-BD8C-1E39AE5CF046}" type="slidenum">
+            <a:fld id="{1C0C83F9-65CA-43E6-83EF-F66AE198622A}" type="slidenum">
               <a:rPr b="0" lang="en-SG" sz="1200" spc="-1" strike="noStrike">
                 <a:solidFill>
                   <a:srgbClr val="8b8b8b"/>
                 </a:solidFill>
                 <a:latin typeface="Calibri"/>
               </a:rPr>
-              <a:t>25</a:t>
+              <a:t>&lt;number&gt;</a:t>
             </a:fld>
             <a:endParaRPr b="0" lang="en-US" sz="1200" spc="-1" strike="noStrike">
               <a:latin typeface="Times New Roman"/>
@@ -4728,7 +4728,7 @@
         <p:spPr>
           <a:xfrm>
             <a:off x="838080" y="6356520"/>
-            <a:ext cx="2739960" cy="361800"/>
+            <a:ext cx="2739600" cy="361440"/>
           </a:xfrm>
           <a:prstGeom prst="rect">
             <a:avLst/>
@@ -4754,7 +4754,7 @@
               <a:rPr b="0" lang="en-US" sz="1400" spc="-1" strike="noStrike">
                 <a:latin typeface="Times New Roman"/>
               </a:rPr>
-              <a:t> </a:t>
+              <a:t>&lt;date/time&gt;</a:t>
             </a:r>
             <a:endParaRPr b="0" lang="en-US" sz="1400" spc="-1" strike="noStrike">
               <a:latin typeface="Times New Roman"/>
@@ -5045,7 +5045,7 @@
         <p:spPr>
           <a:xfrm>
             <a:off x="4038480" y="6356520"/>
-            <a:ext cx="4111560" cy="361800"/>
+            <a:ext cx="4111200" cy="361440"/>
           </a:xfrm>
           <a:prstGeom prst="rect">
             <a:avLst/>
@@ -5102,7 +5102,7 @@
         <p:spPr>
           <a:xfrm>
             <a:off x="8610480" y="6356520"/>
-            <a:ext cx="2739960" cy="361800"/>
+            <a:ext cx="2739600" cy="361440"/>
           </a:xfrm>
           <a:prstGeom prst="rect">
             <a:avLst/>
@@ -5137,7 +5137,7 @@
               </a:lnSpc>
               <a:buNone/>
             </a:pPr>
-            <a:fld id="{0D17188E-A6E4-4E0E-8B9F-771110D83EC9}" type="slidenum">
+            <a:fld id="{399C964C-6BA5-448C-A5A4-5C682DD97F4F}" type="slidenum">
               <a:rPr b="0" lang="en-SG" sz="1200" spc="-1" strike="noStrike">
                 <a:solidFill>
                   <a:srgbClr val="8b8b8b"/>
@@ -5165,7 +5165,7 @@
         <p:spPr>
           <a:xfrm>
             <a:off x="838080" y="6356520"/>
-            <a:ext cx="2739960" cy="361800"/>
+            <a:ext cx="2739600" cy="361440"/>
           </a:xfrm>
           <a:prstGeom prst="rect">
             <a:avLst/>
@@ -5475,7 +5475,7 @@
         <p:spPr>
           <a:xfrm>
             <a:off x="1523880" y="1122480"/>
-            <a:ext cx="9140760" cy="2384280"/>
+            <a:ext cx="9140400" cy="2383920"/>
           </a:xfrm>
           <a:prstGeom prst="rect">
             <a:avLst/>
@@ -5524,7 +5524,7 @@
         <p:spPr>
           <a:xfrm>
             <a:off x="1523880" y="3602160"/>
-            <a:ext cx="9140760" cy="1652400"/>
+            <a:ext cx="9140400" cy="1652040"/>
           </a:xfrm>
           <a:prstGeom prst="rect">
             <a:avLst/>
@@ -5598,7 +5598,7 @@
       </p:grpSpPr>
       <p:sp>
         <p:nvSpPr>
-          <p:cNvPr id="115" name="PlaceHolder 1"/>
+          <p:cNvPr id="116" name="PlaceHolder 1"/>
           <p:cNvSpPr>
             <a:spLocks noGrp="1"/>
           </p:cNvSpPr>
@@ -5609,7 +5609,7 @@
         <p:spPr>
           <a:xfrm>
             <a:off x="838080" y="365040"/>
-            <a:ext cx="10512360" cy="1322280"/>
+            <a:ext cx="10512000" cy="1321920"/>
           </a:xfrm>
           <a:prstGeom prst="rect">
             <a:avLst/>
@@ -5647,7 +5647,7 @@
       </p:sp>
       <p:sp>
         <p:nvSpPr>
-          <p:cNvPr id="116" name="PlaceHolder 2"/>
+          <p:cNvPr id="117" name="PlaceHolder 2"/>
           <p:cNvSpPr>
             <a:spLocks noGrp="1"/>
           </p:cNvSpPr>
@@ -5658,7 +5658,7 @@
         <p:spPr>
           <a:xfrm>
             <a:off x="838080" y="1825560"/>
-            <a:ext cx="10512360" cy="4348080"/>
+            <a:ext cx="10512000" cy="4347720"/>
           </a:xfrm>
           <a:prstGeom prst="rect">
             <a:avLst/>
@@ -5805,7 +5805,7 @@
       </p:grpSpPr>
       <p:sp>
         <p:nvSpPr>
-          <p:cNvPr id="117" name="PlaceHolder 1"/>
+          <p:cNvPr id="118" name="PlaceHolder 1"/>
           <p:cNvSpPr>
             <a:spLocks noGrp="1"/>
           </p:cNvSpPr>
@@ -5816,7 +5816,7 @@
         <p:spPr>
           <a:xfrm>
             <a:off x="838080" y="365040"/>
-            <a:ext cx="10512360" cy="1322280"/>
+            <a:ext cx="10512000" cy="1321920"/>
           </a:xfrm>
           <a:prstGeom prst="rect">
             <a:avLst/>
@@ -5854,7 +5854,7 @@
       </p:sp>
       <p:sp>
         <p:nvSpPr>
-          <p:cNvPr id="118" name="PlaceHolder 2"/>
+          <p:cNvPr id="119" name="PlaceHolder 2"/>
           <p:cNvSpPr>
             <a:spLocks noGrp="1"/>
           </p:cNvSpPr>
@@ -5865,7 +5865,7 @@
         <p:spPr>
           <a:xfrm>
             <a:off x="838080" y="1825560"/>
-            <a:ext cx="10512360" cy="4348080"/>
+            <a:ext cx="10512000" cy="4347720"/>
           </a:xfrm>
           <a:prstGeom prst="rect">
             <a:avLst/>
@@ -5999,14 +5999,14 @@
       </p:grpSpPr>
       <p:sp>
         <p:nvSpPr>
-          <p:cNvPr id="119" name="TextBox 3"/>
+          <p:cNvPr id="120" name="TextBox 3"/>
           <p:cNvSpPr/>
           <p:nvPr/>
         </p:nvSpPr>
         <p:spPr>
           <a:xfrm>
             <a:off x="202680" y="147240"/>
-            <a:ext cx="988920" cy="638280"/>
+            <a:ext cx="988560" cy="638280"/>
           </a:xfrm>
           <a:prstGeom prst="rect">
             <a:avLst/>
@@ -6054,14 +6054,14 @@
       </p:sp>
       <p:sp>
         <p:nvSpPr>
-          <p:cNvPr id="120" name="Rectangle: Rounded Corners 5"/>
+          <p:cNvPr id="121" name="Rectangle: Rounded Corners 5"/>
           <p:cNvSpPr/>
           <p:nvPr/>
         </p:nvSpPr>
         <p:spPr>
           <a:xfrm>
             <a:off x="1283040" y="1018080"/>
-            <a:ext cx="911160" cy="911160"/>
+            <a:ext cx="910800" cy="910800"/>
           </a:xfrm>
           <a:prstGeom prst="roundRect">
             <a:avLst>
@@ -6123,14 +6123,14 @@
       </p:sp>
       <p:sp>
         <p:nvSpPr>
-          <p:cNvPr id="121" name="Rectangle: Rounded Corners 7"/>
+          <p:cNvPr id="122" name="Rectangle: Rounded Corners 7"/>
           <p:cNvSpPr/>
           <p:nvPr/>
         </p:nvSpPr>
         <p:spPr>
           <a:xfrm>
             <a:off x="243720" y="5844240"/>
-            <a:ext cx="911160" cy="911160"/>
+            <a:ext cx="910800" cy="910800"/>
           </a:xfrm>
           <a:prstGeom prst="roundRect">
             <a:avLst>
@@ -6192,14 +6192,14 @@
       </p:sp>
       <p:sp>
         <p:nvSpPr>
-          <p:cNvPr id="122" name="Connector: Elbow 11"/>
+          <p:cNvPr id="123" name="Connector: Elbow 11"/>
           <p:cNvSpPr/>
           <p:nvPr/>
         </p:nvSpPr>
         <p:spPr>
           <a:xfrm flipH="1" rot="16200000">
-            <a:off x="650520" y="842400"/>
-            <a:ext cx="678240" cy="581040"/>
+            <a:off x="650160" y="842400"/>
+            <a:ext cx="677880" cy="580680"/>
           </a:xfrm>
           <a:prstGeom prst="bentConnector2">
             <a:avLst/>
@@ -6227,14 +6227,14 @@
       </p:sp>
       <p:sp>
         <p:nvSpPr>
-          <p:cNvPr id="123" name="Connector: Elbow 12"/>
+          <p:cNvPr id="124" name="Connector: Elbow 12"/>
           <p:cNvSpPr/>
           <p:nvPr/>
         </p:nvSpPr>
         <p:spPr>
           <a:xfrm flipH="1" rot="16200000">
             <a:off x="-1824840" y="3317040"/>
-            <a:ext cx="5047200" cy="360"/>
+            <a:ext cx="5046840" cy="360"/>
           </a:xfrm>
           <a:prstGeom prst="bentConnector3">
             <a:avLst>
@@ -6264,14 +6264,14 @@
       </p:sp>
       <p:sp>
         <p:nvSpPr>
-          <p:cNvPr id="124" name="Rectangle: Rounded Corners 1"/>
+          <p:cNvPr id="125" name="Rectangle: Rounded Corners 1"/>
           <p:cNvSpPr/>
           <p:nvPr/>
         </p:nvSpPr>
         <p:spPr>
           <a:xfrm>
             <a:off x="2794680" y="612720"/>
-            <a:ext cx="4778640" cy="2702880"/>
+            <a:ext cx="4778280" cy="2702520"/>
           </a:xfrm>
           <a:prstGeom prst="roundRect">
             <a:avLst>
@@ -6395,7 +6395,7 @@
       </p:grpSpPr>
       <p:sp>
         <p:nvSpPr>
-          <p:cNvPr id="125" name="PlaceHolder 1"/>
+          <p:cNvPr id="126" name="PlaceHolder 1"/>
           <p:cNvSpPr>
             <a:spLocks noGrp="1"/>
           </p:cNvSpPr>
@@ -6406,7 +6406,7 @@
         <p:spPr>
           <a:xfrm>
             <a:off x="838080" y="365040"/>
-            <a:ext cx="10512360" cy="1322280"/>
+            <a:ext cx="10512000" cy="1321920"/>
           </a:xfrm>
           <a:prstGeom prst="rect">
             <a:avLst/>
@@ -6444,7 +6444,7 @@
       </p:sp>
       <p:sp>
         <p:nvSpPr>
-          <p:cNvPr id="126" name="PlaceHolder 2"/>
+          <p:cNvPr id="127" name="PlaceHolder 2"/>
           <p:cNvSpPr>
             <a:spLocks noGrp="1"/>
           </p:cNvSpPr>
@@ -6455,7 +6455,7 @@
         <p:spPr>
           <a:xfrm>
             <a:off x="838080" y="1825560"/>
-            <a:ext cx="10512360" cy="4348080"/>
+            <a:ext cx="10512000" cy="4347720"/>
           </a:xfrm>
           <a:prstGeom prst="rect">
             <a:avLst/>
@@ -6620,7 +6620,7 @@
       </p:grpSpPr>
       <p:sp>
         <p:nvSpPr>
-          <p:cNvPr id="127" name="PlaceHolder 1"/>
+          <p:cNvPr id="128" name="PlaceHolder 1"/>
           <p:cNvSpPr>
             <a:spLocks noGrp="1"/>
           </p:cNvSpPr>
@@ -6631,7 +6631,7 @@
         <p:spPr>
           <a:xfrm>
             <a:off x="838080" y="365040"/>
-            <a:ext cx="10512360" cy="1322280"/>
+            <a:ext cx="10512000" cy="1321920"/>
           </a:xfrm>
           <a:prstGeom prst="rect">
             <a:avLst/>
@@ -6681,7 +6681,7 @@
       </p:sp>
       <p:sp>
         <p:nvSpPr>
-          <p:cNvPr id="128" name="PlaceHolder 2"/>
+          <p:cNvPr id="129" name="PlaceHolder 2"/>
           <p:cNvSpPr>
             <a:spLocks noGrp="1"/>
           </p:cNvSpPr>
@@ -6692,7 +6692,7 @@
         <p:spPr>
           <a:xfrm>
             <a:off x="838080" y="1825560"/>
-            <a:ext cx="10512360" cy="4744440"/>
+            <a:ext cx="10512000" cy="4744080"/>
           </a:xfrm>
           <a:prstGeom prst="rect">
             <a:avLst/>
@@ -9007,7 +9007,7 @@
       </p:grpSpPr>
       <p:sp>
         <p:nvSpPr>
-          <p:cNvPr id="129" name="PlaceHolder 1"/>
+          <p:cNvPr id="130" name="PlaceHolder 1"/>
           <p:cNvSpPr>
             <a:spLocks noGrp="1"/>
           </p:cNvSpPr>
@@ -9018,7 +9018,7 @@
         <p:spPr>
           <a:xfrm>
             <a:off x="838080" y="365040"/>
-            <a:ext cx="10512360" cy="1322280"/>
+            <a:ext cx="10512000" cy="1321920"/>
           </a:xfrm>
           <a:prstGeom prst="rect">
             <a:avLst/>
@@ -9068,7 +9068,7 @@
       </p:sp>
       <p:sp>
         <p:nvSpPr>
-          <p:cNvPr id="130" name="PlaceHolder 2"/>
+          <p:cNvPr id="131" name="PlaceHolder 2"/>
           <p:cNvSpPr>
             <a:spLocks noGrp="1"/>
           </p:cNvSpPr>
@@ -9079,7 +9079,7 @@
         <p:spPr>
           <a:xfrm>
             <a:off x="838080" y="1825560"/>
-            <a:ext cx="10512360" cy="4784400"/>
+            <a:ext cx="10512000" cy="4784040"/>
           </a:xfrm>
           <a:prstGeom prst="rect">
             <a:avLst/>
@@ -11593,7 +11593,7 @@
       </p:grpSpPr>
       <p:sp>
         <p:nvSpPr>
-          <p:cNvPr id="131" name="PlaceHolder 1"/>
+          <p:cNvPr id="132" name="PlaceHolder 1"/>
           <p:cNvSpPr>
             <a:spLocks noGrp="1"/>
           </p:cNvSpPr>
@@ -11604,7 +11604,7 @@
         <p:spPr>
           <a:xfrm>
             <a:off x="838080" y="365040"/>
-            <a:ext cx="10512360" cy="1322280"/>
+            <a:ext cx="10512000" cy="1321920"/>
           </a:xfrm>
           <a:prstGeom prst="rect">
             <a:avLst/>
@@ -11654,7 +11654,7 @@
       </p:sp>
       <p:sp>
         <p:nvSpPr>
-          <p:cNvPr id="132" name="PlaceHolder 2"/>
+          <p:cNvPr id="133" name="PlaceHolder 2"/>
           <p:cNvSpPr>
             <a:spLocks noGrp="1"/>
           </p:cNvSpPr>
@@ -11665,7 +11665,7 @@
         <p:spPr>
           <a:xfrm>
             <a:off x="838080" y="1825560"/>
-            <a:ext cx="10759320" cy="4744440"/>
+            <a:ext cx="10758960" cy="4744080"/>
           </a:xfrm>
           <a:prstGeom prst="rect">
             <a:avLst/>
@@ -15419,7 +15419,7 @@
       </p:grpSpPr>
       <p:sp>
         <p:nvSpPr>
-          <p:cNvPr id="133" name="PlaceHolder 1"/>
+          <p:cNvPr id="134" name="PlaceHolder 1"/>
           <p:cNvSpPr>
             <a:spLocks noGrp="1"/>
           </p:cNvSpPr>
@@ -15430,7 +15430,7 @@
         <p:spPr>
           <a:xfrm>
             <a:off x="838080" y="365040"/>
-            <a:ext cx="10512360" cy="1322280"/>
+            <a:ext cx="10512000" cy="1321920"/>
           </a:xfrm>
           <a:prstGeom prst="rect">
             <a:avLst/>
@@ -15480,7 +15480,7 @@
       </p:sp>
       <p:sp>
         <p:nvSpPr>
-          <p:cNvPr id="134" name="PlaceHolder 2"/>
+          <p:cNvPr id="135" name="PlaceHolder 2"/>
           <p:cNvSpPr>
             <a:spLocks noGrp="1"/>
           </p:cNvSpPr>
@@ -15491,7 +15491,7 @@
         <p:spPr>
           <a:xfrm>
             <a:off x="838080" y="1825560"/>
-            <a:ext cx="10759320" cy="4744440"/>
+            <a:ext cx="10758960" cy="4744080"/>
           </a:xfrm>
           <a:prstGeom prst="rect">
             <a:avLst/>
@@ -17477,7 +17477,7 @@
       </p:grpSpPr>
       <p:sp>
         <p:nvSpPr>
-          <p:cNvPr id="135" name="PlaceHolder 1"/>
+          <p:cNvPr id="136" name="PlaceHolder 1"/>
           <p:cNvSpPr>
             <a:spLocks noGrp="1"/>
           </p:cNvSpPr>
@@ -17488,7 +17488,7 @@
         <p:spPr>
           <a:xfrm>
             <a:off x="838080" y="365040"/>
-            <a:ext cx="10512360" cy="1322280"/>
+            <a:ext cx="10512000" cy="1321920"/>
           </a:xfrm>
           <a:prstGeom prst="rect">
             <a:avLst/>
@@ -17538,7 +17538,7 @@
       </p:sp>
       <p:sp>
         <p:nvSpPr>
-          <p:cNvPr id="136" name="PlaceHolder 2"/>
+          <p:cNvPr id="137" name="PlaceHolder 2"/>
           <p:cNvSpPr>
             <a:spLocks noGrp="1"/>
           </p:cNvSpPr>
@@ -17549,7 +17549,7 @@
         <p:spPr>
           <a:xfrm>
             <a:off x="838080" y="1825560"/>
-            <a:ext cx="10759320" cy="4744440"/>
+            <a:ext cx="10758960" cy="4744080"/>
           </a:xfrm>
           <a:prstGeom prst="rect">
             <a:avLst/>
@@ -19323,7 +19323,7 @@
       </p:grpSpPr>
       <p:sp>
         <p:nvSpPr>
-          <p:cNvPr id="137" name="PlaceHolder 1"/>
+          <p:cNvPr id="138" name="PlaceHolder 1"/>
           <p:cNvSpPr>
             <a:spLocks noGrp="1"/>
           </p:cNvSpPr>
@@ -19334,7 +19334,7 @@
         <p:spPr>
           <a:xfrm>
             <a:off x="838080" y="365040"/>
-            <a:ext cx="10512360" cy="1322280"/>
+            <a:ext cx="10512000" cy="1321920"/>
           </a:xfrm>
           <a:prstGeom prst="rect">
             <a:avLst/>
@@ -19384,7 +19384,7 @@
       </p:sp>
       <p:sp>
         <p:nvSpPr>
-          <p:cNvPr id="138" name="PlaceHolder 2"/>
+          <p:cNvPr id="139" name="PlaceHolder 2"/>
           <p:cNvSpPr>
             <a:spLocks noGrp="1"/>
           </p:cNvSpPr>
@@ -19395,7 +19395,7 @@
         <p:spPr>
           <a:xfrm>
             <a:off x="838080" y="1825560"/>
-            <a:ext cx="10759320" cy="4744440"/>
+            <a:ext cx="10758960" cy="4744080"/>
           </a:xfrm>
           <a:prstGeom prst="rect">
             <a:avLst/>
@@ -20185,7 +20185,7 @@
         <p:spPr>
           <a:xfrm>
             <a:off x="1776960" y="126000"/>
-            <a:ext cx="8634960" cy="6602400"/>
+            <a:ext cx="8634600" cy="6602040"/>
           </a:xfrm>
           <a:prstGeom prst="rect">
             <a:avLst/>
@@ -20234,7 +20234,7 @@
       </p:grpSpPr>
       <p:sp>
         <p:nvSpPr>
-          <p:cNvPr id="139" name="PlaceHolder 1"/>
+          <p:cNvPr id="140" name="PlaceHolder 1"/>
           <p:cNvSpPr>
             <a:spLocks noGrp="1"/>
           </p:cNvSpPr>
@@ -20245,7 +20245,7 @@
         <p:spPr>
           <a:xfrm>
             <a:off x="838080" y="365040"/>
-            <a:ext cx="10512360" cy="1322280"/>
+            <a:ext cx="10512000" cy="1321920"/>
           </a:xfrm>
           <a:prstGeom prst="rect">
             <a:avLst/>
@@ -20310,7 +20310,7 @@
       </p:sp>
       <p:sp>
         <p:nvSpPr>
-          <p:cNvPr id="140" name="PlaceHolder 2"/>
+          <p:cNvPr id="141" name="PlaceHolder 2"/>
           <p:cNvSpPr>
             <a:spLocks noGrp="1"/>
           </p:cNvSpPr>
@@ -20321,7 +20321,7 @@
         <p:spPr>
           <a:xfrm>
             <a:off x="838080" y="1825560"/>
-            <a:ext cx="10759320" cy="4744440"/>
+            <a:ext cx="10758960" cy="4744080"/>
           </a:xfrm>
           <a:prstGeom prst="rect">
             <a:avLst/>
@@ -22735,7 +22735,7 @@
       </p:grpSpPr>
       <p:sp>
         <p:nvSpPr>
-          <p:cNvPr id="141" name="PlaceHolder 1"/>
+          <p:cNvPr id="142" name="PlaceHolder 1"/>
           <p:cNvSpPr>
             <a:spLocks noGrp="1"/>
           </p:cNvSpPr>
@@ -22746,7 +22746,7 @@
         <p:spPr>
           <a:xfrm>
             <a:off x="838080" y="365040"/>
-            <a:ext cx="10512360" cy="1322280"/>
+            <a:ext cx="10512000" cy="1321920"/>
           </a:xfrm>
           <a:prstGeom prst="rect">
             <a:avLst/>
@@ -22801,7 +22801,7 @@
       </p:sp>
       <p:sp>
         <p:nvSpPr>
-          <p:cNvPr id="142" name="PlaceHolder 2"/>
+          <p:cNvPr id="143" name="PlaceHolder 2"/>
           <p:cNvSpPr>
             <a:spLocks noGrp="1"/>
           </p:cNvSpPr>
@@ -22812,7 +22812,7 @@
         <p:spPr>
           <a:xfrm>
             <a:off x="838080" y="1825560"/>
-            <a:ext cx="10759320" cy="4744440"/>
+            <a:ext cx="10758960" cy="4744080"/>
           </a:xfrm>
           <a:prstGeom prst="rect">
             <a:avLst/>
@@ -25285,7 +25285,7 @@
       </p:grpSpPr>
       <p:sp>
         <p:nvSpPr>
-          <p:cNvPr id="143" name="PlaceHolder 1"/>
+          <p:cNvPr id="144" name="PlaceHolder 1"/>
           <p:cNvSpPr>
             <a:spLocks noGrp="1"/>
           </p:cNvSpPr>
@@ -25296,7 +25296,7 @@
         <p:spPr>
           <a:xfrm>
             <a:off x="838080" y="365040"/>
-            <a:ext cx="10512360" cy="1322280"/>
+            <a:ext cx="10512000" cy="1321920"/>
           </a:xfrm>
           <a:prstGeom prst="rect">
             <a:avLst/>
@@ -25351,7 +25351,7 @@
       </p:sp>
       <p:sp>
         <p:nvSpPr>
-          <p:cNvPr id="144" name="PlaceHolder 2"/>
+          <p:cNvPr id="145" name="PlaceHolder 2"/>
           <p:cNvSpPr>
             <a:spLocks noGrp="1"/>
           </p:cNvSpPr>
@@ -25362,7 +25362,7 @@
         <p:spPr>
           <a:xfrm>
             <a:off x="838080" y="1825560"/>
-            <a:ext cx="10759320" cy="4744440"/>
+            <a:ext cx="10758960" cy="4744080"/>
           </a:xfrm>
           <a:prstGeom prst="rect">
             <a:avLst/>
@@ -27705,7 +27705,7 @@
       </p:grpSpPr>
       <p:sp>
         <p:nvSpPr>
-          <p:cNvPr id="145" name="PlaceHolder 1"/>
+          <p:cNvPr id="146" name="PlaceHolder 1"/>
           <p:cNvSpPr>
             <a:spLocks noGrp="1"/>
           </p:cNvSpPr>
@@ -27716,7 +27716,7 @@
         <p:spPr>
           <a:xfrm>
             <a:off x="838080" y="365040"/>
-            <a:ext cx="10512360" cy="1322280"/>
+            <a:ext cx="10512000" cy="1321920"/>
           </a:xfrm>
           <a:prstGeom prst="rect">
             <a:avLst/>
@@ -27771,7 +27771,7 @@
       </p:sp>
       <p:sp>
         <p:nvSpPr>
-          <p:cNvPr id="146" name="PlaceHolder 2"/>
+          <p:cNvPr id="147" name="PlaceHolder 2"/>
           <p:cNvSpPr>
             <a:spLocks noGrp="1"/>
           </p:cNvSpPr>
@@ -27782,7 +27782,7 @@
         <p:spPr>
           <a:xfrm>
             <a:off x="838080" y="1825560"/>
-            <a:ext cx="10759320" cy="4744440"/>
+            <a:ext cx="10758960" cy="4744080"/>
           </a:xfrm>
           <a:prstGeom prst="rect">
             <a:avLst/>
@@ -29397,7 +29397,7 @@
       </p:grpSpPr>
       <p:sp>
         <p:nvSpPr>
-          <p:cNvPr id="147" name="PlaceHolder 1"/>
+          <p:cNvPr id="148" name="PlaceHolder 1"/>
           <p:cNvSpPr>
             <a:spLocks noGrp="1"/>
           </p:cNvSpPr>
@@ -29408,7 +29408,7 @@
         <p:spPr>
           <a:xfrm>
             <a:off x="838080" y="365040"/>
-            <a:ext cx="10512360" cy="1322280"/>
+            <a:ext cx="10512000" cy="1321920"/>
           </a:xfrm>
           <a:prstGeom prst="rect">
             <a:avLst/>
@@ -29463,7 +29463,7 @@
       </p:sp>
       <p:sp>
         <p:nvSpPr>
-          <p:cNvPr id="148" name="PlaceHolder 2"/>
+          <p:cNvPr id="149" name="PlaceHolder 2"/>
           <p:cNvSpPr>
             <a:spLocks noGrp="1"/>
           </p:cNvSpPr>
@@ -29474,7 +29474,7 @@
         <p:spPr>
           <a:xfrm>
             <a:off x="838080" y="1825560"/>
-            <a:ext cx="10759320" cy="4744440"/>
+            <a:ext cx="10758960" cy="4744080"/>
           </a:xfrm>
           <a:prstGeom prst="rect">
             <a:avLst/>
@@ -29699,7 +29699,7 @@
       </p:sp>
       <p:pic>
         <p:nvPicPr>
-          <p:cNvPr id="149" name="" descr=""/>
+          <p:cNvPr id="150" name="" descr=""/>
           <p:cNvPicPr/>
           <p:nvPr/>
         </p:nvPicPr>
@@ -29710,7 +29710,7 @@
         <p:spPr>
           <a:xfrm>
             <a:off x="3778200" y="2779200"/>
-            <a:ext cx="2687040" cy="2056680"/>
+            <a:ext cx="2686680" cy="2056320"/>
           </a:xfrm>
           <a:prstGeom prst="rect">
             <a:avLst/>
@@ -29759,7 +29759,7 @@
       </p:grpSpPr>
       <p:sp>
         <p:nvSpPr>
-          <p:cNvPr id="150" name="PlaceHolder 1"/>
+          <p:cNvPr id="151" name="PlaceHolder 1"/>
           <p:cNvSpPr>
             <a:spLocks noGrp="1"/>
           </p:cNvSpPr>
@@ -29770,7 +29770,7 @@
         <p:spPr>
           <a:xfrm>
             <a:off x="838080" y="365040"/>
-            <a:ext cx="10512360" cy="1322280"/>
+            <a:ext cx="10512000" cy="1321920"/>
           </a:xfrm>
           <a:prstGeom prst="rect">
             <a:avLst/>
@@ -29825,7 +29825,7 @@
       </p:sp>
       <p:sp>
         <p:nvSpPr>
-          <p:cNvPr id="151" name="PlaceHolder 2"/>
+          <p:cNvPr id="152" name="PlaceHolder 2"/>
           <p:cNvSpPr>
             <a:spLocks noGrp="1"/>
           </p:cNvSpPr>
@@ -29836,7 +29836,7 @@
         <p:spPr>
           <a:xfrm>
             <a:off x="838080" y="1825560"/>
-            <a:ext cx="10759320" cy="4744440"/>
+            <a:ext cx="10758960" cy="4744080"/>
           </a:xfrm>
           <a:prstGeom prst="rect">
             <a:avLst/>
@@ -30080,7 +30080,7 @@
       </p:sp>
       <p:pic>
         <p:nvPicPr>
-          <p:cNvPr id="152" name="" descr=""/>
+          <p:cNvPr id="153" name="" descr=""/>
           <p:cNvPicPr/>
           <p:nvPr/>
         </p:nvPicPr>
@@ -30091,7 +30091,7 @@
         <p:spPr>
           <a:xfrm>
             <a:off x="1600200" y="4648680"/>
-            <a:ext cx="7457760" cy="1980720"/>
+            <a:ext cx="7457400" cy="1980360"/>
           </a:xfrm>
           <a:prstGeom prst="rect">
             <a:avLst/>
@@ -30103,7 +30103,7 @@
       </p:pic>
       <p:pic>
         <p:nvPicPr>
-          <p:cNvPr id="153" name="" descr=""/>
+          <p:cNvPr id="154" name="" descr=""/>
           <p:cNvPicPr/>
           <p:nvPr/>
         </p:nvPicPr>
@@ -30114,7 +30114,7 @@
         <p:spPr>
           <a:xfrm>
             <a:off x="1495800" y="2667240"/>
-            <a:ext cx="7419600" cy="1904760"/>
+            <a:ext cx="7419240" cy="1904400"/>
           </a:xfrm>
           <a:prstGeom prst="rect">
             <a:avLst/>
@@ -30163,7 +30163,7 @@
       </p:grpSpPr>
       <p:sp>
         <p:nvSpPr>
-          <p:cNvPr id="154" name="PlaceHolder 1"/>
+          <p:cNvPr id="155" name="PlaceHolder 1"/>
           <p:cNvSpPr>
             <a:spLocks noGrp="1"/>
           </p:cNvSpPr>
@@ -30174,7 +30174,7 @@
         <p:spPr>
           <a:xfrm>
             <a:off x="838080" y="365040"/>
-            <a:ext cx="10512360" cy="1322280"/>
+            <a:ext cx="10512000" cy="1321920"/>
           </a:xfrm>
           <a:prstGeom prst="rect">
             <a:avLst/>
@@ -30229,7 +30229,7 @@
       </p:sp>
       <p:sp>
         <p:nvSpPr>
-          <p:cNvPr id="155" name="PlaceHolder 2"/>
+          <p:cNvPr id="156" name="PlaceHolder 2"/>
           <p:cNvSpPr>
             <a:spLocks noGrp="1"/>
           </p:cNvSpPr>
@@ -30240,7 +30240,7 @@
         <p:spPr>
           <a:xfrm>
             <a:off x="838080" y="1825560"/>
-            <a:ext cx="10759320" cy="4744440"/>
+            <a:ext cx="10758960" cy="4744080"/>
           </a:xfrm>
           <a:prstGeom prst="rect">
             <a:avLst/>
@@ -30318,7 +30318,7 @@
       </p:grpSpPr>
       <p:sp>
         <p:nvSpPr>
-          <p:cNvPr id="156" name="PlaceHolder 1"/>
+          <p:cNvPr id="157" name="PlaceHolder 1"/>
           <p:cNvSpPr>
             <a:spLocks noGrp="1"/>
           </p:cNvSpPr>
@@ -30329,7 +30329,7 @@
         <p:spPr>
           <a:xfrm>
             <a:off x="838080" y="365040"/>
-            <a:ext cx="10512360" cy="1322280"/>
+            <a:ext cx="10512000" cy="1321920"/>
           </a:xfrm>
           <a:prstGeom prst="rect">
             <a:avLst/>
@@ -30384,7 +30384,7 @@
       </p:sp>
       <p:sp>
         <p:nvSpPr>
-          <p:cNvPr id="157" name="PlaceHolder 2"/>
+          <p:cNvPr id="158" name="PlaceHolder 2"/>
           <p:cNvSpPr>
             <a:spLocks noGrp="1"/>
           </p:cNvSpPr>
@@ -30395,7 +30395,7 @@
         <p:spPr>
           <a:xfrm>
             <a:off x="838080" y="1825560"/>
-            <a:ext cx="10759320" cy="4744440"/>
+            <a:ext cx="10758960" cy="4744080"/>
           </a:xfrm>
           <a:prstGeom prst="rect">
             <a:avLst/>
@@ -30473,7 +30473,7 @@
       </p:grpSpPr>
       <p:sp>
         <p:nvSpPr>
-          <p:cNvPr id="158" name="PlaceHolder 1"/>
+          <p:cNvPr id="159" name="PlaceHolder 1"/>
           <p:cNvSpPr>
             <a:spLocks noGrp="1"/>
           </p:cNvSpPr>
@@ -30484,7 +30484,7 @@
         <p:spPr>
           <a:xfrm>
             <a:off x="838080" y="365040"/>
-            <a:ext cx="10512360" cy="1322280"/>
+            <a:ext cx="10512000" cy="1321920"/>
           </a:xfrm>
           <a:prstGeom prst="rect">
             <a:avLst/>
@@ -30539,7 +30539,7 @@
       </p:sp>
       <p:sp>
         <p:nvSpPr>
-          <p:cNvPr id="159" name="PlaceHolder 2"/>
+          <p:cNvPr id="160" name="PlaceHolder 2"/>
           <p:cNvSpPr>
             <a:spLocks noGrp="1"/>
           </p:cNvSpPr>
@@ -30550,7 +30550,7 @@
         <p:spPr>
           <a:xfrm>
             <a:off x="838080" y="1825560"/>
-            <a:ext cx="10759320" cy="4744440"/>
+            <a:ext cx="10758960" cy="4744080"/>
           </a:xfrm>
           <a:prstGeom prst="rect">
             <a:avLst/>
@@ -30628,7 +30628,7 @@
       </p:grpSpPr>
       <p:sp>
         <p:nvSpPr>
-          <p:cNvPr id="160" name="PlaceHolder 1"/>
+          <p:cNvPr id="161" name="PlaceHolder 1"/>
           <p:cNvSpPr>
             <a:spLocks noGrp="1"/>
           </p:cNvSpPr>
@@ -30639,7 +30639,7 @@
         <p:spPr>
           <a:xfrm>
             <a:off x="838080" y="365040"/>
-            <a:ext cx="10512360" cy="1322280"/>
+            <a:ext cx="10512000" cy="1321920"/>
           </a:xfrm>
           <a:prstGeom prst="rect">
             <a:avLst/>
@@ -30694,7 +30694,7 @@
       </p:sp>
       <p:sp>
         <p:nvSpPr>
-          <p:cNvPr id="161" name="PlaceHolder 2"/>
+          <p:cNvPr id="162" name="PlaceHolder 2"/>
           <p:cNvSpPr>
             <a:spLocks noGrp="1"/>
           </p:cNvSpPr>
@@ -30705,7 +30705,7 @@
         <p:spPr>
           <a:xfrm>
             <a:off x="838080" y="1825560"/>
-            <a:ext cx="10759320" cy="4744440"/>
+            <a:ext cx="10758960" cy="4744080"/>
           </a:xfrm>
           <a:prstGeom prst="rect">
             <a:avLst/>
@@ -30783,7 +30783,7 @@
         <p:spPr>
           <a:xfrm>
             <a:off x="185760" y="2618280"/>
-            <a:ext cx="11817360" cy="8044920"/>
+            <a:ext cx="11817000" cy="8044920"/>
           </a:xfrm>
           <a:prstGeom prst="rect">
             <a:avLst/>
@@ -31167,7 +31167,7 @@
         <p:spPr>
           <a:xfrm>
             <a:off x="6289560" y="105840"/>
-            <a:ext cx="4816800" cy="593640"/>
+            <a:ext cx="4816440" cy="593280"/>
           </a:xfrm>
           <a:prstGeom prst="rect">
             <a:avLst/>
@@ -31190,7 +31190,7 @@
         <p:spPr>
           <a:xfrm>
             <a:off x="7717320" y="906480"/>
-            <a:ext cx="1501920" cy="587520"/>
+            <a:ext cx="1501560" cy="587160"/>
           </a:xfrm>
           <a:prstGeom prst="rect">
             <a:avLst/>
@@ -31213,7 +31213,7 @@
         <p:spPr>
           <a:xfrm>
             <a:off x="7755480" y="1700640"/>
-            <a:ext cx="1425600" cy="689040"/>
+            <a:ext cx="1425240" cy="688680"/>
           </a:xfrm>
           <a:prstGeom prst="rect">
             <a:avLst/>
@@ -31232,7 +31232,7 @@
         <p:spPr>
           <a:xfrm>
             <a:off x="9292320" y="832320"/>
-            <a:ext cx="2316600" cy="363960"/>
+            <a:ext cx="2316240" cy="363960"/>
           </a:xfrm>
           <a:prstGeom prst="rect">
             <a:avLst/>
@@ -31314,7 +31314,7 @@
       </p:grpSpPr>
       <p:sp>
         <p:nvSpPr>
-          <p:cNvPr id="162" name="PlaceHolder 1"/>
+          <p:cNvPr id="163" name="PlaceHolder 1"/>
           <p:cNvSpPr>
             <a:spLocks noGrp="1"/>
           </p:cNvSpPr>
@@ -31325,7 +31325,7 @@
         <p:spPr>
           <a:xfrm>
             <a:off x="838080" y="365040"/>
-            <a:ext cx="10512360" cy="1322280"/>
+            <a:ext cx="10512000" cy="1321920"/>
           </a:xfrm>
           <a:prstGeom prst="rect">
             <a:avLst/>
@@ -31380,7 +31380,7 @@
       </p:sp>
       <p:sp>
         <p:nvSpPr>
-          <p:cNvPr id="163" name="PlaceHolder 2"/>
+          <p:cNvPr id="164" name="PlaceHolder 2"/>
           <p:cNvSpPr>
             <a:spLocks noGrp="1"/>
           </p:cNvSpPr>
@@ -31391,7 +31391,7 @@
         <p:spPr>
           <a:xfrm>
             <a:off x="838080" y="1825560"/>
-            <a:ext cx="10759320" cy="4744440"/>
+            <a:ext cx="10758960" cy="4744080"/>
           </a:xfrm>
           <a:prstGeom prst="rect">
             <a:avLst/>
@@ -31469,7 +31469,7 @@
       </p:grpSpPr>
       <p:sp>
         <p:nvSpPr>
-          <p:cNvPr id="164" name="PlaceHolder 1"/>
+          <p:cNvPr id="165" name="PlaceHolder 1"/>
           <p:cNvSpPr>
             <a:spLocks noGrp="1"/>
           </p:cNvSpPr>
@@ -31480,7 +31480,7 @@
         <p:spPr>
           <a:xfrm>
             <a:off x="838080" y="365040"/>
-            <a:ext cx="10512360" cy="1322280"/>
+            <a:ext cx="10512000" cy="1321920"/>
           </a:xfrm>
           <a:prstGeom prst="rect">
             <a:avLst/>
@@ -31535,7 +31535,7 @@
       </p:sp>
       <p:sp>
         <p:nvSpPr>
-          <p:cNvPr id="165" name="PlaceHolder 2"/>
+          <p:cNvPr id="166" name="PlaceHolder 2"/>
           <p:cNvSpPr>
             <a:spLocks noGrp="1"/>
           </p:cNvSpPr>
@@ -31546,7 +31546,7 @@
         <p:spPr>
           <a:xfrm>
             <a:off x="838080" y="1825560"/>
-            <a:ext cx="10759320" cy="4744440"/>
+            <a:ext cx="10758960" cy="4744080"/>
           </a:xfrm>
           <a:prstGeom prst="rect">
             <a:avLst/>
@@ -31624,7 +31624,7 @@
       </p:grpSpPr>
       <p:sp>
         <p:nvSpPr>
-          <p:cNvPr id="166" name="PlaceHolder 1"/>
+          <p:cNvPr id="167" name="PlaceHolder 1"/>
           <p:cNvSpPr>
             <a:spLocks noGrp="1"/>
           </p:cNvSpPr>
@@ -31635,7 +31635,7 @@
         <p:spPr>
           <a:xfrm>
             <a:off x="838080" y="365040"/>
-            <a:ext cx="10512360" cy="1322280"/>
+            <a:ext cx="10512000" cy="1321920"/>
           </a:xfrm>
           <a:prstGeom prst="rect">
             <a:avLst/>
@@ -31690,7 +31690,7 @@
       </p:sp>
       <p:sp>
         <p:nvSpPr>
-          <p:cNvPr id="167" name="PlaceHolder 2"/>
+          <p:cNvPr id="168" name="PlaceHolder 2"/>
           <p:cNvSpPr>
             <a:spLocks noGrp="1"/>
           </p:cNvSpPr>
@@ -31701,7 +31701,7 @@
         <p:spPr>
           <a:xfrm>
             <a:off x="838080" y="1825560"/>
-            <a:ext cx="10759320" cy="4744440"/>
+            <a:ext cx="10758960" cy="4744080"/>
           </a:xfrm>
           <a:prstGeom prst="rect">
             <a:avLst/>
@@ -31779,7 +31779,7 @@
       </p:grpSpPr>
       <p:sp>
         <p:nvSpPr>
-          <p:cNvPr id="168" name="PlaceHolder 1"/>
+          <p:cNvPr id="169" name="PlaceHolder 1"/>
           <p:cNvSpPr>
             <a:spLocks noGrp="1"/>
           </p:cNvSpPr>
@@ -31790,7 +31790,7 @@
         <p:spPr>
           <a:xfrm>
             <a:off x="838080" y="365040"/>
-            <a:ext cx="10512360" cy="1322280"/>
+            <a:ext cx="10512000" cy="1321920"/>
           </a:xfrm>
           <a:prstGeom prst="rect">
             <a:avLst/>
@@ -31845,7 +31845,7 @@
       </p:sp>
       <p:sp>
         <p:nvSpPr>
-          <p:cNvPr id="169" name="PlaceHolder 2"/>
+          <p:cNvPr id="170" name="PlaceHolder 2"/>
           <p:cNvSpPr>
             <a:spLocks noGrp="1"/>
           </p:cNvSpPr>
@@ -31856,7 +31856,7 @@
         <p:spPr>
           <a:xfrm>
             <a:off x="838080" y="1825560"/>
-            <a:ext cx="10759320" cy="4744440"/>
+            <a:ext cx="10758960" cy="4744080"/>
           </a:xfrm>
           <a:prstGeom prst="rect">
             <a:avLst/>
@@ -31934,7 +31934,7 @@
       </p:grpSpPr>
       <p:sp>
         <p:nvSpPr>
-          <p:cNvPr id="170" name="PlaceHolder 1"/>
+          <p:cNvPr id="171" name="PlaceHolder 1"/>
           <p:cNvSpPr>
             <a:spLocks noGrp="1"/>
           </p:cNvSpPr>
@@ -31945,7 +31945,7 @@
         <p:spPr>
           <a:xfrm>
             <a:off x="838080" y="365040"/>
-            <a:ext cx="10512360" cy="1322280"/>
+            <a:ext cx="10512000" cy="1321920"/>
           </a:xfrm>
           <a:prstGeom prst="rect">
             <a:avLst/>
@@ -32000,7 +32000,7 @@
       </p:sp>
       <p:sp>
         <p:nvSpPr>
-          <p:cNvPr id="171" name="PlaceHolder 2"/>
+          <p:cNvPr id="172" name="PlaceHolder 2"/>
           <p:cNvSpPr>
             <a:spLocks noGrp="1"/>
           </p:cNvSpPr>
@@ -32011,7 +32011,7 @@
         <p:spPr>
           <a:xfrm>
             <a:off x="838080" y="1825560"/>
-            <a:ext cx="10759320" cy="4744440"/>
+            <a:ext cx="10758960" cy="4744080"/>
           </a:xfrm>
           <a:prstGeom prst="rect">
             <a:avLst/>
@@ -32089,7 +32089,7 @@
       </p:grpSpPr>
       <p:sp>
         <p:nvSpPr>
-          <p:cNvPr id="172" name="PlaceHolder 1"/>
+          <p:cNvPr id="173" name="PlaceHolder 1"/>
           <p:cNvSpPr>
             <a:spLocks noGrp="1"/>
           </p:cNvSpPr>
@@ -32100,7 +32100,7 @@
         <p:spPr>
           <a:xfrm>
             <a:off x="838080" y="365040"/>
-            <a:ext cx="10512360" cy="1322280"/>
+            <a:ext cx="10512000" cy="1321920"/>
           </a:xfrm>
           <a:prstGeom prst="rect">
             <a:avLst/>
@@ -32155,7 +32155,7 @@
       </p:sp>
       <p:sp>
         <p:nvSpPr>
-          <p:cNvPr id="173" name="PlaceHolder 2"/>
+          <p:cNvPr id="174" name="PlaceHolder 2"/>
           <p:cNvSpPr>
             <a:spLocks noGrp="1"/>
           </p:cNvSpPr>
@@ -32166,7 +32166,7 @@
         <p:spPr>
           <a:xfrm>
             <a:off x="838080" y="1825560"/>
-            <a:ext cx="10759320" cy="4744440"/>
+            <a:ext cx="10758960" cy="4744080"/>
           </a:xfrm>
           <a:prstGeom prst="rect">
             <a:avLst/>
@@ -32244,7 +32244,7 @@
       </p:grpSpPr>
       <p:sp>
         <p:nvSpPr>
-          <p:cNvPr id="174" name="PlaceHolder 1"/>
+          <p:cNvPr id="175" name="PlaceHolder 1"/>
           <p:cNvSpPr>
             <a:spLocks noGrp="1"/>
           </p:cNvSpPr>
@@ -32255,7 +32255,7 @@
         <p:spPr>
           <a:xfrm>
             <a:off x="838080" y="365040"/>
-            <a:ext cx="10512360" cy="1322280"/>
+            <a:ext cx="10512000" cy="1321920"/>
           </a:xfrm>
           <a:prstGeom prst="rect">
             <a:avLst/>
@@ -32310,7 +32310,7 @@
       </p:sp>
       <p:sp>
         <p:nvSpPr>
-          <p:cNvPr id="175" name="PlaceHolder 2"/>
+          <p:cNvPr id="176" name="PlaceHolder 2"/>
           <p:cNvSpPr>
             <a:spLocks noGrp="1"/>
           </p:cNvSpPr>
@@ -32321,7 +32321,7 @@
         <p:spPr>
           <a:xfrm>
             <a:off x="838080" y="1825560"/>
-            <a:ext cx="10759320" cy="4744440"/>
+            <a:ext cx="10758960" cy="4744080"/>
           </a:xfrm>
           <a:prstGeom prst="rect">
             <a:avLst/>
@@ -32399,7 +32399,7 @@
       </p:grpSpPr>
       <p:sp>
         <p:nvSpPr>
-          <p:cNvPr id="176" name="PlaceHolder 1"/>
+          <p:cNvPr id="177" name="PlaceHolder 1"/>
           <p:cNvSpPr>
             <a:spLocks noGrp="1"/>
           </p:cNvSpPr>
@@ -32410,7 +32410,7 @@
         <p:spPr>
           <a:xfrm>
             <a:off x="838080" y="365040"/>
-            <a:ext cx="10512360" cy="1322280"/>
+            <a:ext cx="10512000" cy="1321920"/>
           </a:xfrm>
           <a:prstGeom prst="rect">
             <a:avLst/>
@@ -32465,7 +32465,7 @@
       </p:sp>
       <p:sp>
         <p:nvSpPr>
-          <p:cNvPr id="177" name="PlaceHolder 2"/>
+          <p:cNvPr id="178" name="PlaceHolder 2"/>
           <p:cNvSpPr>
             <a:spLocks noGrp="1"/>
           </p:cNvSpPr>
@@ -32476,7 +32476,7 @@
         <p:spPr>
           <a:xfrm>
             <a:off x="838080" y="1825560"/>
-            <a:ext cx="10759320" cy="4744440"/>
+            <a:ext cx="10758960" cy="4744080"/>
           </a:xfrm>
           <a:prstGeom prst="rect">
             <a:avLst/>
@@ -32554,7 +32554,7 @@
       </p:grpSpPr>
       <p:sp>
         <p:nvSpPr>
-          <p:cNvPr id="178" name="PlaceHolder 1"/>
+          <p:cNvPr id="179" name="PlaceHolder 1"/>
           <p:cNvSpPr>
             <a:spLocks noGrp="1"/>
           </p:cNvSpPr>
@@ -32565,7 +32565,7 @@
         <p:spPr>
           <a:xfrm>
             <a:off x="838080" y="365040"/>
-            <a:ext cx="10512360" cy="1322280"/>
+            <a:ext cx="10512000" cy="1321920"/>
           </a:xfrm>
           <a:prstGeom prst="rect">
             <a:avLst/>
@@ -32620,7 +32620,7 @@
       </p:sp>
       <p:sp>
         <p:nvSpPr>
-          <p:cNvPr id="179" name="PlaceHolder 2"/>
+          <p:cNvPr id="180" name="PlaceHolder 2"/>
           <p:cNvSpPr>
             <a:spLocks noGrp="1"/>
           </p:cNvSpPr>
@@ -32631,7 +32631,7 @@
         <p:spPr>
           <a:xfrm>
             <a:off x="838080" y="1825560"/>
-            <a:ext cx="10759320" cy="4744440"/>
+            <a:ext cx="10758960" cy="4744080"/>
           </a:xfrm>
           <a:prstGeom prst="rect">
             <a:avLst/>
@@ -32709,7 +32709,7 @@
       </p:grpSpPr>
       <p:sp>
         <p:nvSpPr>
-          <p:cNvPr id="180" name="PlaceHolder 1"/>
+          <p:cNvPr id="181" name="PlaceHolder 1"/>
           <p:cNvSpPr>
             <a:spLocks noGrp="1"/>
           </p:cNvSpPr>
@@ -32720,7 +32720,7 @@
         <p:spPr>
           <a:xfrm>
             <a:off x="838080" y="365040"/>
-            <a:ext cx="10512360" cy="1322280"/>
+            <a:ext cx="10512000" cy="1321920"/>
           </a:xfrm>
           <a:prstGeom prst="rect">
             <a:avLst/>
@@ -32775,7 +32775,7 @@
       </p:sp>
       <p:sp>
         <p:nvSpPr>
-          <p:cNvPr id="181" name="PlaceHolder 2"/>
+          <p:cNvPr id="182" name="PlaceHolder 2"/>
           <p:cNvSpPr>
             <a:spLocks noGrp="1"/>
           </p:cNvSpPr>
@@ -32786,7 +32786,7 @@
         <p:spPr>
           <a:xfrm>
             <a:off x="838080" y="1825560"/>
-            <a:ext cx="10759320" cy="4744440"/>
+            <a:ext cx="10758960" cy="4744080"/>
           </a:xfrm>
           <a:prstGeom prst="rect">
             <a:avLst/>
@@ -33452,7 +33452,7 @@
         <p:spPr>
           <a:xfrm>
             <a:off x="190440" y="444600"/>
-            <a:ext cx="5369040" cy="1735560"/>
+            <a:ext cx="5368680" cy="1735560"/>
           </a:xfrm>
           <a:prstGeom prst="rect">
             <a:avLst/>
@@ -33532,7 +33532,7 @@
                 <a:latin typeface="Calibri"/>
                 <a:ea typeface="DejaVu Sans"/>
               </a:rPr>
-              <a:t>Rolling average or moving average volatility can identify a lasting trend of high or low volatility.. </a:t>
+              <a:t>Rolling average or moving average volatility can identify a lasting trend of high or low volatility. </a:t>
             </a:r>
             <a:endParaRPr b="0" lang="en-US" sz="1800" spc="-1" strike="noStrike">
               <a:latin typeface="Arial"/>
@@ -33549,7 +33549,7 @@
         <p:spPr>
           <a:xfrm>
             <a:off x="190440" y="2323080"/>
-            <a:ext cx="5369040" cy="912600"/>
+            <a:ext cx="5368680" cy="912600"/>
           </a:xfrm>
           <a:prstGeom prst="rect">
             <a:avLst/>
@@ -33617,7 +33617,7 @@
         <p:spPr>
           <a:xfrm>
             <a:off x="190440" y="3371040"/>
-            <a:ext cx="5369040" cy="2284200"/>
+            <a:ext cx="5368680" cy="3381480"/>
           </a:xfrm>
           <a:prstGeom prst="rect">
             <a:avLst/>
@@ -33661,6 +33661,38 @@
               <a:latin typeface="Arial"/>
             </a:endParaRPr>
           </a:p>
+          <a:p>
+            <a:pPr>
+              <a:lnSpc>
+                <a:spcPct val="100000"/>
+              </a:lnSpc>
+              <a:buNone/>
+            </a:pPr>
+            <a:endParaRPr b="0" lang="en-US" sz="1800" spc="-1" strike="noStrike">
+              <a:latin typeface="Arial"/>
+            </a:endParaRPr>
+          </a:p>
+          <a:p>
+            <a:pPr>
+              <a:lnSpc>
+                <a:spcPct val="100000"/>
+              </a:lnSpc>
+              <a:buNone/>
+            </a:pPr>
+            <a:r>
+              <a:rPr b="0" lang="en-SG" sz="1800" spc="-1" strike="noStrike">
+                <a:solidFill>
+                  <a:srgbClr val="000000"/>
+                </a:solidFill>
+                <a:latin typeface="Calibri"/>
+                <a:ea typeface="DejaVu Sans"/>
+              </a:rPr>
+              <a:t>Use reverse engineered time ids to make more accurate GARCH models. Use this part of ensemble models</a:t>
+            </a:r>
+            <a:endParaRPr b="0" lang="en-US" sz="1800" spc="-1" strike="noStrike">
+              <a:latin typeface="Arial"/>
+            </a:endParaRPr>
+          </a:p>
         </p:txBody>
       </p:sp>
       <p:sp>
@@ -33671,8 +33703,8 @@
         </p:nvSpPr>
         <p:spPr>
           <a:xfrm>
-            <a:off x="190440" y="5356080"/>
-            <a:ext cx="5369040" cy="1735560"/>
+            <a:off x="5943600" y="4893840"/>
+            <a:ext cx="5368680" cy="1735560"/>
           </a:xfrm>
           <a:prstGeom prst="rect">
             <a:avLst/>
@@ -33727,7 +33759,7 @@
         <p:spPr>
           <a:xfrm>
             <a:off x="6337440" y="318600"/>
-            <a:ext cx="5369040" cy="2832840"/>
+            <a:ext cx="5368680" cy="2559240"/>
           </a:xfrm>
           <a:prstGeom prst="rect">
             <a:avLst/>
@@ -33785,7 +33817,7 @@
                 <a:latin typeface="Calibri"/>
                 <a:ea typeface="DejaVu Sans"/>
               </a:rPr>
-              <a:t> 1o mins. This is called the leverage effect. Cam we forecast trend in the 2</a:t>
+              <a:t> 10 mins. This is called the leverage effect. Cam we forecast trend in the 2</a:t>
             </a:r>
             <a:r>
               <a:rPr b="0" lang="en-SG" sz="1800" spc="-1" strike="noStrike" baseline="30000">
@@ -33817,10 +33849,47 @@
               </a:rPr>
               <a:t> Try using moving average of WAP of different window sizes and check if current price is above or below average. to  predict short term trend in 2nd 10 mins. </a:t>
             </a:r>
+            <a:br>
+              <a:rPr sz="1800"/>
+            </a:br>
             <a:endParaRPr b="0" lang="en-US" sz="1800" spc="-1" strike="noStrike">
               <a:latin typeface="Arial"/>
             </a:endParaRPr>
           </a:p>
+        </p:txBody>
+      </p:sp>
+      <p:sp>
+        <p:nvSpPr>
+          <p:cNvPr id="95" name="TextBox 1"/>
+          <p:cNvSpPr/>
+          <p:nvPr/>
+        </p:nvSpPr>
+        <p:spPr>
+          <a:xfrm>
+            <a:off x="5715000" y="3430800"/>
+            <a:ext cx="5368680" cy="912600"/>
+          </a:xfrm>
+          <a:prstGeom prst="rect">
+            <a:avLst/>
+          </a:prstGeom>
+          <a:noFill/>
+          <a:ln w="28575">
+            <a:solidFill>
+              <a:srgbClr val="00b0f0"/>
+            </a:solidFill>
+            <a:round/>
+          </a:ln>
+        </p:spPr>
+        <p:style>
+          <a:lnRef idx="0"/>
+          <a:fillRef idx="0"/>
+          <a:effectRef idx="0"/>
+          <a:fontRef idx="minor"/>
+        </p:style>
+        <p:txBody>
+          <a:bodyPr lIns="90000" rIns="90000" tIns="45000" bIns="45000" anchor="t">
+            <a:spAutoFit/>
+          </a:bodyPr>
           <a:p>
             <a:pPr>
               <a:lnSpc>
@@ -33828,9 +33897,206 @@
               </a:lnSpc>
               <a:buNone/>
             </a:pPr>
-            <a:br>
-              <a:rPr sz="1800"/>
-            </a:br>
+            <a:r>
+              <a:rPr b="0" lang="en-SG" sz="1800" spc="-1" strike="noStrike">
+                <a:solidFill>
+                  <a:srgbClr val="000000"/>
+                </a:solidFill>
+                <a:latin typeface="Calibri"/>
+                <a:ea typeface="DejaVu Sans"/>
+              </a:rPr>
+              <a:t>Chec</a:t>
+            </a:r>
+            <a:r>
+              <a:rPr b="0" lang="en-SG" sz="1800" spc="-1" strike="noStrike">
+                <a:solidFill>
+                  <a:srgbClr val="000000"/>
+                </a:solidFill>
+                <a:latin typeface="Calibri"/>
+                <a:ea typeface="DejaVu Sans"/>
+              </a:rPr>
+              <a:t>k </a:t>
+            </a:r>
+            <a:r>
+              <a:rPr b="0" lang="en-SG" sz="1800" spc="-1" strike="noStrike">
+                <a:solidFill>
+                  <a:srgbClr val="000000"/>
+                </a:solidFill>
+                <a:latin typeface="Calibri"/>
+                <a:ea typeface="DejaVu Sans"/>
+              </a:rPr>
+              <a:t>curre</a:t>
+            </a:r>
+            <a:r>
+              <a:rPr b="0" lang="en-SG" sz="1800" spc="-1" strike="noStrike">
+                <a:solidFill>
+                  <a:srgbClr val="000000"/>
+                </a:solidFill>
+                <a:latin typeface="Calibri"/>
+                <a:ea typeface="DejaVu Sans"/>
+              </a:rPr>
+              <a:t>nt </a:t>
+            </a:r>
+            <a:r>
+              <a:rPr b="0" lang="en-SG" sz="1800" spc="-1" strike="noStrike">
+                <a:solidFill>
+                  <a:srgbClr val="000000"/>
+                </a:solidFill>
+                <a:latin typeface="Calibri"/>
+                <a:ea typeface="DejaVu Sans"/>
+              </a:rPr>
+              <a:t>liquid</a:t>
+            </a:r>
+            <a:r>
+              <a:rPr b="0" lang="en-SG" sz="1800" spc="-1" strike="noStrike">
+                <a:solidFill>
+                  <a:srgbClr val="000000"/>
+                </a:solidFill>
+                <a:latin typeface="Calibri"/>
+                <a:ea typeface="DejaVu Sans"/>
+              </a:rPr>
+              <a:t>ity in </a:t>
+            </a:r>
+            <a:r>
+              <a:rPr b="0" lang="en-SG" sz="1800" spc="-1" strike="noStrike">
+                <a:solidFill>
+                  <a:srgbClr val="000000"/>
+                </a:solidFill>
+                <a:latin typeface="Calibri"/>
+                <a:ea typeface="DejaVu Sans"/>
+              </a:rPr>
+              <a:t>order </a:t>
+            </a:r>
+            <a:r>
+              <a:rPr b="0" lang="en-SG" sz="1800" spc="-1" strike="noStrike">
+                <a:solidFill>
+                  <a:srgbClr val="000000"/>
+                </a:solidFill>
+                <a:latin typeface="Calibri"/>
+                <a:ea typeface="DejaVu Sans"/>
+              </a:rPr>
+              <a:t>book </a:t>
+            </a:r>
+            <a:r>
+              <a:rPr b="0" lang="en-SG" sz="1800" spc="-1" strike="noStrike">
+                <a:solidFill>
+                  <a:srgbClr val="000000"/>
+                </a:solidFill>
+                <a:latin typeface="Calibri"/>
+                <a:ea typeface="DejaVu Sans"/>
+              </a:rPr>
+              <a:t>and </a:t>
+            </a:r>
+            <a:r>
+              <a:rPr b="0" lang="en-SG" sz="1800" spc="-1" strike="noStrike">
+                <a:solidFill>
+                  <a:srgbClr val="000000"/>
+                </a:solidFill>
+                <a:latin typeface="Calibri"/>
+                <a:ea typeface="DejaVu Sans"/>
+              </a:rPr>
+              <a:t>trade </a:t>
+            </a:r>
+            <a:r>
+              <a:rPr b="0" lang="en-SG" sz="1800" spc="-1" strike="noStrike">
+                <a:solidFill>
+                  <a:srgbClr val="000000"/>
+                </a:solidFill>
+                <a:latin typeface="Calibri"/>
+                <a:ea typeface="DejaVu Sans"/>
+              </a:rPr>
+              <a:t>exec</a:t>
+            </a:r>
+            <a:r>
+              <a:rPr b="0" lang="en-SG" sz="1800" spc="-1" strike="noStrike">
+                <a:solidFill>
+                  <a:srgbClr val="000000"/>
+                </a:solidFill>
+                <a:latin typeface="Calibri"/>
+                <a:ea typeface="DejaVu Sans"/>
+              </a:rPr>
+              <a:t>ution </a:t>
+            </a:r>
+            <a:r>
+              <a:rPr b="0" lang="en-SG" sz="1800" spc="-1" strike="noStrike">
+                <a:solidFill>
+                  <a:srgbClr val="000000"/>
+                </a:solidFill>
+                <a:latin typeface="Calibri"/>
+                <a:ea typeface="DejaVu Sans"/>
+              </a:rPr>
+              <a:t>book </a:t>
+            </a:r>
+            <a:r>
+              <a:rPr b="0" lang="en-SG" sz="1800" spc="-1" strike="noStrike">
+                <a:solidFill>
+                  <a:srgbClr val="000000"/>
+                </a:solidFill>
+                <a:latin typeface="Calibri"/>
+                <a:ea typeface="DejaVu Sans"/>
+              </a:rPr>
+              <a:t>to </a:t>
+            </a:r>
+            <a:r>
+              <a:rPr b="0" lang="en-SG" sz="1800" spc="-1" strike="noStrike">
+                <a:solidFill>
+                  <a:srgbClr val="000000"/>
+                </a:solidFill>
+                <a:latin typeface="Calibri"/>
+                <a:ea typeface="DejaVu Sans"/>
+              </a:rPr>
+              <a:t>predi</a:t>
+            </a:r>
+            <a:r>
+              <a:rPr b="0" lang="en-SG" sz="1800" spc="-1" strike="noStrike">
+                <a:solidFill>
+                  <a:srgbClr val="000000"/>
+                </a:solidFill>
+                <a:latin typeface="Calibri"/>
+                <a:ea typeface="DejaVu Sans"/>
+              </a:rPr>
+              <a:t>ct </a:t>
+            </a:r>
+            <a:r>
+              <a:rPr b="0" lang="en-SG" sz="1800" spc="-1" strike="noStrike">
+                <a:solidFill>
+                  <a:srgbClr val="000000"/>
+                </a:solidFill>
+                <a:latin typeface="Calibri"/>
+                <a:ea typeface="DejaVu Sans"/>
+              </a:rPr>
+              <a:t>futur</a:t>
+            </a:r>
+            <a:r>
+              <a:rPr b="0" lang="en-SG" sz="1800" spc="-1" strike="noStrike">
+                <a:solidFill>
+                  <a:srgbClr val="000000"/>
+                </a:solidFill>
+                <a:latin typeface="Calibri"/>
+                <a:ea typeface="DejaVu Sans"/>
+              </a:rPr>
+              <a:t>e </a:t>
+            </a:r>
+            <a:r>
+              <a:rPr b="0" lang="en-SG" sz="1800" spc="-1" strike="noStrike">
+                <a:solidFill>
+                  <a:srgbClr val="000000"/>
+                </a:solidFill>
+                <a:latin typeface="Calibri"/>
+                <a:ea typeface="DejaVu Sans"/>
+              </a:rPr>
+              <a:t>volati</a:t>
+            </a:r>
+            <a:r>
+              <a:rPr b="0" lang="en-SG" sz="1800" spc="-1" strike="noStrike">
+                <a:solidFill>
+                  <a:srgbClr val="000000"/>
+                </a:solidFill>
+                <a:latin typeface="Calibri"/>
+                <a:ea typeface="DejaVu Sans"/>
+              </a:rPr>
+              <a:t>lity</a:t>
+            </a:r>
             <a:endParaRPr b="0" lang="en-US" sz="1800" spc="-1" strike="noStrike">
               <a:latin typeface="Arial"/>
             </a:endParaRPr>
@@ -33876,7 +34142,7 @@
       </p:grpSpPr>
       <p:sp>
         <p:nvSpPr>
-          <p:cNvPr id="182" name="PlaceHolder 1"/>
+          <p:cNvPr id="183" name="PlaceHolder 1"/>
           <p:cNvSpPr>
             <a:spLocks noGrp="1"/>
           </p:cNvSpPr>
@@ -33887,7 +34153,7 @@
         <p:spPr>
           <a:xfrm>
             <a:off x="838080" y="365040"/>
-            <a:ext cx="10512360" cy="1322280"/>
+            <a:ext cx="10512000" cy="1321920"/>
           </a:xfrm>
           <a:prstGeom prst="rect">
             <a:avLst/>
@@ -33942,7 +34208,7 @@
       </p:sp>
       <p:sp>
         <p:nvSpPr>
-          <p:cNvPr id="183" name="PlaceHolder 2"/>
+          <p:cNvPr id="184" name="PlaceHolder 2"/>
           <p:cNvSpPr>
             <a:spLocks noGrp="1"/>
           </p:cNvSpPr>
@@ -33953,7 +34219,7 @@
         <p:spPr>
           <a:xfrm>
             <a:off x="838080" y="1825560"/>
-            <a:ext cx="10759320" cy="4744440"/>
+            <a:ext cx="10758960" cy="4744080"/>
           </a:xfrm>
           <a:prstGeom prst="rect">
             <a:avLst/>
@@ -34031,7 +34297,7 @@
       </p:grpSpPr>
       <p:sp>
         <p:nvSpPr>
-          <p:cNvPr id="184" name="PlaceHolder 1"/>
+          <p:cNvPr id="185" name="PlaceHolder 1"/>
           <p:cNvSpPr>
             <a:spLocks noGrp="1"/>
           </p:cNvSpPr>
@@ -34042,7 +34308,7 @@
         <p:spPr>
           <a:xfrm>
             <a:off x="838080" y="365040"/>
-            <a:ext cx="10512360" cy="1322280"/>
+            <a:ext cx="10512000" cy="1321920"/>
           </a:xfrm>
           <a:prstGeom prst="rect">
             <a:avLst/>
@@ -34097,7 +34363,7 @@
       </p:sp>
       <p:sp>
         <p:nvSpPr>
-          <p:cNvPr id="185" name="PlaceHolder 2"/>
+          <p:cNvPr id="186" name="PlaceHolder 2"/>
           <p:cNvSpPr>
             <a:spLocks noGrp="1"/>
           </p:cNvSpPr>
@@ -34108,7 +34374,7 @@
         <p:spPr>
           <a:xfrm>
             <a:off x="838080" y="1825560"/>
-            <a:ext cx="10759320" cy="4744440"/>
+            <a:ext cx="10758960" cy="4744080"/>
           </a:xfrm>
           <a:prstGeom prst="rect">
             <a:avLst/>
@@ -34186,7 +34452,7 @@
       </p:grpSpPr>
       <p:sp>
         <p:nvSpPr>
-          <p:cNvPr id="186" name="PlaceHolder 1"/>
+          <p:cNvPr id="187" name="PlaceHolder 1"/>
           <p:cNvSpPr>
             <a:spLocks noGrp="1"/>
           </p:cNvSpPr>
@@ -34197,7 +34463,7 @@
         <p:spPr>
           <a:xfrm>
             <a:off x="838080" y="365040"/>
-            <a:ext cx="10512360" cy="1322280"/>
+            <a:ext cx="10512000" cy="1321920"/>
           </a:xfrm>
           <a:prstGeom prst="rect">
             <a:avLst/>
@@ -34252,7 +34518,7 @@
       </p:sp>
       <p:sp>
         <p:nvSpPr>
-          <p:cNvPr id="187" name="PlaceHolder 2"/>
+          <p:cNvPr id="188" name="PlaceHolder 2"/>
           <p:cNvSpPr>
             <a:spLocks noGrp="1"/>
           </p:cNvSpPr>
@@ -34263,7 +34529,7 @@
         <p:spPr>
           <a:xfrm>
             <a:off x="838080" y="1825560"/>
-            <a:ext cx="10759320" cy="4744440"/>
+            <a:ext cx="10758960" cy="4744080"/>
           </a:xfrm>
           <a:prstGeom prst="rect">
             <a:avLst/>
@@ -34341,7 +34607,7 @@
       </p:grpSpPr>
       <p:sp>
         <p:nvSpPr>
-          <p:cNvPr id="188" name="PlaceHolder 1"/>
+          <p:cNvPr id="189" name="PlaceHolder 1"/>
           <p:cNvSpPr>
             <a:spLocks noGrp="1"/>
           </p:cNvSpPr>
@@ -34352,7 +34618,7 @@
         <p:spPr>
           <a:xfrm>
             <a:off x="838080" y="365040"/>
-            <a:ext cx="10512360" cy="1322280"/>
+            <a:ext cx="10512000" cy="1321920"/>
           </a:xfrm>
           <a:prstGeom prst="rect">
             <a:avLst/>
@@ -34407,7 +34673,7 @@
       </p:sp>
       <p:sp>
         <p:nvSpPr>
-          <p:cNvPr id="189" name="PlaceHolder 2"/>
+          <p:cNvPr id="190" name="PlaceHolder 2"/>
           <p:cNvSpPr>
             <a:spLocks noGrp="1"/>
           </p:cNvSpPr>
@@ -34418,7 +34684,7 @@
         <p:spPr>
           <a:xfrm>
             <a:off x="838080" y="1825560"/>
-            <a:ext cx="10759320" cy="4744440"/>
+            <a:ext cx="10758960" cy="4744080"/>
           </a:xfrm>
           <a:prstGeom prst="rect">
             <a:avLst/>
@@ -34496,7 +34762,7 @@
       </p:grpSpPr>
       <p:sp>
         <p:nvSpPr>
-          <p:cNvPr id="190" name="PlaceHolder 1"/>
+          <p:cNvPr id="191" name="PlaceHolder 1"/>
           <p:cNvSpPr>
             <a:spLocks noGrp="1"/>
           </p:cNvSpPr>
@@ -34507,7 +34773,7 @@
         <p:spPr>
           <a:xfrm>
             <a:off x="838080" y="365040"/>
-            <a:ext cx="10512360" cy="1322280"/>
+            <a:ext cx="10512000" cy="1321920"/>
           </a:xfrm>
           <a:prstGeom prst="rect">
             <a:avLst/>
@@ -34545,7 +34811,7 @@
       </p:sp>
       <p:sp>
         <p:nvSpPr>
-          <p:cNvPr id="191" name="PlaceHolder 2"/>
+          <p:cNvPr id="192" name="PlaceHolder 2"/>
           <p:cNvSpPr>
             <a:spLocks noGrp="1"/>
           </p:cNvSpPr>
@@ -34556,7 +34822,7 @@
         <p:spPr>
           <a:xfrm>
             <a:off x="838080" y="1825560"/>
-            <a:ext cx="10759320" cy="4744440"/>
+            <a:ext cx="10758960" cy="4744080"/>
           </a:xfrm>
           <a:prstGeom prst="rect">
             <a:avLst/>
@@ -34634,7 +34900,7 @@
       </p:grpSpPr>
       <p:sp>
         <p:nvSpPr>
-          <p:cNvPr id="192" name="PlaceHolder 1"/>
+          <p:cNvPr id="193" name="PlaceHolder 1"/>
           <p:cNvSpPr>
             <a:spLocks noGrp="1"/>
           </p:cNvSpPr>
@@ -34645,7 +34911,7 @@
         <p:spPr>
           <a:xfrm>
             <a:off x="838080" y="365040"/>
-            <a:ext cx="10512360" cy="1322280"/>
+            <a:ext cx="10512000" cy="1321920"/>
           </a:xfrm>
           <a:prstGeom prst="rect">
             <a:avLst/>
@@ -34683,7 +34949,7 @@
       </p:sp>
       <p:sp>
         <p:nvSpPr>
-          <p:cNvPr id="193" name="PlaceHolder 2"/>
+          <p:cNvPr id="194" name="PlaceHolder 2"/>
           <p:cNvSpPr>
             <a:spLocks noGrp="1"/>
           </p:cNvSpPr>
@@ -34694,7 +34960,7 @@
         <p:spPr>
           <a:xfrm>
             <a:off x="838080" y="1825560"/>
-            <a:ext cx="10759320" cy="4744440"/>
+            <a:ext cx="10758960" cy="4744080"/>
           </a:xfrm>
           <a:prstGeom prst="rect">
             <a:avLst/>
@@ -34772,7 +35038,7 @@
       </p:grpSpPr>
       <p:sp>
         <p:nvSpPr>
-          <p:cNvPr id="194" name="PlaceHolder 1"/>
+          <p:cNvPr id="195" name="PlaceHolder 1"/>
           <p:cNvSpPr>
             <a:spLocks noGrp="1"/>
           </p:cNvSpPr>
@@ -34783,7 +35049,7 @@
         <p:spPr>
           <a:xfrm>
             <a:off x="838080" y="365040"/>
-            <a:ext cx="10512360" cy="1322280"/>
+            <a:ext cx="10512000" cy="1321920"/>
           </a:xfrm>
           <a:prstGeom prst="rect">
             <a:avLst/>
@@ -34821,7 +35087,7 @@
       </p:sp>
       <p:sp>
         <p:nvSpPr>
-          <p:cNvPr id="195" name="PlaceHolder 2"/>
+          <p:cNvPr id="196" name="PlaceHolder 2"/>
           <p:cNvSpPr>
             <a:spLocks noGrp="1"/>
           </p:cNvSpPr>
@@ -34832,7 +35098,7 @@
         <p:spPr>
           <a:xfrm>
             <a:off x="838080" y="1825560"/>
-            <a:ext cx="10759320" cy="4744440"/>
+            <a:ext cx="10758960" cy="4744080"/>
           </a:xfrm>
           <a:prstGeom prst="rect">
             <a:avLst/>
@@ -34910,7 +35176,7 @@
       </p:grpSpPr>
       <p:sp>
         <p:nvSpPr>
-          <p:cNvPr id="196" name="PlaceHolder 1"/>
+          <p:cNvPr id="197" name="PlaceHolder 1"/>
           <p:cNvSpPr>
             <a:spLocks noGrp="1"/>
           </p:cNvSpPr>
@@ -34921,7 +35187,7 @@
         <p:spPr>
           <a:xfrm>
             <a:off x="838080" y="365040"/>
-            <a:ext cx="10512360" cy="1322280"/>
+            <a:ext cx="10512000" cy="1321920"/>
           </a:xfrm>
           <a:prstGeom prst="rect">
             <a:avLst/>
@@ -34959,7 +35225,7 @@
       </p:sp>
       <p:sp>
         <p:nvSpPr>
-          <p:cNvPr id="197" name="PlaceHolder 2"/>
+          <p:cNvPr id="198" name="PlaceHolder 2"/>
           <p:cNvSpPr>
             <a:spLocks noGrp="1"/>
           </p:cNvSpPr>
@@ -34970,7 +35236,7 @@
         <p:spPr>
           <a:xfrm>
             <a:off x="838080" y="1825560"/>
-            <a:ext cx="10759320" cy="4744440"/>
+            <a:ext cx="10758960" cy="4744080"/>
           </a:xfrm>
           <a:prstGeom prst="rect">
             <a:avLst/>
@@ -35041,14 +35307,14 @@
       </p:grpSpPr>
       <p:sp>
         <p:nvSpPr>
-          <p:cNvPr id="95" name="TextBox 3"/>
+          <p:cNvPr id="96" name="TextBox 3"/>
           <p:cNvSpPr/>
           <p:nvPr/>
         </p:nvSpPr>
         <p:spPr>
           <a:xfrm>
             <a:off x="202680" y="147240"/>
-            <a:ext cx="988920" cy="638280"/>
+            <a:ext cx="988560" cy="638280"/>
           </a:xfrm>
           <a:prstGeom prst="rect">
             <a:avLst/>
@@ -35096,14 +35362,14 @@
       </p:sp>
       <p:sp>
         <p:nvSpPr>
-          <p:cNvPr id="96" name="Rectangle: Rounded Corners 5"/>
+          <p:cNvPr id="97" name="Rectangle: Rounded Corners 5"/>
           <p:cNvSpPr/>
           <p:nvPr/>
         </p:nvSpPr>
         <p:spPr>
           <a:xfrm>
             <a:off x="1283040" y="1018080"/>
-            <a:ext cx="911160" cy="911160"/>
+            <a:ext cx="910800" cy="910800"/>
           </a:xfrm>
           <a:prstGeom prst="roundRect">
             <a:avLst>
@@ -35165,14 +35431,14 @@
       </p:sp>
       <p:sp>
         <p:nvSpPr>
-          <p:cNvPr id="97" name="Rectangle: Rounded Corners 7"/>
+          <p:cNvPr id="98" name="Rectangle: Rounded Corners 7"/>
           <p:cNvSpPr/>
           <p:nvPr/>
         </p:nvSpPr>
         <p:spPr>
           <a:xfrm>
             <a:off x="243720" y="5844240"/>
-            <a:ext cx="911160" cy="911160"/>
+            <a:ext cx="910800" cy="910800"/>
           </a:xfrm>
           <a:prstGeom prst="roundRect">
             <a:avLst>
@@ -35234,14 +35500,14 @@
       </p:sp>
       <p:sp>
         <p:nvSpPr>
-          <p:cNvPr id="98" name="Connector: Elbow 11"/>
+          <p:cNvPr id="99" name="Connector: Elbow 11"/>
           <p:cNvSpPr/>
           <p:nvPr/>
         </p:nvSpPr>
         <p:spPr>
           <a:xfrm flipH="1" rot="16200000">
-            <a:off x="650520" y="842400"/>
-            <a:ext cx="678240" cy="581040"/>
+            <a:off x="650160" y="842400"/>
+            <a:ext cx="677880" cy="580680"/>
           </a:xfrm>
           <a:prstGeom prst="bentConnector2">
             <a:avLst/>
@@ -35269,14 +35535,14 @@
       </p:sp>
       <p:sp>
         <p:nvSpPr>
-          <p:cNvPr id="99" name="Connector: Elbow 12"/>
+          <p:cNvPr id="100" name="Connector: Elbow 12"/>
           <p:cNvSpPr/>
           <p:nvPr/>
         </p:nvSpPr>
         <p:spPr>
           <a:xfrm flipH="1" rot="16200000">
             <a:off x="-1824840" y="3317040"/>
-            <a:ext cx="5047200" cy="360"/>
+            <a:ext cx="5046840" cy="360"/>
           </a:xfrm>
           <a:prstGeom prst="bentConnector3">
             <a:avLst>
@@ -35306,14 +35572,14 @@
       </p:sp>
       <p:sp>
         <p:nvSpPr>
-          <p:cNvPr id="100" name="Rectangle: Rounded Corners 15"/>
+          <p:cNvPr id="101" name="Rectangle: Rounded Corners 15"/>
           <p:cNvSpPr/>
           <p:nvPr/>
         </p:nvSpPr>
         <p:spPr>
           <a:xfrm>
             <a:off x="2660040" y="83520"/>
-            <a:ext cx="5696640" cy="5890680"/>
+            <a:ext cx="5696280" cy="5890320"/>
           </a:xfrm>
           <a:prstGeom prst="roundRect">
             <a:avLst>
@@ -35713,7 +35979,7 @@
       </p:sp>
       <p:pic>
         <p:nvPicPr>
-          <p:cNvPr id="101" name="Picture 29" descr=""/>
+          <p:cNvPr id="102" name="Picture 29" descr=""/>
           <p:cNvPicPr/>
           <p:nvPr/>
         </p:nvPicPr>
@@ -35724,7 +35990,7 @@
         <p:spPr>
           <a:xfrm>
             <a:off x="8427960" y="479520"/>
-            <a:ext cx="3513600" cy="1347480"/>
+            <a:ext cx="3513240" cy="1347120"/>
           </a:xfrm>
           <a:prstGeom prst="rect">
             <a:avLst/>
@@ -35736,7 +36002,7 @@
       </p:pic>
       <p:pic>
         <p:nvPicPr>
-          <p:cNvPr id="102" name="Picture 33" descr=""/>
+          <p:cNvPr id="103" name="Picture 33" descr=""/>
           <p:cNvPicPr/>
           <p:nvPr/>
         </p:nvPicPr>
@@ -35747,7 +36013,7 @@
         <p:spPr>
           <a:xfrm>
             <a:off x="8427960" y="2002680"/>
-            <a:ext cx="3506040" cy="1600920"/>
+            <a:ext cx="3505680" cy="1600560"/>
           </a:xfrm>
           <a:prstGeom prst="rect">
             <a:avLst/>
@@ -35759,7 +36025,7 @@
       </p:pic>
       <p:pic>
         <p:nvPicPr>
-          <p:cNvPr id="103" name="Picture 36" descr=""/>
+          <p:cNvPr id="104" name="Picture 36" descr=""/>
           <p:cNvPicPr/>
           <p:nvPr/>
         </p:nvPicPr>
@@ -35770,7 +36036,7 @@
         <p:spPr>
           <a:xfrm>
             <a:off x="8427960" y="3779640"/>
-            <a:ext cx="2626920" cy="936360"/>
+            <a:ext cx="2626560" cy="936000"/>
           </a:xfrm>
           <a:prstGeom prst="rect">
             <a:avLst/>
@@ -35782,7 +36048,7 @@
       </p:pic>
       <p:pic>
         <p:nvPicPr>
-          <p:cNvPr id="104" name="Picture 40" descr=""/>
+          <p:cNvPr id="105" name="Picture 40" descr=""/>
           <p:cNvPicPr/>
           <p:nvPr/>
         </p:nvPicPr>
@@ -35793,7 +36059,7 @@
         <p:spPr>
           <a:xfrm>
             <a:off x="8427960" y="4827960"/>
-            <a:ext cx="2079720" cy="1146240"/>
+            <a:ext cx="2079360" cy="1145880"/>
           </a:xfrm>
           <a:prstGeom prst="rect">
             <a:avLst/>
@@ -35835,7 +36101,7 @@
       </p:grpSpPr>
       <p:sp>
         <p:nvSpPr>
-          <p:cNvPr id="105" name="PlaceHolder 1"/>
+          <p:cNvPr id="106" name="PlaceHolder 1"/>
           <p:cNvSpPr>
             <a:spLocks noGrp="1"/>
           </p:cNvSpPr>
@@ -35846,7 +36112,7 @@
         <p:spPr>
           <a:xfrm>
             <a:off x="838080" y="365040"/>
-            <a:ext cx="10512360" cy="1322280"/>
+            <a:ext cx="10512000" cy="1321920"/>
           </a:xfrm>
           <a:prstGeom prst="rect">
             <a:avLst/>
@@ -35884,7 +36150,7 @@
       </p:sp>
       <p:sp>
         <p:nvSpPr>
-          <p:cNvPr id="106" name="PlaceHolder 2"/>
+          <p:cNvPr id="107" name="PlaceHolder 2"/>
           <p:cNvSpPr>
             <a:spLocks noGrp="1"/>
           </p:cNvSpPr>
@@ -35895,7 +36161,7 @@
         <p:spPr>
           <a:xfrm>
             <a:off x="838080" y="1825560"/>
-            <a:ext cx="10512360" cy="4917240"/>
+            <a:ext cx="10512000" cy="4916880"/>
           </a:xfrm>
           <a:prstGeom prst="rect">
             <a:avLst/>
@@ -36193,7 +36459,7 @@
       </p:sp>
       <p:pic>
         <p:nvPicPr>
-          <p:cNvPr id="107" name="Picture 4" descr=""/>
+          <p:cNvPr id="108" name="Picture 4" descr=""/>
           <p:cNvPicPr/>
           <p:nvPr/>
         </p:nvPicPr>
@@ -36204,7 +36470,7 @@
         <p:spPr>
           <a:xfrm>
             <a:off x="8089920" y="6279840"/>
-            <a:ext cx="3921120" cy="423000"/>
+            <a:ext cx="3920760" cy="422640"/>
           </a:xfrm>
           <a:prstGeom prst="rect">
             <a:avLst/>
@@ -36246,7 +36512,7 @@
       </p:grpSpPr>
       <p:sp>
         <p:nvSpPr>
-          <p:cNvPr id="108" name="PlaceHolder 1"/>
+          <p:cNvPr id="109" name="PlaceHolder 1"/>
           <p:cNvSpPr>
             <a:spLocks noGrp="1"/>
           </p:cNvSpPr>
@@ -36257,7 +36523,7 @@
         <p:spPr>
           <a:xfrm>
             <a:off x="838080" y="365040"/>
-            <a:ext cx="10512360" cy="1322280"/>
+            <a:ext cx="10512000" cy="1321920"/>
           </a:xfrm>
           <a:prstGeom prst="rect">
             <a:avLst/>
@@ -36295,7 +36561,7 @@
       </p:sp>
       <p:sp>
         <p:nvSpPr>
-          <p:cNvPr id="109" name="PlaceHolder 2"/>
+          <p:cNvPr id="110" name="PlaceHolder 2"/>
           <p:cNvSpPr>
             <a:spLocks noGrp="1"/>
           </p:cNvSpPr>
@@ -36306,7 +36572,7 @@
         <p:spPr>
           <a:xfrm>
             <a:off x="838080" y="1825560"/>
-            <a:ext cx="10512360" cy="4937760"/>
+            <a:ext cx="10512000" cy="4937400"/>
           </a:xfrm>
           <a:prstGeom prst="rect">
             <a:avLst/>
@@ -36599,7 +36865,7 @@
       </p:grpSpPr>
       <p:sp>
         <p:nvSpPr>
-          <p:cNvPr id="110" name="PlaceHolder 1"/>
+          <p:cNvPr id="111" name="PlaceHolder 1"/>
           <p:cNvSpPr>
             <a:spLocks noGrp="1"/>
           </p:cNvSpPr>
@@ -36610,7 +36876,7 @@
         <p:spPr>
           <a:xfrm>
             <a:off x="838080" y="365040"/>
-            <a:ext cx="10512360" cy="1322280"/>
+            <a:ext cx="10512000" cy="1321920"/>
           </a:xfrm>
           <a:prstGeom prst="rect">
             <a:avLst/>
@@ -36648,7 +36914,7 @@
       </p:sp>
       <p:sp>
         <p:nvSpPr>
-          <p:cNvPr id="111" name="PlaceHolder 2"/>
+          <p:cNvPr id="112" name="PlaceHolder 2"/>
           <p:cNvSpPr>
             <a:spLocks noGrp="1"/>
           </p:cNvSpPr>
@@ -36659,7 +36925,7 @@
         <p:spPr>
           <a:xfrm>
             <a:off x="838080" y="1825560"/>
-            <a:ext cx="10512360" cy="5120640"/>
+            <a:ext cx="10512000" cy="5120280"/>
           </a:xfrm>
           <a:prstGeom prst="rect">
             <a:avLst/>
@@ -36854,7 +37120,7 @@
       </p:sp>
       <p:pic>
         <p:nvPicPr>
-          <p:cNvPr id="112" name="Picture 4" descr=""/>
+          <p:cNvPr id="113" name="Picture 4" descr=""/>
           <p:cNvPicPr/>
           <p:nvPr/>
         </p:nvPicPr>
@@ -36865,7 +37131,7 @@
         <p:spPr>
           <a:xfrm>
             <a:off x="1236240" y="4067280"/>
-            <a:ext cx="8290440" cy="1660320"/>
+            <a:ext cx="8290080" cy="1659960"/>
           </a:xfrm>
           <a:prstGeom prst="rect">
             <a:avLst/>
@@ -36907,7 +37173,7 @@
       </p:grpSpPr>
       <p:sp>
         <p:nvSpPr>
-          <p:cNvPr id="113" name="PlaceHolder 1"/>
+          <p:cNvPr id="114" name="PlaceHolder 1"/>
           <p:cNvSpPr>
             <a:spLocks noGrp="1"/>
           </p:cNvSpPr>
@@ -36918,7 +37184,7 @@
         <p:spPr>
           <a:xfrm>
             <a:off x="838080" y="365040"/>
-            <a:ext cx="10512360" cy="1322280"/>
+            <a:ext cx="10512000" cy="1321920"/>
           </a:xfrm>
           <a:prstGeom prst="rect">
             <a:avLst/>
@@ -36956,7 +37222,7 @@
       </p:sp>
       <p:sp>
         <p:nvSpPr>
-          <p:cNvPr id="114" name="PlaceHolder 2"/>
+          <p:cNvPr id="115" name="PlaceHolder 2"/>
           <p:cNvSpPr>
             <a:spLocks noGrp="1"/>
           </p:cNvSpPr>
@@ -36967,7 +37233,7 @@
         <p:spPr>
           <a:xfrm>
             <a:off x="838080" y="1825560"/>
-            <a:ext cx="10512360" cy="4876560"/>
+            <a:ext cx="10512000" cy="4876200"/>
           </a:xfrm>
           <a:prstGeom prst="rect">
             <a:avLst/>

</xml_diff>